<commit_message>
Initial break down of some of the sections
</commit_message>
<xml_diff>
--- a/doc/Introduction to FP with C#.pptx
+++ b/doc/Introduction to FP with C#.pptx
@@ -6,6 +6,25 @@
   </p:sldMasterIdLst>
   <p:sldIdLst>
     <p:sldId id="256" r:id="rId2"/>
+    <p:sldId id="257" r:id="rId3"/>
+    <p:sldId id="297" r:id="rId4"/>
+    <p:sldId id="298" r:id="rId5"/>
+    <p:sldId id="299" r:id="rId6"/>
+    <p:sldId id="300" r:id="rId7"/>
+    <p:sldId id="293" r:id="rId8"/>
+    <p:sldId id="301" r:id="rId9"/>
+    <p:sldId id="302" r:id="rId10"/>
+    <p:sldId id="296" r:id="rId11"/>
+    <p:sldId id="295" r:id="rId12"/>
+    <p:sldId id="292" r:id="rId13"/>
+    <p:sldId id="307" r:id="rId14"/>
+    <p:sldId id="303" r:id="rId15"/>
+    <p:sldId id="294" r:id="rId16"/>
+    <p:sldId id="304" r:id="rId17"/>
+    <p:sldId id="305" r:id="rId18"/>
+    <p:sldId id="306" r:id="rId19"/>
+    <p:sldId id="284" r:id="rId20"/>
+    <p:sldId id="285" r:id="rId21"/>
   </p:sldIdLst>
   <p:sldSz cx="12192000" cy="6858000"/>
   <p:notesSz cx="6858000" cy="9144000"/>
@@ -298,7 +317,7 @@
           <a:p>
             <a:fld id="{B4B6E119-0B6E-4A43-814F-75CF8686C874}" type="datetimeFigureOut">
               <a:rPr lang="en-US" smtClean="0"/>
-              <a:t>1/20/2023</a:t>
+              <a:t>3/4/2023</a:t>
             </a:fld>
             <a:endParaRPr lang="en-US"/>
           </a:p>
@@ -573,7 +592,7 @@
           <a:p>
             <a:fld id="{B4B6E119-0B6E-4A43-814F-75CF8686C874}" type="datetimeFigureOut">
               <a:rPr lang="en-US" smtClean="0"/>
-              <a:t>1/20/2023</a:t>
+              <a:t>3/4/2023</a:t>
             </a:fld>
             <a:endParaRPr lang="en-US"/>
           </a:p>
@@ -767,7 +786,7 @@
           <a:p>
             <a:fld id="{B4B6E119-0B6E-4A43-814F-75CF8686C874}" type="datetimeFigureOut">
               <a:rPr lang="en-US" smtClean="0"/>
-              <a:t>1/20/2023</a:t>
+              <a:t>3/4/2023</a:t>
             </a:fld>
             <a:endParaRPr lang="en-US"/>
           </a:p>
@@ -1040,7 +1059,7 @@
           <a:p>
             <a:fld id="{B4B6E119-0B6E-4A43-814F-75CF8686C874}" type="datetimeFigureOut">
               <a:rPr lang="en-US" smtClean="0"/>
-              <a:t>1/20/2023</a:t>
+              <a:t>3/4/2023</a:t>
             </a:fld>
             <a:endParaRPr lang="en-US"/>
           </a:p>
@@ -1381,7 +1400,7 @@
           <a:p>
             <a:fld id="{B4B6E119-0B6E-4A43-814F-75CF8686C874}" type="datetimeFigureOut">
               <a:rPr lang="en-US" smtClean="0"/>
-              <a:t>1/20/2023</a:t>
+              <a:t>3/4/2023</a:t>
             </a:fld>
             <a:endParaRPr lang="en-US"/>
           </a:p>
@@ -2004,7 +2023,7 @@
           <a:p>
             <a:fld id="{B4B6E119-0B6E-4A43-814F-75CF8686C874}" type="datetimeFigureOut">
               <a:rPr lang="en-US" smtClean="0"/>
-              <a:t>1/20/2023</a:t>
+              <a:t>3/4/2023</a:t>
             </a:fld>
             <a:endParaRPr lang="en-US"/>
           </a:p>
@@ -2864,7 +2883,7 @@
           <a:p>
             <a:fld id="{B4B6E119-0B6E-4A43-814F-75CF8686C874}" type="datetimeFigureOut">
               <a:rPr lang="en-US" smtClean="0"/>
-              <a:t>1/20/2023</a:t>
+              <a:t>3/4/2023</a:t>
             </a:fld>
             <a:endParaRPr lang="en-US"/>
           </a:p>
@@ -3034,7 +3053,7 @@
           <a:p>
             <a:fld id="{B4B6E119-0B6E-4A43-814F-75CF8686C874}" type="datetimeFigureOut">
               <a:rPr lang="en-US" smtClean="0"/>
-              <a:t>1/20/2023</a:t>
+              <a:t>3/4/2023</a:t>
             </a:fld>
             <a:endParaRPr lang="en-US"/>
           </a:p>
@@ -3214,7 +3233,7 @@
           <a:p>
             <a:fld id="{B4B6E119-0B6E-4A43-814F-75CF8686C874}" type="datetimeFigureOut">
               <a:rPr lang="en-US" smtClean="0"/>
-              <a:t>1/20/2023</a:t>
+              <a:t>3/4/2023</a:t>
             </a:fld>
             <a:endParaRPr lang="en-US"/>
           </a:p>
@@ -3384,7 +3403,7 @@
           <a:p>
             <a:fld id="{B4B6E119-0B6E-4A43-814F-75CF8686C874}" type="datetimeFigureOut">
               <a:rPr lang="en-US" smtClean="0"/>
-              <a:t>1/20/2023</a:t>
+              <a:t>3/4/2023</a:t>
             </a:fld>
             <a:endParaRPr lang="en-US"/>
           </a:p>
@@ -3631,7 +3650,7 @@
           <a:p>
             <a:fld id="{B4B6E119-0B6E-4A43-814F-75CF8686C874}" type="datetimeFigureOut">
               <a:rPr lang="en-US" smtClean="0"/>
-              <a:t>1/20/2023</a:t>
+              <a:t>3/4/2023</a:t>
             </a:fld>
             <a:endParaRPr lang="en-US"/>
           </a:p>
@@ -3923,7 +3942,7 @@
           <a:p>
             <a:fld id="{B4B6E119-0B6E-4A43-814F-75CF8686C874}" type="datetimeFigureOut">
               <a:rPr lang="en-US" smtClean="0"/>
-              <a:t>1/20/2023</a:t>
+              <a:t>3/4/2023</a:t>
             </a:fld>
             <a:endParaRPr lang="en-US"/>
           </a:p>
@@ -4367,7 +4386,7 @@
           <a:p>
             <a:fld id="{B4B6E119-0B6E-4A43-814F-75CF8686C874}" type="datetimeFigureOut">
               <a:rPr lang="en-US" smtClean="0"/>
-              <a:t>1/20/2023</a:t>
+              <a:t>3/4/2023</a:t>
             </a:fld>
             <a:endParaRPr lang="en-US"/>
           </a:p>
@@ -4485,7 +4504,7 @@
           <a:p>
             <a:fld id="{B4B6E119-0B6E-4A43-814F-75CF8686C874}" type="datetimeFigureOut">
               <a:rPr lang="en-US" smtClean="0"/>
-              <a:t>1/20/2023</a:t>
+              <a:t>3/4/2023</a:t>
             </a:fld>
             <a:endParaRPr lang="en-US"/>
           </a:p>
@@ -4580,7 +4599,7 @@
           <a:p>
             <a:fld id="{B4B6E119-0B6E-4A43-814F-75CF8686C874}" type="datetimeFigureOut">
               <a:rPr lang="en-US" smtClean="0"/>
-              <a:t>1/20/2023</a:t>
+              <a:t>3/4/2023</a:t>
             </a:fld>
             <a:endParaRPr lang="en-US"/>
           </a:p>
@@ -4859,7 +4878,7 @@
           <a:p>
             <a:fld id="{B4B6E119-0B6E-4A43-814F-75CF8686C874}" type="datetimeFigureOut">
               <a:rPr lang="en-US" smtClean="0"/>
-              <a:t>1/20/2023</a:t>
+              <a:t>3/4/2023</a:t>
             </a:fld>
             <a:endParaRPr lang="en-US"/>
           </a:p>
@@ -5134,7 +5153,7 @@
           <a:p>
             <a:fld id="{B4B6E119-0B6E-4A43-814F-75CF8686C874}" type="datetimeFigureOut">
               <a:rPr lang="en-US" smtClean="0"/>
-              <a:t>1/20/2023</a:t>
+              <a:t>3/4/2023</a:t>
             </a:fld>
             <a:endParaRPr lang="en-US"/>
           </a:p>
@@ -5563,7 +5582,7 @@
           <a:p>
             <a:fld id="{B4B6E119-0B6E-4A43-814F-75CF8686C874}" type="datetimeFigureOut">
               <a:rPr lang="en-US" smtClean="0"/>
-              <a:t>1/20/2023</a:t>
+              <a:t>3/4/2023</a:t>
             </a:fld>
             <a:endParaRPr lang="en-US"/>
           </a:p>
@@ -6736,6 +6755,2314 @@
 </p:sld>
 </file>
 
+<file path=ppt/slides/slide10.xml><?xml version="1.0" encoding="utf-8"?>
+<p:sld xmlns:a="http://schemas.openxmlformats.org/drawingml/2006/main" xmlns:r="http://schemas.openxmlformats.org/officeDocument/2006/relationships" xmlns:p="http://schemas.openxmlformats.org/presentationml/2006/main">
+  <p:cSld>
+    <p:spTree>
+      <p:nvGrpSpPr>
+        <p:cNvPr id="1" name=""/>
+        <p:cNvGrpSpPr/>
+        <p:nvPr/>
+      </p:nvGrpSpPr>
+      <p:grpSpPr>
+        <a:xfrm>
+          <a:off x="0" y="0"/>
+          <a:ext cx="0" cy="0"/>
+          <a:chOff x="0" y="0"/>
+          <a:chExt cx="0" cy="0"/>
+        </a:xfrm>
+      </p:grpSpPr>
+      <p:sp>
+        <p:nvSpPr>
+          <p:cNvPr id="2" name="Title 1">
+            <a:extLst>
+              <a:ext uri="{FF2B5EF4-FFF2-40B4-BE49-F238E27FC236}">
+                <a16:creationId xmlns:a16="http://schemas.microsoft.com/office/drawing/2014/main" id="{7306C212-B3B4-8E92-B9B3-B626EF37EBA4}"/>
+              </a:ext>
+            </a:extLst>
+          </p:cNvPr>
+          <p:cNvSpPr txBox="1">
+            <a:spLocks noGrp="1"/>
+          </p:cNvSpPr>
+          <p:nvPr>
+            <p:ph type="title" idx="4294967295"/>
+          </p:nvPr>
+        </p:nvSpPr>
+        <p:spPr>
+          <a:xfrm>
+            <a:off x="1061794" y="2828836"/>
+            <a:ext cx="10068412" cy="1200329"/>
+          </a:xfrm>
+          <a:prstGeom prst="rect">
+            <a:avLst/>
+          </a:prstGeom>
+          <a:noFill/>
+          <a:ln>
+            <a:noFill/>
+            <a:prstDash/>
+          </a:ln>
+          <a:effectLst/>
+        </p:spPr>
+        <p:txBody>
+          <a:bodyPr rot="0" spcFirstLastPara="0" vertOverflow="overflow" horzOverflow="overflow" vert="horz" wrap="square" lIns="91440" tIns="45720" rIns="91440" bIns="45720" numCol="1" spcCol="0" rtlCol="0" fromWordArt="0" anchor="t" anchorCtr="0" forceAA="0" compatLnSpc="1">
+            <a:prstTxWarp prst="textNoShape">
+              <a:avLst/>
+            </a:prstTxWarp>
+            <a:spAutoFit/>
+          </a:bodyPr>
+          <a:lstStyle/>
+          <a:p>
+            <a:pPr marL="0" marR="0" lvl="0" indent="0" algn="ctr" defTabSz="457200" rtl="0" eaLnBrk="1" fontAlgn="auto" latinLnBrk="0" hangingPunct="1">
+              <a:lnSpc>
+                <a:spcPct val="100000"/>
+              </a:lnSpc>
+              <a:spcBef>
+                <a:spcPts val="0"/>
+              </a:spcBef>
+              <a:spcAft>
+                <a:spcPts val="0"/>
+              </a:spcAft>
+              <a:buClrTx/>
+              <a:buSzTx/>
+              <a:buFontTx/>
+              <a:buNone/>
+              <a:tabLst/>
+              <a:defRPr/>
+            </a:pPr>
+            <a:r>
+              <a:rPr kumimoji="0" lang="en-US" sz="7200" b="0" i="0" u="none" strike="noStrike" kern="1200" cap="none" spc="0" normalizeH="0" baseline="0" noProof="0" dirty="0">
+                <a:ln>
+                  <a:noFill/>
+                </a:ln>
+                <a:solidFill>
+                  <a:schemeClr val="tx1"/>
+                </a:solidFill>
+                <a:effectLst/>
+                <a:uLnTx/>
+                <a:uFillTx/>
+                <a:latin typeface="+mn-lt"/>
+                <a:ea typeface="+mn-ea"/>
+                <a:cs typeface="+mn-cs"/>
+              </a:rPr>
+              <a:t>Closures</a:t>
+            </a:r>
+          </a:p>
+        </p:txBody>
+      </p:sp>
+    </p:spTree>
+    <p:extLst>
+      <p:ext uri="{BB962C8B-B14F-4D97-AF65-F5344CB8AC3E}">
+        <p14:creationId xmlns:p14="http://schemas.microsoft.com/office/powerpoint/2010/main" val="2815984157"/>
+      </p:ext>
+    </p:extLst>
+  </p:cSld>
+  <p:clrMapOvr>
+    <a:masterClrMapping/>
+  </p:clrMapOvr>
+</p:sld>
+</file>
+
+<file path=ppt/slides/slide11.xml><?xml version="1.0" encoding="utf-8"?>
+<p:sld xmlns:a="http://schemas.openxmlformats.org/drawingml/2006/main" xmlns:r="http://schemas.openxmlformats.org/officeDocument/2006/relationships" xmlns:p="http://schemas.openxmlformats.org/presentationml/2006/main">
+  <p:cSld>
+    <p:spTree>
+      <p:nvGrpSpPr>
+        <p:cNvPr id="1" name=""/>
+        <p:cNvGrpSpPr/>
+        <p:nvPr/>
+      </p:nvGrpSpPr>
+      <p:grpSpPr>
+        <a:xfrm>
+          <a:off x="0" y="0"/>
+          <a:ext cx="0" cy="0"/>
+          <a:chOff x="0" y="0"/>
+          <a:chExt cx="0" cy="0"/>
+        </a:xfrm>
+      </p:grpSpPr>
+      <p:sp>
+        <p:nvSpPr>
+          <p:cNvPr id="2" name="Title 1">
+            <a:extLst>
+              <a:ext uri="{FF2B5EF4-FFF2-40B4-BE49-F238E27FC236}">
+                <a16:creationId xmlns:a16="http://schemas.microsoft.com/office/drawing/2014/main" id="{7306C212-B3B4-8E92-B9B3-B626EF37EBA4}"/>
+              </a:ext>
+            </a:extLst>
+          </p:cNvPr>
+          <p:cNvSpPr txBox="1">
+            <a:spLocks noGrp="1"/>
+          </p:cNvSpPr>
+          <p:nvPr>
+            <p:ph type="title" idx="4294967295"/>
+          </p:nvPr>
+        </p:nvSpPr>
+        <p:spPr>
+          <a:xfrm>
+            <a:off x="1061794" y="2828836"/>
+            <a:ext cx="10068412" cy="1200329"/>
+          </a:xfrm>
+          <a:prstGeom prst="rect">
+            <a:avLst/>
+          </a:prstGeom>
+          <a:noFill/>
+          <a:ln>
+            <a:noFill/>
+            <a:prstDash/>
+          </a:ln>
+          <a:effectLst/>
+        </p:spPr>
+        <p:txBody>
+          <a:bodyPr rot="0" spcFirstLastPara="0" vertOverflow="overflow" horzOverflow="overflow" vert="horz" wrap="square" lIns="91440" tIns="45720" rIns="91440" bIns="45720" numCol="1" spcCol="0" rtlCol="0" fromWordArt="0" anchor="t" anchorCtr="0" forceAA="0" compatLnSpc="1">
+            <a:prstTxWarp prst="textNoShape">
+              <a:avLst/>
+            </a:prstTxWarp>
+            <a:spAutoFit/>
+          </a:bodyPr>
+          <a:lstStyle/>
+          <a:p>
+            <a:pPr marL="0" marR="0" lvl="0" indent="0" algn="ctr" defTabSz="457200" rtl="0" eaLnBrk="1" fontAlgn="auto" latinLnBrk="0" hangingPunct="1">
+              <a:lnSpc>
+                <a:spcPct val="100000"/>
+              </a:lnSpc>
+              <a:spcBef>
+                <a:spcPts val="0"/>
+              </a:spcBef>
+              <a:spcAft>
+                <a:spcPts val="0"/>
+              </a:spcAft>
+              <a:buClrTx/>
+              <a:buSzTx/>
+              <a:buFontTx/>
+              <a:buNone/>
+              <a:tabLst/>
+              <a:defRPr/>
+            </a:pPr>
+            <a:r>
+              <a:rPr kumimoji="0" lang="en-US" sz="7200" b="0" i="0" u="none" strike="noStrike" kern="1200" cap="none" spc="0" normalizeH="0" baseline="0" noProof="0" dirty="0">
+                <a:ln>
+                  <a:noFill/>
+                </a:ln>
+                <a:solidFill>
+                  <a:schemeClr val="tx1"/>
+                </a:solidFill>
+                <a:effectLst/>
+                <a:uLnTx/>
+                <a:uFillTx/>
+                <a:latin typeface="+mn-lt"/>
+                <a:ea typeface="+mn-ea"/>
+                <a:cs typeface="+mn-cs"/>
+              </a:rPr>
+              <a:t>Examples</a:t>
+            </a:r>
+          </a:p>
+        </p:txBody>
+      </p:sp>
+    </p:spTree>
+    <p:extLst>
+      <p:ext uri="{BB962C8B-B14F-4D97-AF65-F5344CB8AC3E}">
+        <p14:creationId xmlns:p14="http://schemas.microsoft.com/office/powerpoint/2010/main" val="2146797957"/>
+      </p:ext>
+    </p:extLst>
+  </p:cSld>
+  <p:clrMapOvr>
+    <a:masterClrMapping/>
+  </p:clrMapOvr>
+</p:sld>
+</file>
+
+<file path=ppt/slides/slide12.xml><?xml version="1.0" encoding="utf-8"?>
+<p:sld xmlns:a="http://schemas.openxmlformats.org/drawingml/2006/main" xmlns:r="http://schemas.openxmlformats.org/officeDocument/2006/relationships" xmlns:p="http://schemas.openxmlformats.org/presentationml/2006/main">
+  <p:cSld>
+    <p:spTree>
+      <p:nvGrpSpPr>
+        <p:cNvPr id="1" name=""/>
+        <p:cNvGrpSpPr/>
+        <p:nvPr/>
+      </p:nvGrpSpPr>
+      <p:grpSpPr>
+        <a:xfrm>
+          <a:off x="0" y="0"/>
+          <a:ext cx="0" cy="0"/>
+          <a:chOff x="0" y="0"/>
+          <a:chExt cx="0" cy="0"/>
+        </a:xfrm>
+      </p:grpSpPr>
+      <p:sp>
+        <p:nvSpPr>
+          <p:cNvPr id="2" name="Title 1">
+            <a:extLst>
+              <a:ext uri="{FF2B5EF4-FFF2-40B4-BE49-F238E27FC236}">
+                <a16:creationId xmlns:a16="http://schemas.microsoft.com/office/drawing/2014/main" id="{7306C212-B3B4-8E92-B9B3-B626EF37EBA4}"/>
+              </a:ext>
+            </a:extLst>
+          </p:cNvPr>
+          <p:cNvSpPr txBox="1">
+            <a:spLocks noGrp="1"/>
+          </p:cNvSpPr>
+          <p:nvPr>
+            <p:ph type="title" idx="4294967295"/>
+          </p:nvPr>
+        </p:nvSpPr>
+        <p:spPr>
+          <a:xfrm>
+            <a:off x="1061794" y="2274838"/>
+            <a:ext cx="10068412" cy="2308324"/>
+          </a:xfrm>
+          <a:prstGeom prst="rect">
+            <a:avLst/>
+          </a:prstGeom>
+          <a:noFill/>
+          <a:ln>
+            <a:noFill/>
+            <a:prstDash/>
+          </a:ln>
+          <a:effectLst/>
+        </p:spPr>
+        <p:txBody>
+          <a:bodyPr rot="0" spcFirstLastPara="0" vertOverflow="overflow" horzOverflow="overflow" vert="horz" wrap="square" lIns="91440" tIns="45720" rIns="91440" bIns="45720" numCol="1" spcCol="0" rtlCol="0" fromWordArt="0" anchor="t" anchorCtr="0" forceAA="0" compatLnSpc="1">
+            <a:prstTxWarp prst="textNoShape">
+              <a:avLst/>
+            </a:prstTxWarp>
+            <a:spAutoFit/>
+          </a:bodyPr>
+          <a:lstStyle/>
+          <a:p>
+            <a:pPr marL="0" marR="0" lvl="0" indent="0" algn="ctr" defTabSz="457200" rtl="0" eaLnBrk="1" fontAlgn="auto" latinLnBrk="0" hangingPunct="1">
+              <a:lnSpc>
+                <a:spcPct val="100000"/>
+              </a:lnSpc>
+              <a:spcBef>
+                <a:spcPts val="0"/>
+              </a:spcBef>
+              <a:spcAft>
+                <a:spcPts val="0"/>
+              </a:spcAft>
+              <a:buClrTx/>
+              <a:buSzTx/>
+              <a:buFontTx/>
+              <a:buNone/>
+              <a:tabLst/>
+              <a:defRPr/>
+            </a:pPr>
+            <a:r>
+              <a:rPr kumimoji="0" lang="en-US" sz="7200" b="0" i="0" u="none" strike="noStrike" kern="1200" cap="none" spc="0" normalizeH="0" baseline="0" dirty="0">
+                <a:ln>
+                  <a:noFill/>
+                </a:ln>
+                <a:solidFill>
+                  <a:schemeClr val="tx1"/>
+                </a:solidFill>
+                <a:effectLst/>
+                <a:uLnTx/>
+                <a:uFillTx/>
+                <a:latin typeface="+mn-lt"/>
+                <a:ea typeface="+mn-ea"/>
+                <a:cs typeface="+mn-cs"/>
+              </a:rPr>
+              <a:t>Adopting functional programming</a:t>
+            </a:r>
+          </a:p>
+        </p:txBody>
+      </p:sp>
+    </p:spTree>
+    <p:extLst>
+      <p:ext uri="{BB962C8B-B14F-4D97-AF65-F5344CB8AC3E}">
+        <p14:creationId xmlns:p14="http://schemas.microsoft.com/office/powerpoint/2010/main" val="1980333425"/>
+      </p:ext>
+    </p:extLst>
+  </p:cSld>
+  <p:clrMapOvr>
+    <a:masterClrMapping/>
+  </p:clrMapOvr>
+</p:sld>
+</file>
+
+<file path=ppt/slides/slide13.xml><?xml version="1.0" encoding="utf-8"?>
+<p:sld xmlns:a="http://schemas.openxmlformats.org/drawingml/2006/main" xmlns:r="http://schemas.openxmlformats.org/officeDocument/2006/relationships" xmlns:p="http://schemas.openxmlformats.org/presentationml/2006/main">
+  <p:cSld>
+    <p:spTree>
+      <p:nvGrpSpPr>
+        <p:cNvPr id="1" name=""/>
+        <p:cNvGrpSpPr/>
+        <p:nvPr/>
+      </p:nvGrpSpPr>
+      <p:grpSpPr>
+        <a:xfrm>
+          <a:off x="0" y="0"/>
+          <a:ext cx="0" cy="0"/>
+          <a:chOff x="0" y="0"/>
+          <a:chExt cx="0" cy="0"/>
+        </a:xfrm>
+      </p:grpSpPr>
+      <p:sp>
+        <p:nvSpPr>
+          <p:cNvPr id="2" name="Title 1">
+            <a:extLst>
+              <a:ext uri="{FF2B5EF4-FFF2-40B4-BE49-F238E27FC236}">
+                <a16:creationId xmlns:a16="http://schemas.microsoft.com/office/drawing/2014/main" id="{9F0A4C3A-80AE-E3A6-471D-A74E63C90618}"/>
+              </a:ext>
+            </a:extLst>
+          </p:cNvPr>
+          <p:cNvSpPr>
+            <a:spLocks noGrp="1"/>
+          </p:cNvSpPr>
+          <p:nvPr>
+            <p:ph type="title"/>
+          </p:nvPr>
+        </p:nvSpPr>
+        <p:spPr/>
+        <p:txBody>
+          <a:bodyPr/>
+          <a:lstStyle/>
+          <a:p>
+            <a:r>
+              <a:rPr lang="en-US" dirty="0"/>
+              <a:t>Adopting functional programming</a:t>
+            </a:r>
+            <a:br>
+              <a:rPr lang="en-US" dirty="0"/>
+            </a:br>
+            <a:r>
+              <a:rPr lang="en-US" dirty="0"/>
+              <a:t>Potential blockers</a:t>
+            </a:r>
+          </a:p>
+        </p:txBody>
+      </p:sp>
+      <p:sp>
+        <p:nvSpPr>
+          <p:cNvPr id="3" name="Content Placeholder 2">
+            <a:extLst>
+              <a:ext uri="{FF2B5EF4-FFF2-40B4-BE49-F238E27FC236}">
+                <a16:creationId xmlns:a16="http://schemas.microsoft.com/office/drawing/2014/main" id="{519D56E3-2B90-2A3B-E384-D45FBDF93A21}"/>
+              </a:ext>
+            </a:extLst>
+          </p:cNvPr>
+          <p:cNvSpPr>
+            <a:spLocks noGrp="1"/>
+          </p:cNvSpPr>
+          <p:nvPr>
+            <p:ph idx="1"/>
+          </p:nvPr>
+        </p:nvSpPr>
+        <p:spPr/>
+        <p:txBody>
+          <a:bodyPr/>
+          <a:lstStyle/>
+          <a:p>
+            <a:endParaRPr lang="en-US" dirty="0"/>
+          </a:p>
+        </p:txBody>
+      </p:sp>
+    </p:spTree>
+    <p:extLst>
+      <p:ext uri="{BB962C8B-B14F-4D97-AF65-F5344CB8AC3E}">
+        <p14:creationId xmlns:p14="http://schemas.microsoft.com/office/powerpoint/2010/main" val="2558298236"/>
+      </p:ext>
+    </p:extLst>
+  </p:cSld>
+  <p:clrMapOvr>
+    <a:masterClrMapping/>
+  </p:clrMapOvr>
+</p:sld>
+</file>
+
+<file path=ppt/slides/slide14.xml><?xml version="1.0" encoding="utf-8"?>
+<p:sld xmlns:a="http://schemas.openxmlformats.org/drawingml/2006/main" xmlns:r="http://schemas.openxmlformats.org/officeDocument/2006/relationships" xmlns:p="http://schemas.openxmlformats.org/presentationml/2006/main">
+  <p:cSld>
+    <p:spTree>
+      <p:nvGrpSpPr>
+        <p:cNvPr id="1" name=""/>
+        <p:cNvGrpSpPr/>
+        <p:nvPr/>
+      </p:nvGrpSpPr>
+      <p:grpSpPr>
+        <a:xfrm>
+          <a:off x="0" y="0"/>
+          <a:ext cx="0" cy="0"/>
+          <a:chOff x="0" y="0"/>
+          <a:chExt cx="0" cy="0"/>
+        </a:xfrm>
+      </p:grpSpPr>
+      <p:sp>
+        <p:nvSpPr>
+          <p:cNvPr id="2" name="Title 1">
+            <a:extLst>
+              <a:ext uri="{FF2B5EF4-FFF2-40B4-BE49-F238E27FC236}">
+                <a16:creationId xmlns:a16="http://schemas.microsoft.com/office/drawing/2014/main" id="{9F0A4C3A-80AE-E3A6-471D-A74E63C90618}"/>
+              </a:ext>
+            </a:extLst>
+          </p:cNvPr>
+          <p:cNvSpPr>
+            <a:spLocks noGrp="1"/>
+          </p:cNvSpPr>
+          <p:nvPr>
+            <p:ph type="title"/>
+          </p:nvPr>
+        </p:nvSpPr>
+        <p:spPr/>
+        <p:txBody>
+          <a:bodyPr/>
+          <a:lstStyle/>
+          <a:p>
+            <a:r>
+              <a:rPr lang="en-US" dirty="0"/>
+              <a:t>Adopting functional programming</a:t>
+            </a:r>
+            <a:br>
+              <a:rPr lang="en-US" dirty="0"/>
+            </a:br>
+            <a:r>
+              <a:rPr lang="en-US" dirty="0"/>
+              <a:t>Performance</a:t>
+            </a:r>
+          </a:p>
+        </p:txBody>
+      </p:sp>
+      <p:sp>
+        <p:nvSpPr>
+          <p:cNvPr id="3" name="Content Placeholder 2">
+            <a:extLst>
+              <a:ext uri="{FF2B5EF4-FFF2-40B4-BE49-F238E27FC236}">
+                <a16:creationId xmlns:a16="http://schemas.microsoft.com/office/drawing/2014/main" id="{519D56E3-2B90-2A3B-E384-D45FBDF93A21}"/>
+              </a:ext>
+            </a:extLst>
+          </p:cNvPr>
+          <p:cNvSpPr>
+            <a:spLocks noGrp="1"/>
+          </p:cNvSpPr>
+          <p:nvPr>
+            <p:ph idx="1"/>
+          </p:nvPr>
+        </p:nvSpPr>
+        <p:spPr/>
+        <p:txBody>
+          <a:bodyPr/>
+          <a:lstStyle/>
+          <a:p>
+            <a:endParaRPr lang="en-US" dirty="0"/>
+          </a:p>
+        </p:txBody>
+      </p:sp>
+    </p:spTree>
+    <p:extLst>
+      <p:ext uri="{BB962C8B-B14F-4D97-AF65-F5344CB8AC3E}">
+        <p14:creationId xmlns:p14="http://schemas.microsoft.com/office/powerpoint/2010/main" val="3844268154"/>
+      </p:ext>
+    </p:extLst>
+  </p:cSld>
+  <p:clrMapOvr>
+    <a:masterClrMapping/>
+  </p:clrMapOvr>
+</p:sld>
+</file>
+
+<file path=ppt/slides/slide15.xml><?xml version="1.0" encoding="utf-8"?>
+<p:sld xmlns:a="http://schemas.openxmlformats.org/drawingml/2006/main" xmlns:r="http://schemas.openxmlformats.org/officeDocument/2006/relationships" xmlns:p="http://schemas.openxmlformats.org/presentationml/2006/main">
+  <p:cSld>
+    <p:spTree>
+      <p:nvGrpSpPr>
+        <p:cNvPr id="1" name=""/>
+        <p:cNvGrpSpPr/>
+        <p:nvPr/>
+      </p:nvGrpSpPr>
+      <p:grpSpPr>
+        <a:xfrm>
+          <a:off x="0" y="0"/>
+          <a:ext cx="0" cy="0"/>
+          <a:chOff x="0" y="0"/>
+          <a:chExt cx="0" cy="0"/>
+        </a:xfrm>
+      </p:grpSpPr>
+      <p:sp>
+        <p:nvSpPr>
+          <p:cNvPr id="2" name="Title 1">
+            <a:extLst>
+              <a:ext uri="{FF2B5EF4-FFF2-40B4-BE49-F238E27FC236}">
+                <a16:creationId xmlns:a16="http://schemas.microsoft.com/office/drawing/2014/main" id="{7306C212-B3B4-8E92-B9B3-B626EF37EBA4}"/>
+              </a:ext>
+            </a:extLst>
+          </p:cNvPr>
+          <p:cNvSpPr txBox="1">
+            <a:spLocks noGrp="1"/>
+          </p:cNvSpPr>
+          <p:nvPr>
+            <p:ph type="title" idx="4294967295"/>
+          </p:nvPr>
+        </p:nvSpPr>
+        <p:spPr>
+          <a:xfrm>
+            <a:off x="1061794" y="2828836"/>
+            <a:ext cx="10068412" cy="1200329"/>
+          </a:xfrm>
+          <a:prstGeom prst="rect">
+            <a:avLst/>
+          </a:prstGeom>
+          <a:noFill/>
+          <a:ln>
+            <a:noFill/>
+            <a:prstDash/>
+          </a:ln>
+          <a:effectLst/>
+        </p:spPr>
+        <p:txBody>
+          <a:bodyPr rot="0" spcFirstLastPara="0" vertOverflow="overflow" horzOverflow="overflow" vert="horz" wrap="square" lIns="91440" tIns="45720" rIns="91440" bIns="45720" numCol="1" spcCol="0" rtlCol="0" fromWordArt="0" anchor="t" anchorCtr="0" forceAA="0" compatLnSpc="1">
+            <a:prstTxWarp prst="textNoShape">
+              <a:avLst/>
+            </a:prstTxWarp>
+            <a:spAutoFit/>
+          </a:bodyPr>
+          <a:lstStyle/>
+          <a:p>
+            <a:pPr marL="0" marR="0" lvl="0" indent="0" algn="ctr" defTabSz="457200" rtl="0" eaLnBrk="1" fontAlgn="auto" latinLnBrk="0" hangingPunct="1">
+              <a:lnSpc>
+                <a:spcPct val="100000"/>
+              </a:lnSpc>
+              <a:spcBef>
+                <a:spcPts val="0"/>
+              </a:spcBef>
+              <a:spcAft>
+                <a:spcPts val="0"/>
+              </a:spcAft>
+              <a:buClrTx/>
+              <a:buSzTx/>
+              <a:buFontTx/>
+              <a:buNone/>
+              <a:tabLst/>
+              <a:defRPr/>
+            </a:pPr>
+            <a:r>
+              <a:rPr kumimoji="0" lang="en-US" sz="7200" b="0" i="0" u="none" strike="noStrike" kern="1200" cap="none" spc="0" normalizeH="0" baseline="0" noProof="0" dirty="0">
+                <a:ln>
+                  <a:noFill/>
+                </a:ln>
+                <a:solidFill>
+                  <a:schemeClr val="tx1"/>
+                </a:solidFill>
+                <a:effectLst/>
+                <a:uLnTx/>
+                <a:uFillTx/>
+                <a:latin typeface="+mn-lt"/>
+                <a:ea typeface="+mn-ea"/>
+                <a:cs typeface="+mn-cs"/>
+              </a:rPr>
+              <a:t>Next steps</a:t>
+            </a:r>
+          </a:p>
+        </p:txBody>
+      </p:sp>
+    </p:spTree>
+    <p:extLst>
+      <p:ext uri="{BB962C8B-B14F-4D97-AF65-F5344CB8AC3E}">
+        <p14:creationId xmlns:p14="http://schemas.microsoft.com/office/powerpoint/2010/main" val="1448221693"/>
+      </p:ext>
+    </p:extLst>
+  </p:cSld>
+  <p:clrMapOvr>
+    <a:masterClrMapping/>
+  </p:clrMapOvr>
+</p:sld>
+</file>
+
+<file path=ppt/slides/slide16.xml><?xml version="1.0" encoding="utf-8"?>
+<p:sld xmlns:a="http://schemas.openxmlformats.org/drawingml/2006/main" xmlns:r="http://schemas.openxmlformats.org/officeDocument/2006/relationships" xmlns:p="http://schemas.openxmlformats.org/presentationml/2006/main">
+  <p:cSld>
+    <p:spTree>
+      <p:nvGrpSpPr>
+        <p:cNvPr id="1" name=""/>
+        <p:cNvGrpSpPr/>
+        <p:nvPr/>
+      </p:nvGrpSpPr>
+      <p:grpSpPr>
+        <a:xfrm>
+          <a:off x="0" y="0"/>
+          <a:ext cx="0" cy="0"/>
+          <a:chOff x="0" y="0"/>
+          <a:chExt cx="0" cy="0"/>
+        </a:xfrm>
+      </p:grpSpPr>
+      <p:sp>
+        <p:nvSpPr>
+          <p:cNvPr id="2" name="Title 1">
+            <a:extLst>
+              <a:ext uri="{FF2B5EF4-FFF2-40B4-BE49-F238E27FC236}">
+                <a16:creationId xmlns:a16="http://schemas.microsoft.com/office/drawing/2014/main" id="{9F0A4C3A-80AE-E3A6-471D-A74E63C90618}"/>
+              </a:ext>
+            </a:extLst>
+          </p:cNvPr>
+          <p:cNvSpPr>
+            <a:spLocks noGrp="1"/>
+          </p:cNvSpPr>
+          <p:nvPr>
+            <p:ph type="title"/>
+          </p:nvPr>
+        </p:nvSpPr>
+        <p:spPr/>
+        <p:txBody>
+          <a:bodyPr/>
+          <a:lstStyle/>
+          <a:p>
+            <a:r>
+              <a:rPr lang="en-US" dirty="0"/>
+              <a:t>Next steps and further resource</a:t>
+            </a:r>
+            <a:br>
+              <a:rPr lang="en-US" dirty="0"/>
+            </a:br>
+            <a:r>
+              <a:rPr lang="en-US" dirty="0"/>
+              <a:t>More FP with C#</a:t>
+            </a:r>
+          </a:p>
+        </p:txBody>
+      </p:sp>
+      <p:sp>
+        <p:nvSpPr>
+          <p:cNvPr id="3" name="Content Placeholder 2">
+            <a:extLst>
+              <a:ext uri="{FF2B5EF4-FFF2-40B4-BE49-F238E27FC236}">
+                <a16:creationId xmlns:a16="http://schemas.microsoft.com/office/drawing/2014/main" id="{519D56E3-2B90-2A3B-E384-D45FBDF93A21}"/>
+              </a:ext>
+            </a:extLst>
+          </p:cNvPr>
+          <p:cNvSpPr>
+            <a:spLocks noGrp="1"/>
+          </p:cNvSpPr>
+          <p:nvPr>
+            <p:ph idx="1"/>
+          </p:nvPr>
+        </p:nvSpPr>
+        <p:spPr/>
+        <p:txBody>
+          <a:bodyPr/>
+          <a:lstStyle/>
+          <a:p>
+            <a:endParaRPr lang="en-US" dirty="0"/>
+          </a:p>
+        </p:txBody>
+      </p:sp>
+    </p:spTree>
+    <p:extLst>
+      <p:ext uri="{BB962C8B-B14F-4D97-AF65-F5344CB8AC3E}">
+        <p14:creationId xmlns:p14="http://schemas.microsoft.com/office/powerpoint/2010/main" val="874669026"/>
+      </p:ext>
+    </p:extLst>
+  </p:cSld>
+  <p:clrMapOvr>
+    <a:masterClrMapping/>
+  </p:clrMapOvr>
+</p:sld>
+</file>
+
+<file path=ppt/slides/slide17.xml><?xml version="1.0" encoding="utf-8"?>
+<p:sld xmlns:a="http://schemas.openxmlformats.org/drawingml/2006/main" xmlns:r="http://schemas.openxmlformats.org/officeDocument/2006/relationships" xmlns:p="http://schemas.openxmlformats.org/presentationml/2006/main">
+  <p:cSld>
+    <p:spTree>
+      <p:nvGrpSpPr>
+        <p:cNvPr id="1" name=""/>
+        <p:cNvGrpSpPr/>
+        <p:nvPr/>
+      </p:nvGrpSpPr>
+      <p:grpSpPr>
+        <a:xfrm>
+          <a:off x="0" y="0"/>
+          <a:ext cx="0" cy="0"/>
+          <a:chOff x="0" y="0"/>
+          <a:chExt cx="0" cy="0"/>
+        </a:xfrm>
+      </p:grpSpPr>
+      <p:sp>
+        <p:nvSpPr>
+          <p:cNvPr id="2" name="Title 1">
+            <a:extLst>
+              <a:ext uri="{FF2B5EF4-FFF2-40B4-BE49-F238E27FC236}">
+                <a16:creationId xmlns:a16="http://schemas.microsoft.com/office/drawing/2014/main" id="{9F0A4C3A-80AE-E3A6-471D-A74E63C90618}"/>
+              </a:ext>
+            </a:extLst>
+          </p:cNvPr>
+          <p:cNvSpPr>
+            <a:spLocks noGrp="1"/>
+          </p:cNvSpPr>
+          <p:nvPr>
+            <p:ph type="title"/>
+          </p:nvPr>
+        </p:nvSpPr>
+        <p:spPr/>
+        <p:txBody>
+          <a:bodyPr/>
+          <a:lstStyle/>
+          <a:p>
+            <a:r>
+              <a:rPr lang="en-US" dirty="0"/>
+              <a:t>Next steps and further resource</a:t>
+            </a:r>
+            <a:br>
+              <a:rPr lang="en-US" dirty="0"/>
+            </a:br>
+            <a:r>
+              <a:rPr lang="en-US" dirty="0"/>
+              <a:t>Functional(-first) languages</a:t>
+            </a:r>
+          </a:p>
+        </p:txBody>
+      </p:sp>
+      <p:sp>
+        <p:nvSpPr>
+          <p:cNvPr id="3" name="Content Placeholder 2">
+            <a:extLst>
+              <a:ext uri="{FF2B5EF4-FFF2-40B4-BE49-F238E27FC236}">
+                <a16:creationId xmlns:a16="http://schemas.microsoft.com/office/drawing/2014/main" id="{519D56E3-2B90-2A3B-E384-D45FBDF93A21}"/>
+              </a:ext>
+            </a:extLst>
+          </p:cNvPr>
+          <p:cNvSpPr>
+            <a:spLocks noGrp="1"/>
+          </p:cNvSpPr>
+          <p:nvPr>
+            <p:ph idx="1"/>
+          </p:nvPr>
+        </p:nvSpPr>
+        <p:spPr/>
+        <p:txBody>
+          <a:bodyPr/>
+          <a:lstStyle/>
+          <a:p>
+            <a:endParaRPr lang="en-US" dirty="0"/>
+          </a:p>
+        </p:txBody>
+      </p:sp>
+    </p:spTree>
+    <p:extLst>
+      <p:ext uri="{BB962C8B-B14F-4D97-AF65-F5344CB8AC3E}">
+        <p14:creationId xmlns:p14="http://schemas.microsoft.com/office/powerpoint/2010/main" val="73239858"/>
+      </p:ext>
+    </p:extLst>
+  </p:cSld>
+  <p:clrMapOvr>
+    <a:masterClrMapping/>
+  </p:clrMapOvr>
+</p:sld>
+</file>
+
+<file path=ppt/slides/slide18.xml><?xml version="1.0" encoding="utf-8"?>
+<p:sld xmlns:a="http://schemas.openxmlformats.org/drawingml/2006/main" xmlns:r="http://schemas.openxmlformats.org/officeDocument/2006/relationships" xmlns:p="http://schemas.openxmlformats.org/presentationml/2006/main">
+  <p:cSld>
+    <p:spTree>
+      <p:nvGrpSpPr>
+        <p:cNvPr id="1" name=""/>
+        <p:cNvGrpSpPr/>
+        <p:nvPr/>
+      </p:nvGrpSpPr>
+      <p:grpSpPr>
+        <a:xfrm>
+          <a:off x="0" y="0"/>
+          <a:ext cx="0" cy="0"/>
+          <a:chOff x="0" y="0"/>
+          <a:chExt cx="0" cy="0"/>
+        </a:xfrm>
+      </p:grpSpPr>
+      <p:sp>
+        <p:nvSpPr>
+          <p:cNvPr id="2" name="Title 1">
+            <a:extLst>
+              <a:ext uri="{FF2B5EF4-FFF2-40B4-BE49-F238E27FC236}">
+                <a16:creationId xmlns:a16="http://schemas.microsoft.com/office/drawing/2014/main" id="{9F0A4C3A-80AE-E3A6-471D-A74E63C90618}"/>
+              </a:ext>
+            </a:extLst>
+          </p:cNvPr>
+          <p:cNvSpPr>
+            <a:spLocks noGrp="1"/>
+          </p:cNvSpPr>
+          <p:nvPr>
+            <p:ph type="title"/>
+          </p:nvPr>
+        </p:nvSpPr>
+        <p:spPr/>
+        <p:txBody>
+          <a:bodyPr/>
+          <a:lstStyle/>
+          <a:p>
+            <a:r>
+              <a:rPr lang="en-US" dirty="0"/>
+              <a:t>Next steps and further resource</a:t>
+            </a:r>
+            <a:br>
+              <a:rPr lang="en-US" dirty="0"/>
+            </a:br>
+            <a:r>
+              <a:rPr lang="en-US" dirty="0"/>
+              <a:t>Learning more about FP</a:t>
+            </a:r>
+          </a:p>
+        </p:txBody>
+      </p:sp>
+      <p:sp>
+        <p:nvSpPr>
+          <p:cNvPr id="3" name="Content Placeholder 2">
+            <a:extLst>
+              <a:ext uri="{FF2B5EF4-FFF2-40B4-BE49-F238E27FC236}">
+                <a16:creationId xmlns:a16="http://schemas.microsoft.com/office/drawing/2014/main" id="{519D56E3-2B90-2A3B-E384-D45FBDF93A21}"/>
+              </a:ext>
+            </a:extLst>
+          </p:cNvPr>
+          <p:cNvSpPr>
+            <a:spLocks noGrp="1"/>
+          </p:cNvSpPr>
+          <p:nvPr>
+            <p:ph idx="1"/>
+          </p:nvPr>
+        </p:nvSpPr>
+        <p:spPr/>
+        <p:txBody>
+          <a:bodyPr/>
+          <a:lstStyle/>
+          <a:p>
+            <a:endParaRPr lang="en-US" dirty="0"/>
+          </a:p>
+        </p:txBody>
+      </p:sp>
+    </p:spTree>
+    <p:extLst>
+      <p:ext uri="{BB962C8B-B14F-4D97-AF65-F5344CB8AC3E}">
+        <p14:creationId xmlns:p14="http://schemas.microsoft.com/office/powerpoint/2010/main" val="2534234391"/>
+      </p:ext>
+    </p:extLst>
+  </p:cSld>
+  <p:clrMapOvr>
+    <a:masterClrMapping/>
+  </p:clrMapOvr>
+</p:sld>
+</file>
+
+<file path=ppt/slides/slide19.xml><?xml version="1.0" encoding="utf-8"?>
+<p:sld xmlns:a="http://schemas.openxmlformats.org/drawingml/2006/main" xmlns:r="http://schemas.openxmlformats.org/officeDocument/2006/relationships" xmlns:p="http://schemas.openxmlformats.org/presentationml/2006/main">
+  <p:cSld>
+    <p:spTree>
+      <p:nvGrpSpPr>
+        <p:cNvPr id="1" name=""/>
+        <p:cNvGrpSpPr/>
+        <p:nvPr/>
+      </p:nvGrpSpPr>
+      <p:grpSpPr>
+        <a:xfrm>
+          <a:off x="0" y="0"/>
+          <a:ext cx="0" cy="0"/>
+          <a:chOff x="0" y="0"/>
+          <a:chExt cx="0" cy="0"/>
+        </a:xfrm>
+      </p:grpSpPr>
+      <p:sp>
+        <p:nvSpPr>
+          <p:cNvPr id="2" name="Title 1">
+            <a:extLst>
+              <a:ext uri="{FF2B5EF4-FFF2-40B4-BE49-F238E27FC236}">
+                <a16:creationId xmlns:a16="http://schemas.microsoft.com/office/drawing/2014/main" id="{7306C212-B3B4-8E92-B9B3-B626EF37EBA4}"/>
+              </a:ext>
+            </a:extLst>
+          </p:cNvPr>
+          <p:cNvSpPr txBox="1">
+            <a:spLocks noGrp="1"/>
+          </p:cNvSpPr>
+          <p:nvPr>
+            <p:ph type="title" idx="4294967295"/>
+          </p:nvPr>
+        </p:nvSpPr>
+        <p:spPr>
+          <a:xfrm>
+            <a:off x="1061794" y="2828836"/>
+            <a:ext cx="10068412" cy="1200329"/>
+          </a:xfrm>
+          <a:prstGeom prst="rect">
+            <a:avLst/>
+          </a:prstGeom>
+          <a:noFill/>
+          <a:ln>
+            <a:noFill/>
+            <a:prstDash/>
+          </a:ln>
+          <a:effectLst/>
+        </p:spPr>
+        <p:txBody>
+          <a:bodyPr rot="0" spcFirstLastPara="0" vertOverflow="overflow" horzOverflow="overflow" vert="horz" wrap="square" lIns="91440" tIns="45720" rIns="91440" bIns="45720" numCol="1" spcCol="0" rtlCol="0" fromWordArt="0" anchor="t" anchorCtr="0" forceAA="0" compatLnSpc="1">
+            <a:prstTxWarp prst="textNoShape">
+              <a:avLst/>
+            </a:prstTxWarp>
+            <a:spAutoFit/>
+          </a:bodyPr>
+          <a:lstStyle/>
+          <a:p>
+            <a:pPr marL="0" marR="0" lvl="0" indent="0" algn="ctr" defTabSz="457200" rtl="0" eaLnBrk="1" fontAlgn="auto" latinLnBrk="0" hangingPunct="1">
+              <a:lnSpc>
+                <a:spcPct val="100000"/>
+              </a:lnSpc>
+              <a:spcBef>
+                <a:spcPts val="0"/>
+              </a:spcBef>
+              <a:spcAft>
+                <a:spcPts val="0"/>
+              </a:spcAft>
+              <a:buClrTx/>
+              <a:buSzTx/>
+              <a:buFontTx/>
+              <a:buNone/>
+              <a:tabLst/>
+              <a:defRPr/>
+            </a:pPr>
+            <a:r>
+              <a:rPr kumimoji="0" lang="en-US" sz="7200" b="0" i="0" u="none" strike="noStrike" kern="1200" cap="none" spc="0" normalizeH="0" baseline="0" noProof="0" dirty="0">
+                <a:ln>
+                  <a:noFill/>
+                </a:ln>
+                <a:solidFill>
+                  <a:schemeClr val="tx1"/>
+                </a:solidFill>
+                <a:effectLst/>
+                <a:uLnTx/>
+                <a:uFillTx/>
+                <a:latin typeface="+mn-lt"/>
+                <a:ea typeface="+mn-ea"/>
+                <a:cs typeface="+mn-cs"/>
+              </a:rPr>
+              <a:t>Questions?</a:t>
+            </a:r>
+          </a:p>
+        </p:txBody>
+      </p:sp>
+      <p:pic>
+        <p:nvPicPr>
+          <p:cNvPr id="3" name="Picture 2" descr="GitHub">
+            <a:extLst>
+              <a:ext uri="{FF2B5EF4-FFF2-40B4-BE49-F238E27FC236}">
+                <a16:creationId xmlns:a16="http://schemas.microsoft.com/office/drawing/2014/main" id="{29B12B77-0EED-C756-22C8-6C8E5EDEE4D1}"/>
+              </a:ext>
+            </a:extLst>
+          </p:cNvPr>
+          <p:cNvPicPr>
+            <a:picLocks noChangeAspect="1"/>
+          </p:cNvPicPr>
+          <p:nvPr/>
+        </p:nvPicPr>
+        <p:blipFill>
+          <a:blip r:embed="rId2">
+            <a:extLst>
+              <a:ext uri="{28A0092B-C50C-407E-A947-70E740481C1C}">
+                <a14:useLocalDpi xmlns:a14="http://schemas.microsoft.com/office/drawing/2010/main" val="0"/>
+              </a:ext>
+            </a:extLst>
+          </a:blip>
+          <a:stretch>
+            <a:fillRect/>
+          </a:stretch>
+        </p:blipFill>
+        <p:spPr>
+          <a:xfrm>
+            <a:off x="457200" y="5303520"/>
+            <a:ext cx="274320" cy="274320"/>
+          </a:xfrm>
+          <a:prstGeom prst="rect">
+            <a:avLst/>
+          </a:prstGeom>
+        </p:spPr>
+      </p:pic>
+      <p:sp>
+        <p:nvSpPr>
+          <p:cNvPr id="4" name="TextBox 3">
+            <a:extLst>
+              <a:ext uri="{FF2B5EF4-FFF2-40B4-BE49-F238E27FC236}">
+                <a16:creationId xmlns:a16="http://schemas.microsoft.com/office/drawing/2014/main" id="{6B8471E3-9146-8ED9-8175-0660582F81E8}"/>
+              </a:ext>
+            </a:extLst>
+          </p:cNvPr>
+          <p:cNvSpPr txBox="1"/>
+          <p:nvPr/>
+        </p:nvSpPr>
+        <p:spPr>
+          <a:xfrm>
+            <a:off x="800098" y="5247459"/>
+            <a:ext cx="3457641" cy="400110"/>
+          </a:xfrm>
+          <a:prstGeom prst="rect">
+            <a:avLst/>
+          </a:prstGeom>
+          <a:noFill/>
+        </p:spPr>
+        <p:txBody>
+          <a:bodyPr wrap="square" rtlCol="0">
+            <a:spAutoFit/>
+          </a:bodyPr>
+          <a:lstStyle/>
+          <a:p>
+            <a:r>
+              <a:rPr lang="en-US" sz="2000" dirty="0" err="1"/>
+              <a:t>dennisdietrich</a:t>
+            </a:r>
+            <a:endParaRPr lang="en-US" sz="2000" dirty="0"/>
+          </a:p>
+        </p:txBody>
+      </p:sp>
+      <p:pic>
+        <p:nvPicPr>
+          <p:cNvPr id="6" name="Picture 5" descr="LinkedIn">
+            <a:extLst>
+              <a:ext uri="{FF2B5EF4-FFF2-40B4-BE49-F238E27FC236}">
+                <a16:creationId xmlns:a16="http://schemas.microsoft.com/office/drawing/2014/main" id="{7D98E4BD-5402-43AA-9908-E267E4745B8A}"/>
+              </a:ext>
+            </a:extLst>
+          </p:cNvPr>
+          <p:cNvPicPr>
+            <a:picLocks noChangeAspect="1"/>
+          </p:cNvPicPr>
+          <p:nvPr/>
+        </p:nvPicPr>
+        <p:blipFill>
+          <a:blip r:embed="rId3">
+            <a:extLst>
+              <a:ext uri="{28A0092B-C50C-407E-A947-70E740481C1C}">
+                <a14:useLocalDpi xmlns:a14="http://schemas.microsoft.com/office/drawing/2010/main" val="0"/>
+              </a:ext>
+            </a:extLst>
+          </a:blip>
+          <a:stretch>
+            <a:fillRect/>
+          </a:stretch>
+        </p:blipFill>
+        <p:spPr>
+          <a:xfrm>
+            <a:off x="457200" y="5715000"/>
+            <a:ext cx="274320" cy="274320"/>
+          </a:xfrm>
+          <a:prstGeom prst="rect">
+            <a:avLst/>
+          </a:prstGeom>
+        </p:spPr>
+      </p:pic>
+      <p:sp>
+        <p:nvSpPr>
+          <p:cNvPr id="5" name="TextBox 4">
+            <a:extLst>
+              <a:ext uri="{FF2B5EF4-FFF2-40B4-BE49-F238E27FC236}">
+                <a16:creationId xmlns:a16="http://schemas.microsoft.com/office/drawing/2014/main" id="{B1D6468B-2C26-1307-0433-2A67BD6787E4}"/>
+              </a:ext>
+            </a:extLst>
+          </p:cNvPr>
+          <p:cNvSpPr txBox="1"/>
+          <p:nvPr/>
+        </p:nvSpPr>
+        <p:spPr>
+          <a:xfrm>
+            <a:off x="800099" y="5664321"/>
+            <a:ext cx="3457641" cy="400110"/>
+          </a:xfrm>
+          <a:prstGeom prst="rect">
+            <a:avLst/>
+          </a:prstGeom>
+          <a:noFill/>
+        </p:spPr>
+        <p:txBody>
+          <a:bodyPr wrap="square" rtlCol="0">
+            <a:spAutoFit/>
+          </a:bodyPr>
+          <a:lstStyle/>
+          <a:p>
+            <a:r>
+              <a:rPr lang="en-US" sz="2000" dirty="0" err="1"/>
+              <a:t>dcdietrich</a:t>
+            </a:r>
+            <a:endParaRPr lang="en-US" sz="2000" dirty="0"/>
+          </a:p>
+        </p:txBody>
+      </p:sp>
+      <p:pic>
+        <p:nvPicPr>
+          <p:cNvPr id="9" name="Graphic 8">
+            <a:extLst>
+              <a:ext uri="{FF2B5EF4-FFF2-40B4-BE49-F238E27FC236}">
+                <a16:creationId xmlns:a16="http://schemas.microsoft.com/office/drawing/2014/main" id="{1F47F66B-111A-E39A-C755-448AA05DD27D}"/>
+              </a:ext>
+            </a:extLst>
+          </p:cNvPr>
+          <p:cNvPicPr>
+            <a:picLocks noChangeAspect="1"/>
+          </p:cNvPicPr>
+          <p:nvPr/>
+        </p:nvPicPr>
+        <p:blipFill>
+          <a:blip r:embed="rId4">
+            <a:extLst>
+              <a:ext uri="{28A0092B-C50C-407E-A947-70E740481C1C}">
+                <a14:useLocalDpi xmlns:a14="http://schemas.microsoft.com/office/drawing/2010/main" val="0"/>
+              </a:ext>
+              <a:ext uri="{96DAC541-7B7A-43D3-8B79-37D633B846F1}">
+                <asvg:svgBlip xmlns:asvg="http://schemas.microsoft.com/office/drawing/2016/SVG/main" r:embed="rId5"/>
+              </a:ext>
+            </a:extLst>
+          </a:blip>
+          <a:stretch>
+            <a:fillRect/>
+          </a:stretch>
+        </p:blipFill>
+        <p:spPr>
+          <a:xfrm>
+            <a:off x="457200" y="6126480"/>
+            <a:ext cx="274320" cy="292855"/>
+          </a:xfrm>
+          <a:prstGeom prst="rect">
+            <a:avLst/>
+          </a:prstGeom>
+        </p:spPr>
+      </p:pic>
+      <p:sp>
+        <p:nvSpPr>
+          <p:cNvPr id="10" name="TextBox 9">
+            <a:extLst>
+              <a:ext uri="{FF2B5EF4-FFF2-40B4-BE49-F238E27FC236}">
+                <a16:creationId xmlns:a16="http://schemas.microsoft.com/office/drawing/2014/main" id="{F2971C0D-7436-A1BF-ED68-CC50D0DF70CD}"/>
+              </a:ext>
+            </a:extLst>
+          </p:cNvPr>
+          <p:cNvSpPr txBox="1"/>
+          <p:nvPr/>
+        </p:nvSpPr>
+        <p:spPr>
+          <a:xfrm>
+            <a:off x="800100" y="6064431"/>
+            <a:ext cx="5935551" cy="400110"/>
+          </a:xfrm>
+          <a:prstGeom prst="rect">
+            <a:avLst/>
+          </a:prstGeom>
+          <a:noFill/>
+        </p:spPr>
+        <p:txBody>
+          <a:bodyPr wrap="square" rtlCol="0">
+            <a:spAutoFit/>
+          </a:bodyPr>
+          <a:lstStyle/>
+          <a:p>
+            <a:r>
+              <a:rPr lang="en-US" sz="2000" dirty="0"/>
+              <a:t>@dc@social.advancedsoftware.engineering</a:t>
+            </a:r>
+          </a:p>
+        </p:txBody>
+      </p:sp>
+    </p:spTree>
+    <p:extLst>
+      <p:ext uri="{BB962C8B-B14F-4D97-AF65-F5344CB8AC3E}">
+        <p14:creationId xmlns:p14="http://schemas.microsoft.com/office/powerpoint/2010/main" val="1870771211"/>
+      </p:ext>
+    </p:extLst>
+  </p:cSld>
+  <p:clrMapOvr>
+    <a:masterClrMapping/>
+  </p:clrMapOvr>
+</p:sld>
+</file>
+
+<file path=ppt/slides/slide2.xml><?xml version="1.0" encoding="utf-8"?>
+<p:sld xmlns:a="http://schemas.openxmlformats.org/drawingml/2006/main" xmlns:r="http://schemas.openxmlformats.org/officeDocument/2006/relationships" xmlns:p="http://schemas.openxmlformats.org/presentationml/2006/main">
+  <p:cSld>
+    <p:spTree>
+      <p:nvGrpSpPr>
+        <p:cNvPr id="1" name=""/>
+        <p:cNvGrpSpPr/>
+        <p:nvPr/>
+      </p:nvGrpSpPr>
+      <p:grpSpPr>
+        <a:xfrm>
+          <a:off x="0" y="0"/>
+          <a:ext cx="0" cy="0"/>
+          <a:chOff x="0" y="0"/>
+          <a:chExt cx="0" cy="0"/>
+        </a:xfrm>
+      </p:grpSpPr>
+      <p:sp>
+        <p:nvSpPr>
+          <p:cNvPr id="2" name="Title 1">
+            <a:extLst>
+              <a:ext uri="{FF2B5EF4-FFF2-40B4-BE49-F238E27FC236}">
+                <a16:creationId xmlns:a16="http://schemas.microsoft.com/office/drawing/2014/main" id="{B5AB5A65-FBAA-DC24-398C-2298A2AF58C3}"/>
+              </a:ext>
+            </a:extLst>
+          </p:cNvPr>
+          <p:cNvSpPr>
+            <a:spLocks noGrp="1"/>
+          </p:cNvSpPr>
+          <p:nvPr>
+            <p:ph type="title"/>
+          </p:nvPr>
+        </p:nvSpPr>
+        <p:spPr/>
+        <p:txBody>
+          <a:bodyPr/>
+          <a:lstStyle/>
+          <a:p>
+            <a:r>
+              <a:rPr lang="en-US" dirty="0"/>
+              <a:t>Overview</a:t>
+            </a:r>
+          </a:p>
+        </p:txBody>
+      </p:sp>
+      <p:sp>
+        <p:nvSpPr>
+          <p:cNvPr id="3" name="Content Placeholder 2">
+            <a:extLst>
+              <a:ext uri="{FF2B5EF4-FFF2-40B4-BE49-F238E27FC236}">
+                <a16:creationId xmlns:a16="http://schemas.microsoft.com/office/drawing/2014/main" id="{0123CA19-329D-0F80-C469-2825866C6CA4}"/>
+              </a:ext>
+            </a:extLst>
+          </p:cNvPr>
+          <p:cNvSpPr>
+            <a:spLocks noGrp="1"/>
+          </p:cNvSpPr>
+          <p:nvPr>
+            <p:ph idx="1"/>
+          </p:nvPr>
+        </p:nvSpPr>
+        <p:spPr/>
+        <p:txBody>
+          <a:bodyPr/>
+          <a:lstStyle/>
+          <a:p>
+            <a:r>
+              <a:rPr lang="en-US" dirty="0"/>
+              <a:t>Functions</a:t>
+            </a:r>
+          </a:p>
+          <a:p>
+            <a:r>
+              <a:rPr lang="en-US" dirty="0"/>
+              <a:t>Functional programming (FP)</a:t>
+            </a:r>
+          </a:p>
+          <a:p>
+            <a:r>
+              <a:rPr lang="en-US" dirty="0"/>
+              <a:t>Closures</a:t>
+            </a:r>
+          </a:p>
+          <a:p>
+            <a:r>
+              <a:rPr lang="en-US" dirty="0"/>
+              <a:t>Examples</a:t>
+            </a:r>
+          </a:p>
+          <a:p>
+            <a:r>
+              <a:rPr lang="en-US" dirty="0"/>
+              <a:t>Adopting functional programming</a:t>
+            </a:r>
+          </a:p>
+          <a:p>
+            <a:r>
+              <a:rPr lang="en-US" dirty="0"/>
+              <a:t>Next steps and further resource</a:t>
+            </a:r>
+          </a:p>
+        </p:txBody>
+      </p:sp>
+    </p:spTree>
+    <p:extLst>
+      <p:ext uri="{BB962C8B-B14F-4D97-AF65-F5344CB8AC3E}">
+        <p14:creationId xmlns:p14="http://schemas.microsoft.com/office/powerpoint/2010/main" val="1836417717"/>
+      </p:ext>
+    </p:extLst>
+  </p:cSld>
+  <p:clrMapOvr>
+    <a:masterClrMapping/>
+  </p:clrMapOvr>
+</p:sld>
+</file>
+
+<file path=ppt/slides/slide20.xml><?xml version="1.0" encoding="utf-8"?>
+<p:sld xmlns:a="http://schemas.openxmlformats.org/drawingml/2006/main" xmlns:r="http://schemas.openxmlformats.org/officeDocument/2006/relationships" xmlns:p="http://schemas.openxmlformats.org/presentationml/2006/main">
+  <p:cSld>
+    <p:spTree>
+      <p:nvGrpSpPr>
+        <p:cNvPr id="1" name=""/>
+        <p:cNvGrpSpPr/>
+        <p:nvPr/>
+      </p:nvGrpSpPr>
+      <p:grpSpPr>
+        <a:xfrm>
+          <a:off x="0" y="0"/>
+          <a:ext cx="0" cy="0"/>
+          <a:chOff x="0" y="0"/>
+          <a:chExt cx="0" cy="0"/>
+        </a:xfrm>
+      </p:grpSpPr>
+      <p:pic>
+        <p:nvPicPr>
+          <p:cNvPr id="4" name="Graphic 3">
+            <a:extLst>
+              <a:ext uri="{FF2B5EF4-FFF2-40B4-BE49-F238E27FC236}">
+                <a16:creationId xmlns:a16="http://schemas.microsoft.com/office/drawing/2014/main" id="{C5C316CD-AE8F-7E66-44D6-77898BBB0EE1}"/>
+              </a:ext>
+            </a:extLst>
+          </p:cNvPr>
+          <p:cNvPicPr>
+            <a:picLocks noChangeAspect="1"/>
+          </p:cNvPicPr>
+          <p:nvPr/>
+        </p:nvPicPr>
+        <p:blipFill>
+          <a:blip r:embed="rId2">
+            <a:extLst>
+              <a:ext uri="{28A0092B-C50C-407E-A947-70E740481C1C}">
+                <a14:useLocalDpi xmlns:a14="http://schemas.microsoft.com/office/drawing/2010/main" val="0"/>
+              </a:ext>
+              <a:ext uri="{96DAC541-7B7A-43D3-8B79-37D633B846F1}">
+                <asvg:svgBlip xmlns:asvg="http://schemas.microsoft.com/office/drawing/2016/SVG/main" r:embed="rId3"/>
+              </a:ext>
+            </a:extLst>
+          </a:blip>
+          <a:stretch>
+            <a:fillRect/>
+          </a:stretch>
+        </p:blipFill>
+        <p:spPr>
+          <a:xfrm>
+            <a:off x="457200" y="6126480"/>
+            <a:ext cx="274320" cy="292855"/>
+          </a:xfrm>
+          <a:prstGeom prst="rect">
+            <a:avLst/>
+          </a:prstGeom>
+        </p:spPr>
+      </p:pic>
+      <p:sp>
+        <p:nvSpPr>
+          <p:cNvPr id="2" name="Title 1">
+            <a:extLst>
+              <a:ext uri="{FF2B5EF4-FFF2-40B4-BE49-F238E27FC236}">
+                <a16:creationId xmlns:a16="http://schemas.microsoft.com/office/drawing/2014/main" id="{7306C212-B3B4-8E92-B9B3-B626EF37EBA4}"/>
+              </a:ext>
+            </a:extLst>
+          </p:cNvPr>
+          <p:cNvSpPr txBox="1">
+            <a:spLocks noGrp="1"/>
+          </p:cNvSpPr>
+          <p:nvPr>
+            <p:ph type="title" idx="4294967295"/>
+          </p:nvPr>
+        </p:nvSpPr>
+        <p:spPr>
+          <a:xfrm>
+            <a:off x="1061794" y="2828836"/>
+            <a:ext cx="10068412" cy="1200329"/>
+          </a:xfrm>
+          <a:prstGeom prst="rect">
+            <a:avLst/>
+          </a:prstGeom>
+          <a:noFill/>
+          <a:ln>
+            <a:noFill/>
+            <a:prstDash/>
+          </a:ln>
+          <a:effectLst/>
+        </p:spPr>
+        <p:txBody>
+          <a:bodyPr rot="0" spcFirstLastPara="0" vertOverflow="overflow" horzOverflow="overflow" vert="horz" wrap="square" lIns="91440" tIns="45720" rIns="91440" bIns="45720" numCol="1" spcCol="0" rtlCol="0" fromWordArt="0" anchor="t" anchorCtr="0" forceAA="0" compatLnSpc="1">
+            <a:prstTxWarp prst="textNoShape">
+              <a:avLst/>
+            </a:prstTxWarp>
+            <a:spAutoFit/>
+          </a:bodyPr>
+          <a:lstStyle/>
+          <a:p>
+            <a:pPr marL="0" marR="0" lvl="0" indent="0" algn="ctr" defTabSz="457200" rtl="0" eaLnBrk="1" fontAlgn="auto" latinLnBrk="0" hangingPunct="1">
+              <a:lnSpc>
+                <a:spcPct val="100000"/>
+              </a:lnSpc>
+              <a:spcBef>
+                <a:spcPts val="0"/>
+              </a:spcBef>
+              <a:spcAft>
+                <a:spcPts val="0"/>
+              </a:spcAft>
+              <a:buClrTx/>
+              <a:buSzTx/>
+              <a:buFontTx/>
+              <a:buNone/>
+              <a:tabLst/>
+              <a:defRPr/>
+            </a:pPr>
+            <a:r>
+              <a:rPr kumimoji="0" lang="en-US" sz="7200" b="0" i="0" u="none" strike="noStrike" kern="1200" cap="none" spc="0" normalizeH="0" baseline="0" noProof="0" dirty="0">
+                <a:ln>
+                  <a:noFill/>
+                </a:ln>
+                <a:solidFill>
+                  <a:schemeClr val="tx1"/>
+                </a:solidFill>
+                <a:effectLst/>
+                <a:uLnTx/>
+                <a:uFillTx/>
+                <a:latin typeface="+mn-lt"/>
+                <a:ea typeface="+mn-ea"/>
+                <a:cs typeface="+mn-cs"/>
+              </a:rPr>
+              <a:t>Thanks for listening!</a:t>
+            </a:r>
+          </a:p>
+        </p:txBody>
+      </p:sp>
+      <p:pic>
+        <p:nvPicPr>
+          <p:cNvPr id="5" name="Picture 4" descr="GitHub">
+            <a:extLst>
+              <a:ext uri="{FF2B5EF4-FFF2-40B4-BE49-F238E27FC236}">
+                <a16:creationId xmlns:a16="http://schemas.microsoft.com/office/drawing/2014/main" id="{C9112408-9719-E440-BC6C-BA3E3E65E31E}"/>
+              </a:ext>
+            </a:extLst>
+          </p:cNvPr>
+          <p:cNvPicPr>
+            <a:picLocks noChangeAspect="1"/>
+          </p:cNvPicPr>
+          <p:nvPr/>
+        </p:nvPicPr>
+        <p:blipFill>
+          <a:blip r:embed="rId4">
+            <a:extLst>
+              <a:ext uri="{28A0092B-C50C-407E-A947-70E740481C1C}">
+                <a14:useLocalDpi xmlns:a14="http://schemas.microsoft.com/office/drawing/2010/main" val="0"/>
+              </a:ext>
+            </a:extLst>
+          </a:blip>
+          <a:stretch>
+            <a:fillRect/>
+          </a:stretch>
+        </p:blipFill>
+        <p:spPr>
+          <a:xfrm>
+            <a:off x="457200" y="5303520"/>
+            <a:ext cx="274320" cy="274320"/>
+          </a:xfrm>
+          <a:prstGeom prst="rect">
+            <a:avLst/>
+          </a:prstGeom>
+        </p:spPr>
+      </p:pic>
+      <p:sp>
+        <p:nvSpPr>
+          <p:cNvPr id="6" name="TextBox 5">
+            <a:extLst>
+              <a:ext uri="{FF2B5EF4-FFF2-40B4-BE49-F238E27FC236}">
+                <a16:creationId xmlns:a16="http://schemas.microsoft.com/office/drawing/2014/main" id="{F2FAD6ED-B45F-E480-52EB-49AC0568C9BA}"/>
+              </a:ext>
+            </a:extLst>
+          </p:cNvPr>
+          <p:cNvSpPr txBox="1"/>
+          <p:nvPr/>
+        </p:nvSpPr>
+        <p:spPr>
+          <a:xfrm>
+            <a:off x="800098" y="5247459"/>
+            <a:ext cx="3457641" cy="400110"/>
+          </a:xfrm>
+          <a:prstGeom prst="rect">
+            <a:avLst/>
+          </a:prstGeom>
+          <a:noFill/>
+        </p:spPr>
+        <p:txBody>
+          <a:bodyPr wrap="square" rtlCol="0">
+            <a:spAutoFit/>
+          </a:bodyPr>
+          <a:lstStyle/>
+          <a:p>
+            <a:r>
+              <a:rPr lang="en-US" sz="2000" dirty="0" err="1"/>
+              <a:t>dennisdietrich</a:t>
+            </a:r>
+            <a:endParaRPr lang="en-US" sz="2000" dirty="0"/>
+          </a:p>
+        </p:txBody>
+      </p:sp>
+      <p:pic>
+        <p:nvPicPr>
+          <p:cNvPr id="20" name="Picture 19" descr="LinkedIn">
+            <a:extLst>
+              <a:ext uri="{FF2B5EF4-FFF2-40B4-BE49-F238E27FC236}">
+                <a16:creationId xmlns:a16="http://schemas.microsoft.com/office/drawing/2014/main" id="{4FA14B23-7ADB-953A-F57A-3E44D463F836}"/>
+              </a:ext>
+            </a:extLst>
+          </p:cNvPr>
+          <p:cNvPicPr>
+            <a:picLocks noChangeAspect="1"/>
+          </p:cNvPicPr>
+          <p:nvPr/>
+        </p:nvPicPr>
+        <p:blipFill>
+          <a:blip r:embed="rId5">
+            <a:extLst>
+              <a:ext uri="{28A0092B-C50C-407E-A947-70E740481C1C}">
+                <a14:useLocalDpi xmlns:a14="http://schemas.microsoft.com/office/drawing/2010/main" val="0"/>
+              </a:ext>
+            </a:extLst>
+          </a:blip>
+          <a:stretch>
+            <a:fillRect/>
+          </a:stretch>
+        </p:blipFill>
+        <p:spPr>
+          <a:xfrm>
+            <a:off x="457200" y="5715000"/>
+            <a:ext cx="274320" cy="274320"/>
+          </a:xfrm>
+          <a:prstGeom prst="rect">
+            <a:avLst/>
+          </a:prstGeom>
+        </p:spPr>
+      </p:pic>
+      <p:sp>
+        <p:nvSpPr>
+          <p:cNvPr id="18" name="TextBox 17">
+            <a:extLst>
+              <a:ext uri="{FF2B5EF4-FFF2-40B4-BE49-F238E27FC236}">
+                <a16:creationId xmlns:a16="http://schemas.microsoft.com/office/drawing/2014/main" id="{CF7F53EC-6158-915C-CFC1-D4626D193755}"/>
+              </a:ext>
+            </a:extLst>
+          </p:cNvPr>
+          <p:cNvSpPr txBox="1"/>
+          <p:nvPr/>
+        </p:nvSpPr>
+        <p:spPr>
+          <a:xfrm>
+            <a:off x="800099" y="5664321"/>
+            <a:ext cx="3457641" cy="400110"/>
+          </a:xfrm>
+          <a:prstGeom prst="rect">
+            <a:avLst/>
+          </a:prstGeom>
+          <a:noFill/>
+        </p:spPr>
+        <p:txBody>
+          <a:bodyPr wrap="square" rtlCol="0">
+            <a:spAutoFit/>
+          </a:bodyPr>
+          <a:lstStyle/>
+          <a:p>
+            <a:r>
+              <a:rPr lang="en-US" sz="2000" dirty="0" err="1"/>
+              <a:t>dcdietrich</a:t>
+            </a:r>
+            <a:endParaRPr lang="en-US" sz="2000" dirty="0"/>
+          </a:p>
+        </p:txBody>
+      </p:sp>
+      <p:sp>
+        <p:nvSpPr>
+          <p:cNvPr id="24" name="TextBox 23">
+            <a:extLst>
+              <a:ext uri="{FF2B5EF4-FFF2-40B4-BE49-F238E27FC236}">
+                <a16:creationId xmlns:a16="http://schemas.microsoft.com/office/drawing/2014/main" id="{A04B5C49-8425-CBED-2FE0-96A50C78E05B}"/>
+              </a:ext>
+            </a:extLst>
+          </p:cNvPr>
+          <p:cNvSpPr txBox="1"/>
+          <p:nvPr/>
+        </p:nvSpPr>
+        <p:spPr>
+          <a:xfrm>
+            <a:off x="800100" y="6064431"/>
+            <a:ext cx="5935551" cy="400110"/>
+          </a:xfrm>
+          <a:prstGeom prst="rect">
+            <a:avLst/>
+          </a:prstGeom>
+          <a:noFill/>
+        </p:spPr>
+        <p:txBody>
+          <a:bodyPr wrap="square" rtlCol="0">
+            <a:spAutoFit/>
+          </a:bodyPr>
+          <a:lstStyle/>
+          <a:p>
+            <a:r>
+              <a:rPr lang="en-US" sz="2000" dirty="0"/>
+              <a:t>@dc@social.advancedsoftware.engineering</a:t>
+            </a:r>
+          </a:p>
+        </p:txBody>
+      </p:sp>
+    </p:spTree>
+    <p:extLst>
+      <p:ext uri="{BB962C8B-B14F-4D97-AF65-F5344CB8AC3E}">
+        <p14:creationId xmlns:p14="http://schemas.microsoft.com/office/powerpoint/2010/main" val="4124308893"/>
+      </p:ext>
+    </p:extLst>
+  </p:cSld>
+  <p:clrMapOvr>
+    <a:masterClrMapping/>
+  </p:clrMapOvr>
+</p:sld>
+</file>
+
+<file path=ppt/slides/slide3.xml><?xml version="1.0" encoding="utf-8"?>
+<p:sld xmlns:a="http://schemas.openxmlformats.org/drawingml/2006/main" xmlns:r="http://schemas.openxmlformats.org/officeDocument/2006/relationships" xmlns:p="http://schemas.openxmlformats.org/presentationml/2006/main">
+  <p:cSld>
+    <p:spTree>
+      <p:nvGrpSpPr>
+        <p:cNvPr id="1" name=""/>
+        <p:cNvGrpSpPr/>
+        <p:nvPr/>
+      </p:nvGrpSpPr>
+      <p:grpSpPr>
+        <a:xfrm>
+          <a:off x="0" y="0"/>
+          <a:ext cx="0" cy="0"/>
+          <a:chOff x="0" y="0"/>
+          <a:chExt cx="0" cy="0"/>
+        </a:xfrm>
+      </p:grpSpPr>
+      <p:sp>
+        <p:nvSpPr>
+          <p:cNvPr id="2" name="Title 1">
+            <a:extLst>
+              <a:ext uri="{FF2B5EF4-FFF2-40B4-BE49-F238E27FC236}">
+                <a16:creationId xmlns:a16="http://schemas.microsoft.com/office/drawing/2014/main" id="{7306C212-B3B4-8E92-B9B3-B626EF37EBA4}"/>
+              </a:ext>
+            </a:extLst>
+          </p:cNvPr>
+          <p:cNvSpPr txBox="1">
+            <a:spLocks noGrp="1"/>
+          </p:cNvSpPr>
+          <p:nvPr>
+            <p:ph type="title" idx="4294967295"/>
+          </p:nvPr>
+        </p:nvSpPr>
+        <p:spPr>
+          <a:xfrm>
+            <a:off x="1061794" y="2828836"/>
+            <a:ext cx="10068412" cy="1200329"/>
+          </a:xfrm>
+          <a:prstGeom prst="rect">
+            <a:avLst/>
+          </a:prstGeom>
+          <a:noFill/>
+          <a:ln>
+            <a:noFill/>
+            <a:prstDash/>
+          </a:ln>
+          <a:effectLst/>
+        </p:spPr>
+        <p:txBody>
+          <a:bodyPr rot="0" spcFirstLastPara="0" vertOverflow="overflow" horzOverflow="overflow" vert="horz" wrap="square" lIns="91440" tIns="45720" rIns="91440" bIns="45720" numCol="1" spcCol="0" rtlCol="0" fromWordArt="0" anchor="t" anchorCtr="0" forceAA="0" compatLnSpc="1">
+            <a:prstTxWarp prst="textNoShape">
+              <a:avLst/>
+            </a:prstTxWarp>
+            <a:spAutoFit/>
+          </a:bodyPr>
+          <a:lstStyle/>
+          <a:p>
+            <a:pPr marL="0" marR="0" lvl="0" indent="0" algn="ctr" defTabSz="457200" rtl="0" eaLnBrk="1" fontAlgn="auto" latinLnBrk="0" hangingPunct="1">
+              <a:lnSpc>
+                <a:spcPct val="100000"/>
+              </a:lnSpc>
+              <a:spcBef>
+                <a:spcPts val="0"/>
+              </a:spcBef>
+              <a:spcAft>
+                <a:spcPts val="0"/>
+              </a:spcAft>
+              <a:buClrTx/>
+              <a:buSzTx/>
+              <a:buFontTx/>
+              <a:buNone/>
+              <a:tabLst/>
+              <a:defRPr/>
+            </a:pPr>
+            <a:r>
+              <a:rPr kumimoji="0" lang="en-US" sz="7200" b="0" i="0" u="none" strike="noStrike" kern="1200" cap="none" spc="0" normalizeH="0" baseline="0" noProof="0" dirty="0">
+                <a:ln>
+                  <a:noFill/>
+                </a:ln>
+                <a:solidFill>
+                  <a:schemeClr val="tx1"/>
+                </a:solidFill>
+                <a:effectLst/>
+                <a:uLnTx/>
+                <a:uFillTx/>
+                <a:latin typeface="+mn-lt"/>
+                <a:ea typeface="+mn-ea"/>
+                <a:cs typeface="+mn-cs"/>
+              </a:rPr>
+              <a:t>Functions</a:t>
+            </a:r>
+          </a:p>
+        </p:txBody>
+      </p:sp>
+    </p:spTree>
+    <p:extLst>
+      <p:ext uri="{BB962C8B-B14F-4D97-AF65-F5344CB8AC3E}">
+        <p14:creationId xmlns:p14="http://schemas.microsoft.com/office/powerpoint/2010/main" val="3118502767"/>
+      </p:ext>
+    </p:extLst>
+  </p:cSld>
+  <p:clrMapOvr>
+    <a:masterClrMapping/>
+  </p:clrMapOvr>
+</p:sld>
+</file>
+
+<file path=ppt/slides/slide4.xml><?xml version="1.0" encoding="utf-8"?>
+<p:sld xmlns:a="http://schemas.openxmlformats.org/drawingml/2006/main" xmlns:r="http://schemas.openxmlformats.org/officeDocument/2006/relationships" xmlns:p="http://schemas.openxmlformats.org/presentationml/2006/main">
+  <p:cSld>
+    <p:spTree>
+      <p:nvGrpSpPr>
+        <p:cNvPr id="1" name=""/>
+        <p:cNvGrpSpPr/>
+        <p:nvPr/>
+      </p:nvGrpSpPr>
+      <p:grpSpPr>
+        <a:xfrm>
+          <a:off x="0" y="0"/>
+          <a:ext cx="0" cy="0"/>
+          <a:chOff x="0" y="0"/>
+          <a:chExt cx="0" cy="0"/>
+        </a:xfrm>
+      </p:grpSpPr>
+      <p:sp>
+        <p:nvSpPr>
+          <p:cNvPr id="2" name="Title 1">
+            <a:extLst>
+              <a:ext uri="{FF2B5EF4-FFF2-40B4-BE49-F238E27FC236}">
+                <a16:creationId xmlns:a16="http://schemas.microsoft.com/office/drawing/2014/main" id="{9F0A4C3A-80AE-E3A6-471D-A74E63C90618}"/>
+              </a:ext>
+            </a:extLst>
+          </p:cNvPr>
+          <p:cNvSpPr>
+            <a:spLocks noGrp="1"/>
+          </p:cNvSpPr>
+          <p:nvPr>
+            <p:ph type="title"/>
+          </p:nvPr>
+        </p:nvSpPr>
+        <p:spPr/>
+        <p:txBody>
+          <a:bodyPr/>
+          <a:lstStyle/>
+          <a:p>
+            <a:r>
+              <a:rPr lang="en-US" dirty="0"/>
+              <a:t>Functions</a:t>
+            </a:r>
+            <a:br>
+              <a:rPr lang="en-US" dirty="0"/>
+            </a:br>
+            <a:r>
+              <a:rPr lang="en-US" dirty="0"/>
+              <a:t>First-order functions</a:t>
+            </a:r>
+          </a:p>
+        </p:txBody>
+      </p:sp>
+      <p:sp>
+        <p:nvSpPr>
+          <p:cNvPr id="3" name="Content Placeholder 2">
+            <a:extLst>
+              <a:ext uri="{FF2B5EF4-FFF2-40B4-BE49-F238E27FC236}">
+                <a16:creationId xmlns:a16="http://schemas.microsoft.com/office/drawing/2014/main" id="{519D56E3-2B90-2A3B-E384-D45FBDF93A21}"/>
+              </a:ext>
+            </a:extLst>
+          </p:cNvPr>
+          <p:cNvSpPr>
+            <a:spLocks noGrp="1"/>
+          </p:cNvSpPr>
+          <p:nvPr>
+            <p:ph idx="1"/>
+          </p:nvPr>
+        </p:nvSpPr>
+        <p:spPr/>
+        <p:txBody>
+          <a:bodyPr/>
+          <a:lstStyle/>
+          <a:p>
+            <a:endParaRPr lang="en-US" dirty="0"/>
+          </a:p>
+        </p:txBody>
+      </p:sp>
+    </p:spTree>
+    <p:extLst>
+      <p:ext uri="{BB962C8B-B14F-4D97-AF65-F5344CB8AC3E}">
+        <p14:creationId xmlns:p14="http://schemas.microsoft.com/office/powerpoint/2010/main" val="1001714058"/>
+      </p:ext>
+    </p:extLst>
+  </p:cSld>
+  <p:clrMapOvr>
+    <a:masterClrMapping/>
+  </p:clrMapOvr>
+</p:sld>
+</file>
+
+<file path=ppt/slides/slide5.xml><?xml version="1.0" encoding="utf-8"?>
+<p:sld xmlns:a="http://schemas.openxmlformats.org/drawingml/2006/main" xmlns:r="http://schemas.openxmlformats.org/officeDocument/2006/relationships" xmlns:p="http://schemas.openxmlformats.org/presentationml/2006/main">
+  <p:cSld>
+    <p:spTree>
+      <p:nvGrpSpPr>
+        <p:cNvPr id="1" name=""/>
+        <p:cNvGrpSpPr/>
+        <p:nvPr/>
+      </p:nvGrpSpPr>
+      <p:grpSpPr>
+        <a:xfrm>
+          <a:off x="0" y="0"/>
+          <a:ext cx="0" cy="0"/>
+          <a:chOff x="0" y="0"/>
+          <a:chExt cx="0" cy="0"/>
+        </a:xfrm>
+      </p:grpSpPr>
+      <p:sp>
+        <p:nvSpPr>
+          <p:cNvPr id="2" name="Title 1">
+            <a:extLst>
+              <a:ext uri="{FF2B5EF4-FFF2-40B4-BE49-F238E27FC236}">
+                <a16:creationId xmlns:a16="http://schemas.microsoft.com/office/drawing/2014/main" id="{9F0A4C3A-80AE-E3A6-471D-A74E63C90618}"/>
+              </a:ext>
+            </a:extLst>
+          </p:cNvPr>
+          <p:cNvSpPr>
+            <a:spLocks noGrp="1"/>
+          </p:cNvSpPr>
+          <p:nvPr>
+            <p:ph type="title"/>
+          </p:nvPr>
+        </p:nvSpPr>
+        <p:spPr/>
+        <p:txBody>
+          <a:bodyPr/>
+          <a:lstStyle/>
+          <a:p>
+            <a:r>
+              <a:rPr lang="en-US" dirty="0"/>
+              <a:t>Functions</a:t>
+            </a:r>
+            <a:br>
+              <a:rPr lang="en-US" dirty="0"/>
+            </a:br>
+            <a:r>
+              <a:rPr lang="en-US" dirty="0"/>
+              <a:t>Higher-order functions (HOF)</a:t>
+            </a:r>
+          </a:p>
+        </p:txBody>
+      </p:sp>
+      <p:sp>
+        <p:nvSpPr>
+          <p:cNvPr id="3" name="Content Placeholder 2">
+            <a:extLst>
+              <a:ext uri="{FF2B5EF4-FFF2-40B4-BE49-F238E27FC236}">
+                <a16:creationId xmlns:a16="http://schemas.microsoft.com/office/drawing/2014/main" id="{519D56E3-2B90-2A3B-E384-D45FBDF93A21}"/>
+              </a:ext>
+            </a:extLst>
+          </p:cNvPr>
+          <p:cNvSpPr>
+            <a:spLocks noGrp="1"/>
+          </p:cNvSpPr>
+          <p:nvPr>
+            <p:ph idx="1"/>
+          </p:nvPr>
+        </p:nvSpPr>
+        <p:spPr/>
+        <p:txBody>
+          <a:bodyPr/>
+          <a:lstStyle/>
+          <a:p>
+            <a:endParaRPr lang="en-US" dirty="0"/>
+          </a:p>
+        </p:txBody>
+      </p:sp>
+    </p:spTree>
+    <p:extLst>
+      <p:ext uri="{BB962C8B-B14F-4D97-AF65-F5344CB8AC3E}">
+        <p14:creationId xmlns:p14="http://schemas.microsoft.com/office/powerpoint/2010/main" val="1649357024"/>
+      </p:ext>
+    </p:extLst>
+  </p:cSld>
+  <p:clrMapOvr>
+    <a:masterClrMapping/>
+  </p:clrMapOvr>
+</p:sld>
+</file>
+
+<file path=ppt/slides/slide6.xml><?xml version="1.0" encoding="utf-8"?>
+<p:sld xmlns:a="http://schemas.openxmlformats.org/drawingml/2006/main" xmlns:r="http://schemas.openxmlformats.org/officeDocument/2006/relationships" xmlns:p="http://schemas.openxmlformats.org/presentationml/2006/main">
+  <p:cSld>
+    <p:spTree>
+      <p:nvGrpSpPr>
+        <p:cNvPr id="1" name=""/>
+        <p:cNvGrpSpPr/>
+        <p:nvPr/>
+      </p:nvGrpSpPr>
+      <p:grpSpPr>
+        <a:xfrm>
+          <a:off x="0" y="0"/>
+          <a:ext cx="0" cy="0"/>
+          <a:chOff x="0" y="0"/>
+          <a:chExt cx="0" cy="0"/>
+        </a:xfrm>
+      </p:grpSpPr>
+      <p:sp>
+        <p:nvSpPr>
+          <p:cNvPr id="2" name="Title 1">
+            <a:extLst>
+              <a:ext uri="{FF2B5EF4-FFF2-40B4-BE49-F238E27FC236}">
+                <a16:creationId xmlns:a16="http://schemas.microsoft.com/office/drawing/2014/main" id="{9F0A4C3A-80AE-E3A6-471D-A74E63C90618}"/>
+              </a:ext>
+            </a:extLst>
+          </p:cNvPr>
+          <p:cNvSpPr>
+            <a:spLocks noGrp="1"/>
+          </p:cNvSpPr>
+          <p:nvPr>
+            <p:ph type="title"/>
+          </p:nvPr>
+        </p:nvSpPr>
+        <p:spPr/>
+        <p:txBody>
+          <a:bodyPr/>
+          <a:lstStyle/>
+          <a:p>
+            <a:r>
+              <a:rPr lang="en-US" dirty="0"/>
+              <a:t>Functions</a:t>
+            </a:r>
+            <a:br>
+              <a:rPr lang="en-US" dirty="0"/>
+            </a:br>
+            <a:r>
+              <a:rPr lang="en-US" dirty="0"/>
+              <a:t>Pure functions</a:t>
+            </a:r>
+          </a:p>
+        </p:txBody>
+      </p:sp>
+      <p:sp>
+        <p:nvSpPr>
+          <p:cNvPr id="3" name="Content Placeholder 2">
+            <a:extLst>
+              <a:ext uri="{FF2B5EF4-FFF2-40B4-BE49-F238E27FC236}">
+                <a16:creationId xmlns:a16="http://schemas.microsoft.com/office/drawing/2014/main" id="{519D56E3-2B90-2A3B-E384-D45FBDF93A21}"/>
+              </a:ext>
+            </a:extLst>
+          </p:cNvPr>
+          <p:cNvSpPr>
+            <a:spLocks noGrp="1"/>
+          </p:cNvSpPr>
+          <p:nvPr>
+            <p:ph idx="1"/>
+          </p:nvPr>
+        </p:nvSpPr>
+        <p:spPr/>
+        <p:txBody>
+          <a:bodyPr/>
+          <a:lstStyle/>
+          <a:p>
+            <a:endParaRPr lang="en-US" dirty="0"/>
+          </a:p>
+        </p:txBody>
+      </p:sp>
+    </p:spTree>
+    <p:extLst>
+      <p:ext uri="{BB962C8B-B14F-4D97-AF65-F5344CB8AC3E}">
+        <p14:creationId xmlns:p14="http://schemas.microsoft.com/office/powerpoint/2010/main" val="3845697661"/>
+      </p:ext>
+    </p:extLst>
+  </p:cSld>
+  <p:clrMapOvr>
+    <a:masterClrMapping/>
+  </p:clrMapOvr>
+</p:sld>
+</file>
+
+<file path=ppt/slides/slide7.xml><?xml version="1.0" encoding="utf-8"?>
+<p:sld xmlns:a="http://schemas.openxmlformats.org/drawingml/2006/main" xmlns:r="http://schemas.openxmlformats.org/officeDocument/2006/relationships" xmlns:p="http://schemas.openxmlformats.org/presentationml/2006/main">
+  <p:cSld>
+    <p:spTree>
+      <p:nvGrpSpPr>
+        <p:cNvPr id="1" name=""/>
+        <p:cNvGrpSpPr/>
+        <p:nvPr/>
+      </p:nvGrpSpPr>
+      <p:grpSpPr>
+        <a:xfrm>
+          <a:off x="0" y="0"/>
+          <a:ext cx="0" cy="0"/>
+          <a:chOff x="0" y="0"/>
+          <a:chExt cx="0" cy="0"/>
+        </a:xfrm>
+      </p:grpSpPr>
+      <p:sp>
+        <p:nvSpPr>
+          <p:cNvPr id="2" name="Title 1">
+            <a:extLst>
+              <a:ext uri="{FF2B5EF4-FFF2-40B4-BE49-F238E27FC236}">
+                <a16:creationId xmlns:a16="http://schemas.microsoft.com/office/drawing/2014/main" id="{7306C212-B3B4-8E92-B9B3-B626EF37EBA4}"/>
+              </a:ext>
+            </a:extLst>
+          </p:cNvPr>
+          <p:cNvSpPr txBox="1">
+            <a:spLocks noGrp="1"/>
+          </p:cNvSpPr>
+          <p:nvPr>
+            <p:ph type="title" idx="4294967295"/>
+          </p:nvPr>
+        </p:nvSpPr>
+        <p:spPr>
+          <a:xfrm>
+            <a:off x="1061794" y="2274838"/>
+            <a:ext cx="10068412" cy="2308324"/>
+          </a:xfrm>
+          <a:prstGeom prst="rect">
+            <a:avLst/>
+          </a:prstGeom>
+          <a:noFill/>
+          <a:ln>
+            <a:noFill/>
+            <a:prstDash/>
+          </a:ln>
+          <a:effectLst/>
+        </p:spPr>
+        <p:txBody>
+          <a:bodyPr rot="0" spcFirstLastPara="0" vertOverflow="overflow" horzOverflow="overflow" vert="horz" wrap="square" lIns="91440" tIns="45720" rIns="91440" bIns="45720" numCol="1" spcCol="0" rtlCol="0" fromWordArt="0" anchor="t" anchorCtr="0" forceAA="0" compatLnSpc="1">
+            <a:prstTxWarp prst="textNoShape">
+              <a:avLst/>
+            </a:prstTxWarp>
+            <a:spAutoFit/>
+          </a:bodyPr>
+          <a:lstStyle/>
+          <a:p>
+            <a:pPr marL="0" marR="0" lvl="0" indent="0" algn="ctr" defTabSz="457200" rtl="0" eaLnBrk="1" fontAlgn="auto" latinLnBrk="0" hangingPunct="1">
+              <a:lnSpc>
+                <a:spcPct val="100000"/>
+              </a:lnSpc>
+              <a:spcBef>
+                <a:spcPts val="0"/>
+              </a:spcBef>
+              <a:spcAft>
+                <a:spcPts val="0"/>
+              </a:spcAft>
+              <a:buClrTx/>
+              <a:buSzTx/>
+              <a:buFontTx/>
+              <a:buNone/>
+              <a:tabLst/>
+              <a:defRPr/>
+            </a:pPr>
+            <a:r>
+              <a:rPr kumimoji="0" lang="en-US" sz="7200" b="0" i="0" u="none" strike="noStrike" kern="1200" cap="none" spc="0" normalizeH="0" baseline="0" noProof="0" dirty="0">
+                <a:ln>
+                  <a:noFill/>
+                </a:ln>
+                <a:solidFill>
+                  <a:schemeClr val="tx1"/>
+                </a:solidFill>
+                <a:effectLst/>
+                <a:uLnTx/>
+                <a:uFillTx/>
+                <a:latin typeface="+mn-lt"/>
+                <a:ea typeface="+mn-ea"/>
+                <a:cs typeface="+mn-cs"/>
+              </a:rPr>
+              <a:t>Functional programming</a:t>
+            </a:r>
+          </a:p>
+        </p:txBody>
+      </p:sp>
+    </p:spTree>
+    <p:extLst>
+      <p:ext uri="{BB962C8B-B14F-4D97-AF65-F5344CB8AC3E}">
+        <p14:creationId xmlns:p14="http://schemas.microsoft.com/office/powerpoint/2010/main" val="3310324046"/>
+      </p:ext>
+    </p:extLst>
+  </p:cSld>
+  <p:clrMapOvr>
+    <a:masterClrMapping/>
+  </p:clrMapOvr>
+</p:sld>
+</file>
+
+<file path=ppt/slides/slide8.xml><?xml version="1.0" encoding="utf-8"?>
+<p:sld xmlns:a="http://schemas.openxmlformats.org/drawingml/2006/main" xmlns:r="http://schemas.openxmlformats.org/officeDocument/2006/relationships" xmlns:p="http://schemas.openxmlformats.org/presentationml/2006/main">
+  <p:cSld>
+    <p:spTree>
+      <p:nvGrpSpPr>
+        <p:cNvPr id="1" name=""/>
+        <p:cNvGrpSpPr/>
+        <p:nvPr/>
+      </p:nvGrpSpPr>
+      <p:grpSpPr>
+        <a:xfrm>
+          <a:off x="0" y="0"/>
+          <a:ext cx="0" cy="0"/>
+          <a:chOff x="0" y="0"/>
+          <a:chExt cx="0" cy="0"/>
+        </a:xfrm>
+      </p:grpSpPr>
+      <p:sp>
+        <p:nvSpPr>
+          <p:cNvPr id="2" name="Title 1">
+            <a:extLst>
+              <a:ext uri="{FF2B5EF4-FFF2-40B4-BE49-F238E27FC236}">
+                <a16:creationId xmlns:a16="http://schemas.microsoft.com/office/drawing/2014/main" id="{9F0A4C3A-80AE-E3A6-471D-A74E63C90618}"/>
+              </a:ext>
+            </a:extLst>
+          </p:cNvPr>
+          <p:cNvSpPr>
+            <a:spLocks noGrp="1"/>
+          </p:cNvSpPr>
+          <p:nvPr>
+            <p:ph type="title"/>
+          </p:nvPr>
+        </p:nvSpPr>
+        <p:spPr/>
+        <p:txBody>
+          <a:bodyPr/>
+          <a:lstStyle/>
+          <a:p>
+            <a:r>
+              <a:rPr lang="en-US" dirty="0"/>
+              <a:t>Functional programming (FP)</a:t>
+            </a:r>
+            <a:br>
+              <a:rPr lang="en-US" dirty="0"/>
+            </a:br>
+            <a:r>
+              <a:rPr lang="en-US" dirty="0"/>
+              <a:t>Definition</a:t>
+            </a:r>
+          </a:p>
+        </p:txBody>
+      </p:sp>
+      <p:sp>
+        <p:nvSpPr>
+          <p:cNvPr id="3" name="Content Placeholder 2">
+            <a:extLst>
+              <a:ext uri="{FF2B5EF4-FFF2-40B4-BE49-F238E27FC236}">
+                <a16:creationId xmlns:a16="http://schemas.microsoft.com/office/drawing/2014/main" id="{519D56E3-2B90-2A3B-E384-D45FBDF93A21}"/>
+              </a:ext>
+            </a:extLst>
+          </p:cNvPr>
+          <p:cNvSpPr>
+            <a:spLocks noGrp="1"/>
+          </p:cNvSpPr>
+          <p:nvPr>
+            <p:ph idx="1"/>
+          </p:nvPr>
+        </p:nvSpPr>
+        <p:spPr/>
+        <p:txBody>
+          <a:bodyPr/>
+          <a:lstStyle/>
+          <a:p>
+            <a:endParaRPr lang="en-US" dirty="0"/>
+          </a:p>
+        </p:txBody>
+      </p:sp>
+    </p:spTree>
+    <p:extLst>
+      <p:ext uri="{BB962C8B-B14F-4D97-AF65-F5344CB8AC3E}">
+        <p14:creationId xmlns:p14="http://schemas.microsoft.com/office/powerpoint/2010/main" val="98042496"/>
+      </p:ext>
+    </p:extLst>
+  </p:cSld>
+  <p:clrMapOvr>
+    <a:masterClrMapping/>
+  </p:clrMapOvr>
+</p:sld>
+</file>
+
+<file path=ppt/slides/slide9.xml><?xml version="1.0" encoding="utf-8"?>
+<p:sld xmlns:a="http://schemas.openxmlformats.org/drawingml/2006/main" xmlns:r="http://schemas.openxmlformats.org/officeDocument/2006/relationships" xmlns:p="http://schemas.openxmlformats.org/presentationml/2006/main">
+  <p:cSld>
+    <p:spTree>
+      <p:nvGrpSpPr>
+        <p:cNvPr id="1" name=""/>
+        <p:cNvGrpSpPr/>
+        <p:nvPr/>
+      </p:nvGrpSpPr>
+      <p:grpSpPr>
+        <a:xfrm>
+          <a:off x="0" y="0"/>
+          <a:ext cx="0" cy="0"/>
+          <a:chOff x="0" y="0"/>
+          <a:chExt cx="0" cy="0"/>
+        </a:xfrm>
+      </p:grpSpPr>
+      <p:sp>
+        <p:nvSpPr>
+          <p:cNvPr id="2" name="Title 1">
+            <a:extLst>
+              <a:ext uri="{FF2B5EF4-FFF2-40B4-BE49-F238E27FC236}">
+                <a16:creationId xmlns:a16="http://schemas.microsoft.com/office/drawing/2014/main" id="{9F0A4C3A-80AE-E3A6-471D-A74E63C90618}"/>
+              </a:ext>
+            </a:extLst>
+          </p:cNvPr>
+          <p:cNvSpPr>
+            <a:spLocks noGrp="1"/>
+          </p:cNvSpPr>
+          <p:nvPr>
+            <p:ph type="title"/>
+          </p:nvPr>
+        </p:nvSpPr>
+        <p:spPr/>
+        <p:txBody>
+          <a:bodyPr/>
+          <a:lstStyle/>
+          <a:p>
+            <a:r>
+              <a:rPr lang="en-US" dirty="0"/>
+              <a:t>Functional programming (FP)</a:t>
+            </a:r>
+            <a:br>
+              <a:rPr lang="en-US" dirty="0"/>
+            </a:br>
+            <a:r>
+              <a:rPr lang="en-US" dirty="0"/>
+              <a:t>Pattern matching</a:t>
+            </a:r>
+          </a:p>
+        </p:txBody>
+      </p:sp>
+      <p:sp>
+        <p:nvSpPr>
+          <p:cNvPr id="3" name="Content Placeholder 2">
+            <a:extLst>
+              <a:ext uri="{FF2B5EF4-FFF2-40B4-BE49-F238E27FC236}">
+                <a16:creationId xmlns:a16="http://schemas.microsoft.com/office/drawing/2014/main" id="{519D56E3-2B90-2A3B-E384-D45FBDF93A21}"/>
+              </a:ext>
+            </a:extLst>
+          </p:cNvPr>
+          <p:cNvSpPr>
+            <a:spLocks noGrp="1"/>
+          </p:cNvSpPr>
+          <p:nvPr>
+            <p:ph idx="1"/>
+          </p:nvPr>
+        </p:nvSpPr>
+        <p:spPr/>
+        <p:txBody>
+          <a:bodyPr/>
+          <a:lstStyle/>
+          <a:p>
+            <a:endParaRPr lang="en-US" dirty="0"/>
+          </a:p>
+        </p:txBody>
+      </p:sp>
+    </p:spTree>
+    <p:extLst>
+      <p:ext uri="{BB962C8B-B14F-4D97-AF65-F5344CB8AC3E}">
+        <p14:creationId xmlns:p14="http://schemas.microsoft.com/office/powerpoint/2010/main" val="2815264430"/>
+      </p:ext>
+    </p:extLst>
+  </p:cSld>
+  <p:clrMapOvr>
+    <a:masterClrMapping/>
+  </p:clrMapOvr>
+</p:sld>
+</file>
+
 <file path=ppt/theme/theme1.xml><?xml version="1.0" encoding="utf-8"?>
 <a:theme xmlns:a="http://schemas.openxmlformats.org/drawingml/2006/main" name="Ion">
   <a:themeElements>

</xml_diff>

<commit_message>
Added a few (halfbaked) slides about functions
</commit_message>
<xml_diff>
--- a/doc/Introduction to FP with C#.pptx
+++ b/doc/Introduction to FP with C#.pptx
@@ -7,24 +7,29 @@
   <p:sldIdLst>
     <p:sldId id="256" r:id="rId2"/>
     <p:sldId id="257" r:id="rId3"/>
-    <p:sldId id="297" r:id="rId4"/>
-    <p:sldId id="298" r:id="rId5"/>
-    <p:sldId id="299" r:id="rId6"/>
-    <p:sldId id="300" r:id="rId7"/>
-    <p:sldId id="293" r:id="rId8"/>
-    <p:sldId id="301" r:id="rId9"/>
-    <p:sldId id="302" r:id="rId10"/>
-    <p:sldId id="296" r:id="rId11"/>
-    <p:sldId id="295" r:id="rId12"/>
-    <p:sldId id="292" r:id="rId13"/>
-    <p:sldId id="307" r:id="rId14"/>
-    <p:sldId id="303" r:id="rId15"/>
-    <p:sldId id="294" r:id="rId16"/>
-    <p:sldId id="304" r:id="rId17"/>
-    <p:sldId id="305" r:id="rId18"/>
-    <p:sldId id="306" r:id="rId19"/>
-    <p:sldId id="284" r:id="rId20"/>
-    <p:sldId id="285" r:id="rId21"/>
+    <p:sldId id="308" r:id="rId4"/>
+    <p:sldId id="297" r:id="rId5"/>
+    <p:sldId id="298" r:id="rId6"/>
+    <p:sldId id="299" r:id="rId7"/>
+    <p:sldId id="309" r:id="rId8"/>
+    <p:sldId id="300" r:id="rId9"/>
+    <p:sldId id="310" r:id="rId10"/>
+    <p:sldId id="311" r:id="rId11"/>
+    <p:sldId id="312" r:id="rId12"/>
+    <p:sldId id="293" r:id="rId13"/>
+    <p:sldId id="301" r:id="rId14"/>
+    <p:sldId id="302" r:id="rId15"/>
+    <p:sldId id="296" r:id="rId16"/>
+    <p:sldId id="295" r:id="rId17"/>
+    <p:sldId id="292" r:id="rId18"/>
+    <p:sldId id="307" r:id="rId19"/>
+    <p:sldId id="303" r:id="rId20"/>
+    <p:sldId id="294" r:id="rId21"/>
+    <p:sldId id="304" r:id="rId22"/>
+    <p:sldId id="305" r:id="rId23"/>
+    <p:sldId id="306" r:id="rId24"/>
+    <p:sldId id="284" r:id="rId25"/>
+    <p:sldId id="285" r:id="rId26"/>
   </p:sldIdLst>
   <p:sldSz cx="12192000" cy="6858000"/>
   <p:notesSz cx="6858000" cy="9144000"/>
@@ -6777,74 +6782,60 @@
           <p:cNvPr id="2" name="Title 1">
             <a:extLst>
               <a:ext uri="{FF2B5EF4-FFF2-40B4-BE49-F238E27FC236}">
-                <a16:creationId xmlns:a16="http://schemas.microsoft.com/office/drawing/2014/main" id="{7306C212-B3B4-8E92-B9B3-B626EF37EBA4}"/>
+                <a16:creationId xmlns:a16="http://schemas.microsoft.com/office/drawing/2014/main" id="{9F0A4C3A-80AE-E3A6-471D-A74E63C90618}"/>
               </a:ext>
             </a:extLst>
           </p:cNvPr>
-          <p:cNvSpPr txBox="1">
-            <a:spLocks noGrp="1"/>
-          </p:cNvSpPr>
-          <p:nvPr>
-            <p:ph type="title" idx="4294967295"/>
-          </p:nvPr>
-        </p:nvSpPr>
-        <p:spPr>
-          <a:xfrm>
-            <a:off x="1061794" y="2828836"/>
-            <a:ext cx="10068412" cy="1200329"/>
-          </a:xfrm>
-          <a:prstGeom prst="rect">
-            <a:avLst/>
-          </a:prstGeom>
-          <a:noFill/>
-          <a:ln>
-            <a:noFill/>
-            <a:prstDash/>
-          </a:ln>
-          <a:effectLst/>
-        </p:spPr>
-        <p:txBody>
-          <a:bodyPr rot="0" spcFirstLastPara="0" vertOverflow="overflow" horzOverflow="overflow" vert="horz" wrap="square" lIns="91440" tIns="45720" rIns="91440" bIns="45720" numCol="1" spcCol="0" rtlCol="0" fromWordArt="0" anchor="t" anchorCtr="0" forceAA="0" compatLnSpc="1">
-            <a:prstTxWarp prst="textNoShape">
-              <a:avLst/>
-            </a:prstTxWarp>
-            <a:spAutoFit/>
-          </a:bodyPr>
+          <p:cNvSpPr>
+            <a:spLocks noGrp="1"/>
+          </p:cNvSpPr>
+          <p:nvPr>
+            <p:ph type="title"/>
+          </p:nvPr>
+        </p:nvSpPr>
+        <p:spPr/>
+        <p:txBody>
+          <a:bodyPr/>
           <a:lstStyle/>
           <a:p>
-            <a:pPr marL="0" marR="0" lvl="0" indent="0" algn="ctr" defTabSz="457200" rtl="0" eaLnBrk="1" fontAlgn="auto" latinLnBrk="0" hangingPunct="1">
-              <a:lnSpc>
-                <a:spcPct val="100000"/>
-              </a:lnSpc>
-              <a:spcBef>
-                <a:spcPts val="0"/>
-              </a:spcBef>
-              <a:spcAft>
-                <a:spcPts val="0"/>
-              </a:spcAft>
-              <a:buClrTx/>
-              <a:buSzTx/>
-              <a:buFontTx/>
-              <a:buNone/>
-              <a:tabLst/>
-              <a:defRPr/>
-            </a:pPr>
-            <a:r>
-              <a:rPr kumimoji="0" lang="en-US" sz="7200" b="0" i="0" u="none" strike="noStrike" kern="1200" cap="none" spc="0" normalizeH="0" baseline="0" noProof="0" dirty="0">
-                <a:ln>
-                  <a:noFill/>
-                </a:ln>
-                <a:solidFill>
-                  <a:schemeClr val="tx1"/>
-                </a:solidFill>
-                <a:effectLst/>
-                <a:uLnTx/>
-                <a:uFillTx/>
-                <a:latin typeface="+mn-lt"/>
-                <a:ea typeface="+mn-ea"/>
-                <a:cs typeface="+mn-cs"/>
-              </a:rPr>
-              <a:t>Closures</a:t>
+            <a:r>
+              <a:rPr lang="en-US" dirty="0"/>
+              <a:t>Pure functions</a:t>
+            </a:r>
+            <a:br>
+              <a:rPr lang="en-US" dirty="0"/>
+            </a:br>
+            <a:r>
+              <a:rPr lang="en-US" dirty="0"/>
+              <a:t>Why are exceptions side effects?</a:t>
+            </a:r>
+          </a:p>
+        </p:txBody>
+      </p:sp>
+      <p:sp>
+        <p:nvSpPr>
+          <p:cNvPr id="3" name="Content Placeholder 2">
+            <a:extLst>
+              <a:ext uri="{FF2B5EF4-FFF2-40B4-BE49-F238E27FC236}">
+                <a16:creationId xmlns:a16="http://schemas.microsoft.com/office/drawing/2014/main" id="{519D56E3-2B90-2A3B-E384-D45FBDF93A21}"/>
+              </a:ext>
+            </a:extLst>
+          </p:cNvPr>
+          <p:cNvSpPr>
+            <a:spLocks noGrp="1"/>
+          </p:cNvSpPr>
+          <p:nvPr>
+            <p:ph idx="1"/>
+          </p:nvPr>
+        </p:nvSpPr>
+        <p:spPr/>
+        <p:txBody>
+          <a:bodyPr/>
+          <a:lstStyle/>
+          <a:p>
+            <a:r>
+              <a:rPr lang="en-US" dirty="0"/>
+              <a:t>…</a:t>
             </a:r>
           </a:p>
         </p:txBody>
@@ -6852,7 +6843,7 @@
     </p:spTree>
     <p:extLst>
       <p:ext uri="{BB962C8B-B14F-4D97-AF65-F5344CB8AC3E}">
-        <p14:creationId xmlns:p14="http://schemas.microsoft.com/office/powerpoint/2010/main" val="2815984157"/>
+        <p14:creationId xmlns:p14="http://schemas.microsoft.com/office/powerpoint/2010/main" val="256826621"/>
       </p:ext>
     </p:extLst>
   </p:cSld>
@@ -6884,74 +6875,60 @@
           <p:cNvPr id="2" name="Title 1">
             <a:extLst>
               <a:ext uri="{FF2B5EF4-FFF2-40B4-BE49-F238E27FC236}">
-                <a16:creationId xmlns:a16="http://schemas.microsoft.com/office/drawing/2014/main" id="{7306C212-B3B4-8E92-B9B3-B626EF37EBA4}"/>
+                <a16:creationId xmlns:a16="http://schemas.microsoft.com/office/drawing/2014/main" id="{9F0A4C3A-80AE-E3A6-471D-A74E63C90618}"/>
               </a:ext>
             </a:extLst>
           </p:cNvPr>
-          <p:cNvSpPr txBox="1">
-            <a:spLocks noGrp="1"/>
-          </p:cNvSpPr>
-          <p:nvPr>
-            <p:ph type="title" idx="4294967295"/>
-          </p:nvPr>
-        </p:nvSpPr>
-        <p:spPr>
-          <a:xfrm>
-            <a:off x="1061794" y="2828836"/>
-            <a:ext cx="10068412" cy="1200329"/>
-          </a:xfrm>
-          <a:prstGeom prst="rect">
-            <a:avLst/>
-          </a:prstGeom>
-          <a:noFill/>
-          <a:ln>
-            <a:noFill/>
-            <a:prstDash/>
-          </a:ln>
-          <a:effectLst/>
-        </p:spPr>
-        <p:txBody>
-          <a:bodyPr rot="0" spcFirstLastPara="0" vertOverflow="overflow" horzOverflow="overflow" vert="horz" wrap="square" lIns="91440" tIns="45720" rIns="91440" bIns="45720" numCol="1" spcCol="0" rtlCol="0" fromWordArt="0" anchor="t" anchorCtr="0" forceAA="0" compatLnSpc="1">
-            <a:prstTxWarp prst="textNoShape">
-              <a:avLst/>
-            </a:prstTxWarp>
-            <a:spAutoFit/>
-          </a:bodyPr>
+          <p:cNvSpPr>
+            <a:spLocks noGrp="1"/>
+          </p:cNvSpPr>
+          <p:nvPr>
+            <p:ph type="title"/>
+          </p:nvPr>
+        </p:nvSpPr>
+        <p:spPr/>
+        <p:txBody>
+          <a:bodyPr/>
           <a:lstStyle/>
           <a:p>
-            <a:pPr marL="0" marR="0" lvl="0" indent="0" algn="ctr" defTabSz="457200" rtl="0" eaLnBrk="1" fontAlgn="auto" latinLnBrk="0" hangingPunct="1">
-              <a:lnSpc>
-                <a:spcPct val="100000"/>
-              </a:lnSpc>
-              <a:spcBef>
-                <a:spcPts val="0"/>
-              </a:spcBef>
-              <a:spcAft>
-                <a:spcPts val="0"/>
-              </a:spcAft>
-              <a:buClrTx/>
-              <a:buSzTx/>
-              <a:buFontTx/>
-              <a:buNone/>
-              <a:tabLst/>
-              <a:defRPr/>
-            </a:pPr>
-            <a:r>
-              <a:rPr kumimoji="0" lang="en-US" sz="7200" b="0" i="0" u="none" strike="noStrike" kern="1200" cap="none" spc="0" normalizeH="0" baseline="0" noProof="0" dirty="0">
-                <a:ln>
-                  <a:noFill/>
-                </a:ln>
-                <a:solidFill>
-                  <a:schemeClr val="tx1"/>
-                </a:solidFill>
-                <a:effectLst/>
-                <a:uLnTx/>
-                <a:uFillTx/>
-                <a:latin typeface="+mn-lt"/>
-                <a:ea typeface="+mn-ea"/>
-                <a:cs typeface="+mn-cs"/>
-              </a:rPr>
-              <a:t>Examples</a:t>
+            <a:r>
+              <a:rPr lang="en-US" dirty="0"/>
+              <a:t>Pure functions</a:t>
+            </a:r>
+            <a:br>
+              <a:rPr lang="en-US" dirty="0"/>
+            </a:br>
+            <a:r>
+              <a:rPr lang="en-US" dirty="0"/>
+              <a:t>Immutability</a:t>
+            </a:r>
+          </a:p>
+        </p:txBody>
+      </p:sp>
+      <p:sp>
+        <p:nvSpPr>
+          <p:cNvPr id="3" name="Content Placeholder 2">
+            <a:extLst>
+              <a:ext uri="{FF2B5EF4-FFF2-40B4-BE49-F238E27FC236}">
+                <a16:creationId xmlns:a16="http://schemas.microsoft.com/office/drawing/2014/main" id="{519D56E3-2B90-2A3B-E384-D45FBDF93A21}"/>
+              </a:ext>
+            </a:extLst>
+          </p:cNvPr>
+          <p:cNvSpPr>
+            <a:spLocks noGrp="1"/>
+          </p:cNvSpPr>
+          <p:nvPr>
+            <p:ph idx="1"/>
+          </p:nvPr>
+        </p:nvSpPr>
+        <p:spPr/>
+        <p:txBody>
+          <a:bodyPr/>
+          <a:lstStyle/>
+          <a:p>
+            <a:r>
+              <a:rPr lang="en-US" dirty="0"/>
+              <a:t>…</a:t>
             </a:r>
           </a:p>
         </p:txBody>
@@ -6959,7 +6936,7 @@
     </p:spTree>
     <p:extLst>
       <p:ext uri="{BB962C8B-B14F-4D97-AF65-F5344CB8AC3E}">
-        <p14:creationId xmlns:p14="http://schemas.microsoft.com/office/powerpoint/2010/main" val="2146797957"/>
+        <p14:creationId xmlns:p14="http://schemas.microsoft.com/office/powerpoint/2010/main" val="2909225069"/>
       </p:ext>
     </p:extLst>
   </p:cSld>
@@ -7044,7 +7021,7 @@
               <a:defRPr/>
             </a:pPr>
             <a:r>
-              <a:rPr kumimoji="0" lang="en-US" sz="7200" b="0" i="0" u="none" strike="noStrike" kern="1200" cap="none" spc="0" normalizeH="0" baseline="0" dirty="0">
+              <a:rPr kumimoji="0" lang="en-US" sz="7200" b="0" i="0" u="none" strike="noStrike" kern="1200" cap="none" spc="0" normalizeH="0" baseline="0" noProof="0" dirty="0">
                 <a:ln>
                   <a:noFill/>
                 </a:ln>
@@ -7058,7 +7035,7 @@
                 <a:ea typeface="+mn-ea"/>
                 <a:cs typeface="+mn-cs"/>
               </a:rPr>
-              <a:t>Adopting functional programming</a:t>
+              <a:t>Functional programming</a:t>
             </a:r>
           </a:p>
         </p:txBody>
@@ -7066,7 +7043,7 @@
     </p:spTree>
     <p:extLst>
       <p:ext uri="{BB962C8B-B14F-4D97-AF65-F5344CB8AC3E}">
-        <p14:creationId xmlns:p14="http://schemas.microsoft.com/office/powerpoint/2010/main" val="1980333425"/>
+        <p14:creationId xmlns:p14="http://schemas.microsoft.com/office/powerpoint/2010/main" val="3310324046"/>
       </p:ext>
     </p:extLst>
   </p:cSld>
@@ -7116,14 +7093,14 @@
           <a:p>
             <a:r>
               <a:rPr lang="en-US" dirty="0"/>
-              <a:t>Adopting functional programming</a:t>
+              <a:t>Functional programming (FP)</a:t>
             </a:r>
             <a:br>
               <a:rPr lang="en-US" dirty="0"/>
             </a:br>
             <a:r>
               <a:rPr lang="en-US" dirty="0"/>
-              <a:t>Potential blockers</a:t>
+              <a:t>Definition</a:t>
             </a:r>
           </a:p>
         </p:txBody>
@@ -7156,7 +7133,7 @@
     </p:spTree>
     <p:extLst>
       <p:ext uri="{BB962C8B-B14F-4D97-AF65-F5344CB8AC3E}">
-        <p14:creationId xmlns:p14="http://schemas.microsoft.com/office/powerpoint/2010/main" val="2558298236"/>
+        <p14:creationId xmlns:p14="http://schemas.microsoft.com/office/powerpoint/2010/main" val="98042496"/>
       </p:ext>
     </p:extLst>
   </p:cSld>
@@ -7206,14 +7183,14 @@
           <a:p>
             <a:r>
               <a:rPr lang="en-US" dirty="0"/>
-              <a:t>Adopting functional programming</a:t>
+              <a:t>Functional programming (FP)</a:t>
             </a:r>
             <a:br>
               <a:rPr lang="en-US" dirty="0"/>
             </a:br>
             <a:r>
               <a:rPr lang="en-US" dirty="0"/>
-              <a:t>Performance</a:t>
+              <a:t>Pattern matching</a:t>
             </a:r>
           </a:p>
         </p:txBody>
@@ -7246,7 +7223,7 @@
     </p:spTree>
     <p:extLst>
       <p:ext uri="{BB962C8B-B14F-4D97-AF65-F5344CB8AC3E}">
-        <p14:creationId xmlns:p14="http://schemas.microsoft.com/office/powerpoint/2010/main" val="3844268154"/>
+        <p14:creationId xmlns:p14="http://schemas.microsoft.com/office/powerpoint/2010/main" val="2815264430"/>
       </p:ext>
     </p:extLst>
   </p:cSld>
@@ -7345,7 +7322,7 @@
                 <a:ea typeface="+mn-ea"/>
                 <a:cs typeface="+mn-cs"/>
               </a:rPr>
-              <a:t>Next steps</a:t>
+              <a:t>Closures</a:t>
             </a:r>
           </a:p>
         </p:txBody>
@@ -7353,7 +7330,7 @@
     </p:spTree>
     <p:extLst>
       <p:ext uri="{BB962C8B-B14F-4D97-AF65-F5344CB8AC3E}">
-        <p14:creationId xmlns:p14="http://schemas.microsoft.com/office/powerpoint/2010/main" val="1448221693"/>
+        <p14:creationId xmlns:p14="http://schemas.microsoft.com/office/powerpoint/2010/main" val="2815984157"/>
       </p:ext>
     </p:extLst>
   </p:cSld>
@@ -7385,65 +7362,82 @@
           <p:cNvPr id="2" name="Title 1">
             <a:extLst>
               <a:ext uri="{FF2B5EF4-FFF2-40B4-BE49-F238E27FC236}">
-                <a16:creationId xmlns:a16="http://schemas.microsoft.com/office/drawing/2014/main" id="{9F0A4C3A-80AE-E3A6-471D-A74E63C90618}"/>
+                <a16:creationId xmlns:a16="http://schemas.microsoft.com/office/drawing/2014/main" id="{7306C212-B3B4-8E92-B9B3-B626EF37EBA4}"/>
               </a:ext>
             </a:extLst>
           </p:cNvPr>
-          <p:cNvSpPr>
-            <a:spLocks noGrp="1"/>
-          </p:cNvSpPr>
-          <p:nvPr>
-            <p:ph type="title"/>
-          </p:nvPr>
-        </p:nvSpPr>
-        <p:spPr/>
-        <p:txBody>
-          <a:bodyPr/>
+          <p:cNvSpPr txBox="1">
+            <a:spLocks noGrp="1"/>
+          </p:cNvSpPr>
+          <p:nvPr>
+            <p:ph type="title" idx="4294967295"/>
+          </p:nvPr>
+        </p:nvSpPr>
+        <p:spPr>
+          <a:xfrm>
+            <a:off x="1061794" y="2828836"/>
+            <a:ext cx="10068412" cy="1200329"/>
+          </a:xfrm>
+          <a:prstGeom prst="rect">
+            <a:avLst/>
+          </a:prstGeom>
+          <a:noFill/>
+          <a:ln>
+            <a:noFill/>
+            <a:prstDash/>
+          </a:ln>
+          <a:effectLst/>
+        </p:spPr>
+        <p:txBody>
+          <a:bodyPr rot="0" spcFirstLastPara="0" vertOverflow="overflow" horzOverflow="overflow" vert="horz" wrap="square" lIns="91440" tIns="45720" rIns="91440" bIns="45720" numCol="1" spcCol="0" rtlCol="0" fromWordArt="0" anchor="t" anchorCtr="0" forceAA="0" compatLnSpc="1">
+            <a:prstTxWarp prst="textNoShape">
+              <a:avLst/>
+            </a:prstTxWarp>
+            <a:spAutoFit/>
+          </a:bodyPr>
           <a:lstStyle/>
           <a:p>
-            <a:r>
-              <a:rPr lang="en-US" dirty="0"/>
-              <a:t>Next steps and further resource</a:t>
-            </a:r>
-            <a:br>
-              <a:rPr lang="en-US" dirty="0"/>
-            </a:br>
-            <a:r>
-              <a:rPr lang="en-US" dirty="0"/>
-              <a:t>More FP with C#</a:t>
-            </a:r>
-          </a:p>
-        </p:txBody>
-      </p:sp>
-      <p:sp>
-        <p:nvSpPr>
-          <p:cNvPr id="3" name="Content Placeholder 2">
-            <a:extLst>
-              <a:ext uri="{FF2B5EF4-FFF2-40B4-BE49-F238E27FC236}">
-                <a16:creationId xmlns:a16="http://schemas.microsoft.com/office/drawing/2014/main" id="{519D56E3-2B90-2A3B-E384-D45FBDF93A21}"/>
-              </a:ext>
-            </a:extLst>
-          </p:cNvPr>
-          <p:cNvSpPr>
-            <a:spLocks noGrp="1"/>
-          </p:cNvSpPr>
-          <p:nvPr>
-            <p:ph idx="1"/>
-          </p:nvPr>
-        </p:nvSpPr>
-        <p:spPr/>
-        <p:txBody>
-          <a:bodyPr/>
-          <a:lstStyle/>
-          <a:p>
-            <a:endParaRPr lang="en-US" dirty="0"/>
+            <a:pPr marL="0" marR="0" lvl="0" indent="0" algn="ctr" defTabSz="457200" rtl="0" eaLnBrk="1" fontAlgn="auto" latinLnBrk="0" hangingPunct="1">
+              <a:lnSpc>
+                <a:spcPct val="100000"/>
+              </a:lnSpc>
+              <a:spcBef>
+                <a:spcPts val="0"/>
+              </a:spcBef>
+              <a:spcAft>
+                <a:spcPts val="0"/>
+              </a:spcAft>
+              <a:buClrTx/>
+              <a:buSzTx/>
+              <a:buFontTx/>
+              <a:buNone/>
+              <a:tabLst/>
+              <a:defRPr/>
+            </a:pPr>
+            <a:r>
+              <a:rPr kumimoji="0" lang="en-US" sz="7200" b="0" i="0" u="none" strike="noStrike" kern="1200" cap="none" spc="0" normalizeH="0" baseline="0" noProof="0" dirty="0">
+                <a:ln>
+                  <a:noFill/>
+                </a:ln>
+                <a:solidFill>
+                  <a:schemeClr val="tx1"/>
+                </a:solidFill>
+                <a:effectLst/>
+                <a:uLnTx/>
+                <a:uFillTx/>
+                <a:latin typeface="+mn-lt"/>
+                <a:ea typeface="+mn-ea"/>
+                <a:cs typeface="+mn-cs"/>
+              </a:rPr>
+              <a:t>Examples</a:t>
+            </a:r>
           </a:p>
         </p:txBody>
       </p:sp>
     </p:spTree>
     <p:extLst>
       <p:ext uri="{BB962C8B-B14F-4D97-AF65-F5344CB8AC3E}">
-        <p14:creationId xmlns:p14="http://schemas.microsoft.com/office/powerpoint/2010/main" val="874669026"/>
+        <p14:creationId xmlns:p14="http://schemas.microsoft.com/office/powerpoint/2010/main" val="2146797957"/>
       </p:ext>
     </p:extLst>
   </p:cSld>
@@ -7475,65 +7469,82 @@
           <p:cNvPr id="2" name="Title 1">
             <a:extLst>
               <a:ext uri="{FF2B5EF4-FFF2-40B4-BE49-F238E27FC236}">
-                <a16:creationId xmlns:a16="http://schemas.microsoft.com/office/drawing/2014/main" id="{9F0A4C3A-80AE-E3A6-471D-A74E63C90618}"/>
+                <a16:creationId xmlns:a16="http://schemas.microsoft.com/office/drawing/2014/main" id="{7306C212-B3B4-8E92-B9B3-B626EF37EBA4}"/>
               </a:ext>
             </a:extLst>
           </p:cNvPr>
-          <p:cNvSpPr>
-            <a:spLocks noGrp="1"/>
-          </p:cNvSpPr>
-          <p:nvPr>
-            <p:ph type="title"/>
-          </p:nvPr>
-        </p:nvSpPr>
-        <p:spPr/>
-        <p:txBody>
-          <a:bodyPr/>
+          <p:cNvSpPr txBox="1">
+            <a:spLocks noGrp="1"/>
+          </p:cNvSpPr>
+          <p:nvPr>
+            <p:ph type="title" idx="4294967295"/>
+          </p:nvPr>
+        </p:nvSpPr>
+        <p:spPr>
+          <a:xfrm>
+            <a:off x="1061794" y="2274838"/>
+            <a:ext cx="10068412" cy="2308324"/>
+          </a:xfrm>
+          <a:prstGeom prst="rect">
+            <a:avLst/>
+          </a:prstGeom>
+          <a:noFill/>
+          <a:ln>
+            <a:noFill/>
+            <a:prstDash/>
+          </a:ln>
+          <a:effectLst/>
+        </p:spPr>
+        <p:txBody>
+          <a:bodyPr rot="0" spcFirstLastPara="0" vertOverflow="overflow" horzOverflow="overflow" vert="horz" wrap="square" lIns="91440" tIns="45720" rIns="91440" bIns="45720" numCol="1" spcCol="0" rtlCol="0" fromWordArt="0" anchor="t" anchorCtr="0" forceAA="0" compatLnSpc="1">
+            <a:prstTxWarp prst="textNoShape">
+              <a:avLst/>
+            </a:prstTxWarp>
+            <a:spAutoFit/>
+          </a:bodyPr>
           <a:lstStyle/>
           <a:p>
-            <a:r>
-              <a:rPr lang="en-US" dirty="0"/>
-              <a:t>Next steps and further resource</a:t>
-            </a:r>
-            <a:br>
-              <a:rPr lang="en-US" dirty="0"/>
-            </a:br>
-            <a:r>
-              <a:rPr lang="en-US" dirty="0"/>
-              <a:t>Functional(-first) languages</a:t>
-            </a:r>
-          </a:p>
-        </p:txBody>
-      </p:sp>
-      <p:sp>
-        <p:nvSpPr>
-          <p:cNvPr id="3" name="Content Placeholder 2">
-            <a:extLst>
-              <a:ext uri="{FF2B5EF4-FFF2-40B4-BE49-F238E27FC236}">
-                <a16:creationId xmlns:a16="http://schemas.microsoft.com/office/drawing/2014/main" id="{519D56E3-2B90-2A3B-E384-D45FBDF93A21}"/>
-              </a:ext>
-            </a:extLst>
-          </p:cNvPr>
-          <p:cNvSpPr>
-            <a:spLocks noGrp="1"/>
-          </p:cNvSpPr>
-          <p:nvPr>
-            <p:ph idx="1"/>
-          </p:nvPr>
-        </p:nvSpPr>
-        <p:spPr/>
-        <p:txBody>
-          <a:bodyPr/>
-          <a:lstStyle/>
-          <a:p>
-            <a:endParaRPr lang="en-US" dirty="0"/>
+            <a:pPr marL="0" marR="0" lvl="0" indent="0" algn="ctr" defTabSz="457200" rtl="0" eaLnBrk="1" fontAlgn="auto" latinLnBrk="0" hangingPunct="1">
+              <a:lnSpc>
+                <a:spcPct val="100000"/>
+              </a:lnSpc>
+              <a:spcBef>
+                <a:spcPts val="0"/>
+              </a:spcBef>
+              <a:spcAft>
+                <a:spcPts val="0"/>
+              </a:spcAft>
+              <a:buClrTx/>
+              <a:buSzTx/>
+              <a:buFontTx/>
+              <a:buNone/>
+              <a:tabLst/>
+              <a:defRPr/>
+            </a:pPr>
+            <a:r>
+              <a:rPr kumimoji="0" lang="en-US" sz="7200" b="0" i="0" u="none" strike="noStrike" kern="1200" cap="none" spc="0" normalizeH="0" baseline="0" dirty="0">
+                <a:ln>
+                  <a:noFill/>
+                </a:ln>
+                <a:solidFill>
+                  <a:schemeClr val="tx1"/>
+                </a:solidFill>
+                <a:effectLst/>
+                <a:uLnTx/>
+                <a:uFillTx/>
+                <a:latin typeface="+mn-lt"/>
+                <a:ea typeface="+mn-ea"/>
+                <a:cs typeface="+mn-cs"/>
+              </a:rPr>
+              <a:t>Adopting functional programming</a:t>
+            </a:r>
           </a:p>
         </p:txBody>
       </p:sp>
     </p:spTree>
     <p:extLst>
       <p:ext uri="{BB962C8B-B14F-4D97-AF65-F5344CB8AC3E}">
-        <p14:creationId xmlns:p14="http://schemas.microsoft.com/office/powerpoint/2010/main" val="73239858"/>
+        <p14:creationId xmlns:p14="http://schemas.microsoft.com/office/powerpoint/2010/main" val="1980333425"/>
       </p:ext>
     </p:extLst>
   </p:cSld>
@@ -7583,6 +7594,595 @@
           <a:p>
             <a:r>
               <a:rPr lang="en-US" dirty="0"/>
+              <a:t>Adopting functional programming</a:t>
+            </a:r>
+            <a:br>
+              <a:rPr lang="en-US" dirty="0"/>
+            </a:br>
+            <a:r>
+              <a:rPr lang="en-US" dirty="0"/>
+              <a:t>Potential blockers</a:t>
+            </a:r>
+          </a:p>
+        </p:txBody>
+      </p:sp>
+      <p:sp>
+        <p:nvSpPr>
+          <p:cNvPr id="3" name="Content Placeholder 2">
+            <a:extLst>
+              <a:ext uri="{FF2B5EF4-FFF2-40B4-BE49-F238E27FC236}">
+                <a16:creationId xmlns:a16="http://schemas.microsoft.com/office/drawing/2014/main" id="{519D56E3-2B90-2A3B-E384-D45FBDF93A21}"/>
+              </a:ext>
+            </a:extLst>
+          </p:cNvPr>
+          <p:cNvSpPr>
+            <a:spLocks noGrp="1"/>
+          </p:cNvSpPr>
+          <p:nvPr>
+            <p:ph idx="1"/>
+          </p:nvPr>
+        </p:nvSpPr>
+        <p:spPr/>
+        <p:txBody>
+          <a:bodyPr/>
+          <a:lstStyle/>
+          <a:p>
+            <a:endParaRPr lang="en-US" dirty="0"/>
+          </a:p>
+        </p:txBody>
+      </p:sp>
+    </p:spTree>
+    <p:extLst>
+      <p:ext uri="{BB962C8B-B14F-4D97-AF65-F5344CB8AC3E}">
+        <p14:creationId xmlns:p14="http://schemas.microsoft.com/office/powerpoint/2010/main" val="2558298236"/>
+      </p:ext>
+    </p:extLst>
+  </p:cSld>
+  <p:clrMapOvr>
+    <a:masterClrMapping/>
+  </p:clrMapOvr>
+</p:sld>
+</file>
+
+<file path=ppt/slides/slide19.xml><?xml version="1.0" encoding="utf-8"?>
+<p:sld xmlns:a="http://schemas.openxmlformats.org/drawingml/2006/main" xmlns:r="http://schemas.openxmlformats.org/officeDocument/2006/relationships" xmlns:p="http://schemas.openxmlformats.org/presentationml/2006/main">
+  <p:cSld>
+    <p:spTree>
+      <p:nvGrpSpPr>
+        <p:cNvPr id="1" name=""/>
+        <p:cNvGrpSpPr/>
+        <p:nvPr/>
+      </p:nvGrpSpPr>
+      <p:grpSpPr>
+        <a:xfrm>
+          <a:off x="0" y="0"/>
+          <a:ext cx="0" cy="0"/>
+          <a:chOff x="0" y="0"/>
+          <a:chExt cx="0" cy="0"/>
+        </a:xfrm>
+      </p:grpSpPr>
+      <p:sp>
+        <p:nvSpPr>
+          <p:cNvPr id="2" name="Title 1">
+            <a:extLst>
+              <a:ext uri="{FF2B5EF4-FFF2-40B4-BE49-F238E27FC236}">
+                <a16:creationId xmlns:a16="http://schemas.microsoft.com/office/drawing/2014/main" id="{9F0A4C3A-80AE-E3A6-471D-A74E63C90618}"/>
+              </a:ext>
+            </a:extLst>
+          </p:cNvPr>
+          <p:cNvSpPr>
+            <a:spLocks noGrp="1"/>
+          </p:cNvSpPr>
+          <p:nvPr>
+            <p:ph type="title"/>
+          </p:nvPr>
+        </p:nvSpPr>
+        <p:spPr/>
+        <p:txBody>
+          <a:bodyPr/>
+          <a:lstStyle/>
+          <a:p>
+            <a:r>
+              <a:rPr lang="en-US" dirty="0"/>
+              <a:t>Adopting functional programming</a:t>
+            </a:r>
+            <a:br>
+              <a:rPr lang="en-US" dirty="0"/>
+            </a:br>
+            <a:r>
+              <a:rPr lang="en-US" dirty="0"/>
+              <a:t>Performance</a:t>
+            </a:r>
+          </a:p>
+        </p:txBody>
+      </p:sp>
+      <p:sp>
+        <p:nvSpPr>
+          <p:cNvPr id="3" name="Content Placeholder 2">
+            <a:extLst>
+              <a:ext uri="{FF2B5EF4-FFF2-40B4-BE49-F238E27FC236}">
+                <a16:creationId xmlns:a16="http://schemas.microsoft.com/office/drawing/2014/main" id="{519D56E3-2B90-2A3B-E384-D45FBDF93A21}"/>
+              </a:ext>
+            </a:extLst>
+          </p:cNvPr>
+          <p:cNvSpPr>
+            <a:spLocks noGrp="1"/>
+          </p:cNvSpPr>
+          <p:nvPr>
+            <p:ph idx="1"/>
+          </p:nvPr>
+        </p:nvSpPr>
+        <p:spPr/>
+        <p:txBody>
+          <a:bodyPr/>
+          <a:lstStyle/>
+          <a:p>
+            <a:endParaRPr lang="en-US" dirty="0"/>
+          </a:p>
+        </p:txBody>
+      </p:sp>
+    </p:spTree>
+    <p:extLst>
+      <p:ext uri="{BB962C8B-B14F-4D97-AF65-F5344CB8AC3E}">
+        <p14:creationId xmlns:p14="http://schemas.microsoft.com/office/powerpoint/2010/main" val="3844268154"/>
+      </p:ext>
+    </p:extLst>
+  </p:cSld>
+  <p:clrMapOvr>
+    <a:masterClrMapping/>
+  </p:clrMapOvr>
+</p:sld>
+</file>
+
+<file path=ppt/slides/slide2.xml><?xml version="1.0" encoding="utf-8"?>
+<p:sld xmlns:a="http://schemas.openxmlformats.org/drawingml/2006/main" xmlns:r="http://schemas.openxmlformats.org/officeDocument/2006/relationships" xmlns:p="http://schemas.openxmlformats.org/presentationml/2006/main">
+  <p:cSld>
+    <p:spTree>
+      <p:nvGrpSpPr>
+        <p:cNvPr id="1" name=""/>
+        <p:cNvGrpSpPr/>
+        <p:nvPr/>
+      </p:nvGrpSpPr>
+      <p:grpSpPr>
+        <a:xfrm>
+          <a:off x="0" y="0"/>
+          <a:ext cx="0" cy="0"/>
+          <a:chOff x="0" y="0"/>
+          <a:chExt cx="0" cy="0"/>
+        </a:xfrm>
+      </p:grpSpPr>
+      <p:sp>
+        <p:nvSpPr>
+          <p:cNvPr id="2" name="Title 1">
+            <a:extLst>
+              <a:ext uri="{FF2B5EF4-FFF2-40B4-BE49-F238E27FC236}">
+                <a16:creationId xmlns:a16="http://schemas.microsoft.com/office/drawing/2014/main" id="{B5AB5A65-FBAA-DC24-398C-2298A2AF58C3}"/>
+              </a:ext>
+            </a:extLst>
+          </p:cNvPr>
+          <p:cNvSpPr>
+            <a:spLocks noGrp="1"/>
+          </p:cNvSpPr>
+          <p:nvPr>
+            <p:ph type="title"/>
+          </p:nvPr>
+        </p:nvSpPr>
+        <p:spPr/>
+        <p:txBody>
+          <a:bodyPr/>
+          <a:lstStyle/>
+          <a:p>
+            <a:r>
+              <a:rPr lang="en-US" dirty="0"/>
+              <a:t>Overview</a:t>
+            </a:r>
+          </a:p>
+        </p:txBody>
+      </p:sp>
+      <p:sp>
+        <p:nvSpPr>
+          <p:cNvPr id="3" name="Content Placeholder 2">
+            <a:extLst>
+              <a:ext uri="{FF2B5EF4-FFF2-40B4-BE49-F238E27FC236}">
+                <a16:creationId xmlns:a16="http://schemas.microsoft.com/office/drawing/2014/main" id="{0123CA19-329D-0F80-C469-2825866C6CA4}"/>
+              </a:ext>
+            </a:extLst>
+          </p:cNvPr>
+          <p:cNvSpPr>
+            <a:spLocks noGrp="1"/>
+          </p:cNvSpPr>
+          <p:nvPr>
+            <p:ph idx="1"/>
+          </p:nvPr>
+        </p:nvSpPr>
+        <p:spPr/>
+        <p:txBody>
+          <a:bodyPr/>
+          <a:lstStyle/>
+          <a:p>
+            <a:r>
+              <a:rPr lang="en-US" dirty="0"/>
+              <a:t>Orders of functions</a:t>
+            </a:r>
+          </a:p>
+          <a:p>
+            <a:r>
+              <a:rPr lang="en-US" dirty="0"/>
+              <a:t>Pure functions</a:t>
+            </a:r>
+          </a:p>
+          <a:p>
+            <a:r>
+              <a:rPr lang="en-US" dirty="0"/>
+              <a:t>Functional programming (FP)</a:t>
+            </a:r>
+          </a:p>
+          <a:p>
+            <a:r>
+              <a:rPr lang="en-US" dirty="0"/>
+              <a:t>Closures</a:t>
+            </a:r>
+          </a:p>
+          <a:p>
+            <a:r>
+              <a:rPr lang="en-US" dirty="0"/>
+              <a:t>Examples</a:t>
+            </a:r>
+          </a:p>
+          <a:p>
+            <a:r>
+              <a:rPr lang="en-US" dirty="0"/>
+              <a:t>Adopting functional programming</a:t>
+            </a:r>
+          </a:p>
+          <a:p>
+            <a:r>
+              <a:rPr lang="en-US" dirty="0"/>
+              <a:t>Next steps and further resource</a:t>
+            </a:r>
+          </a:p>
+        </p:txBody>
+      </p:sp>
+    </p:spTree>
+    <p:extLst>
+      <p:ext uri="{BB962C8B-B14F-4D97-AF65-F5344CB8AC3E}">
+        <p14:creationId xmlns:p14="http://schemas.microsoft.com/office/powerpoint/2010/main" val="1836417717"/>
+      </p:ext>
+    </p:extLst>
+  </p:cSld>
+  <p:clrMapOvr>
+    <a:masterClrMapping/>
+  </p:clrMapOvr>
+</p:sld>
+</file>
+
+<file path=ppt/slides/slide20.xml><?xml version="1.0" encoding="utf-8"?>
+<p:sld xmlns:a="http://schemas.openxmlformats.org/drawingml/2006/main" xmlns:r="http://schemas.openxmlformats.org/officeDocument/2006/relationships" xmlns:p="http://schemas.openxmlformats.org/presentationml/2006/main">
+  <p:cSld>
+    <p:spTree>
+      <p:nvGrpSpPr>
+        <p:cNvPr id="1" name=""/>
+        <p:cNvGrpSpPr/>
+        <p:nvPr/>
+      </p:nvGrpSpPr>
+      <p:grpSpPr>
+        <a:xfrm>
+          <a:off x="0" y="0"/>
+          <a:ext cx="0" cy="0"/>
+          <a:chOff x="0" y="0"/>
+          <a:chExt cx="0" cy="0"/>
+        </a:xfrm>
+      </p:grpSpPr>
+      <p:sp>
+        <p:nvSpPr>
+          <p:cNvPr id="2" name="Title 1">
+            <a:extLst>
+              <a:ext uri="{FF2B5EF4-FFF2-40B4-BE49-F238E27FC236}">
+                <a16:creationId xmlns:a16="http://schemas.microsoft.com/office/drawing/2014/main" id="{7306C212-B3B4-8E92-B9B3-B626EF37EBA4}"/>
+              </a:ext>
+            </a:extLst>
+          </p:cNvPr>
+          <p:cNvSpPr txBox="1">
+            <a:spLocks noGrp="1"/>
+          </p:cNvSpPr>
+          <p:nvPr>
+            <p:ph type="title" idx="4294967295"/>
+          </p:nvPr>
+        </p:nvSpPr>
+        <p:spPr>
+          <a:xfrm>
+            <a:off x="1061794" y="2828836"/>
+            <a:ext cx="10068412" cy="1200329"/>
+          </a:xfrm>
+          <a:prstGeom prst="rect">
+            <a:avLst/>
+          </a:prstGeom>
+          <a:noFill/>
+          <a:ln>
+            <a:noFill/>
+            <a:prstDash/>
+          </a:ln>
+          <a:effectLst/>
+        </p:spPr>
+        <p:txBody>
+          <a:bodyPr rot="0" spcFirstLastPara="0" vertOverflow="overflow" horzOverflow="overflow" vert="horz" wrap="square" lIns="91440" tIns="45720" rIns="91440" bIns="45720" numCol="1" spcCol="0" rtlCol="0" fromWordArt="0" anchor="t" anchorCtr="0" forceAA="0" compatLnSpc="1">
+            <a:prstTxWarp prst="textNoShape">
+              <a:avLst/>
+            </a:prstTxWarp>
+            <a:spAutoFit/>
+          </a:bodyPr>
+          <a:lstStyle/>
+          <a:p>
+            <a:pPr marL="0" marR="0" lvl="0" indent="0" algn="ctr" defTabSz="457200" rtl="0" eaLnBrk="1" fontAlgn="auto" latinLnBrk="0" hangingPunct="1">
+              <a:lnSpc>
+                <a:spcPct val="100000"/>
+              </a:lnSpc>
+              <a:spcBef>
+                <a:spcPts val="0"/>
+              </a:spcBef>
+              <a:spcAft>
+                <a:spcPts val="0"/>
+              </a:spcAft>
+              <a:buClrTx/>
+              <a:buSzTx/>
+              <a:buFontTx/>
+              <a:buNone/>
+              <a:tabLst/>
+              <a:defRPr/>
+            </a:pPr>
+            <a:r>
+              <a:rPr kumimoji="0" lang="en-US" sz="7200" b="0" i="0" u="none" strike="noStrike" kern="1200" cap="none" spc="0" normalizeH="0" baseline="0" noProof="0" dirty="0">
+                <a:ln>
+                  <a:noFill/>
+                </a:ln>
+                <a:solidFill>
+                  <a:schemeClr val="tx1"/>
+                </a:solidFill>
+                <a:effectLst/>
+                <a:uLnTx/>
+                <a:uFillTx/>
+                <a:latin typeface="+mn-lt"/>
+                <a:ea typeface="+mn-ea"/>
+                <a:cs typeface="+mn-cs"/>
+              </a:rPr>
+              <a:t>Next steps</a:t>
+            </a:r>
+          </a:p>
+        </p:txBody>
+      </p:sp>
+    </p:spTree>
+    <p:extLst>
+      <p:ext uri="{BB962C8B-B14F-4D97-AF65-F5344CB8AC3E}">
+        <p14:creationId xmlns:p14="http://schemas.microsoft.com/office/powerpoint/2010/main" val="1448221693"/>
+      </p:ext>
+    </p:extLst>
+  </p:cSld>
+  <p:clrMapOvr>
+    <a:masterClrMapping/>
+  </p:clrMapOvr>
+</p:sld>
+</file>
+
+<file path=ppt/slides/slide21.xml><?xml version="1.0" encoding="utf-8"?>
+<p:sld xmlns:a="http://schemas.openxmlformats.org/drawingml/2006/main" xmlns:r="http://schemas.openxmlformats.org/officeDocument/2006/relationships" xmlns:p="http://schemas.openxmlformats.org/presentationml/2006/main">
+  <p:cSld>
+    <p:spTree>
+      <p:nvGrpSpPr>
+        <p:cNvPr id="1" name=""/>
+        <p:cNvGrpSpPr/>
+        <p:nvPr/>
+      </p:nvGrpSpPr>
+      <p:grpSpPr>
+        <a:xfrm>
+          <a:off x="0" y="0"/>
+          <a:ext cx="0" cy="0"/>
+          <a:chOff x="0" y="0"/>
+          <a:chExt cx="0" cy="0"/>
+        </a:xfrm>
+      </p:grpSpPr>
+      <p:sp>
+        <p:nvSpPr>
+          <p:cNvPr id="2" name="Title 1">
+            <a:extLst>
+              <a:ext uri="{FF2B5EF4-FFF2-40B4-BE49-F238E27FC236}">
+                <a16:creationId xmlns:a16="http://schemas.microsoft.com/office/drawing/2014/main" id="{9F0A4C3A-80AE-E3A6-471D-A74E63C90618}"/>
+              </a:ext>
+            </a:extLst>
+          </p:cNvPr>
+          <p:cNvSpPr>
+            <a:spLocks noGrp="1"/>
+          </p:cNvSpPr>
+          <p:nvPr>
+            <p:ph type="title"/>
+          </p:nvPr>
+        </p:nvSpPr>
+        <p:spPr/>
+        <p:txBody>
+          <a:bodyPr/>
+          <a:lstStyle/>
+          <a:p>
+            <a:r>
+              <a:rPr lang="en-US" dirty="0"/>
+              <a:t>Next steps and further resource</a:t>
+            </a:r>
+            <a:br>
+              <a:rPr lang="en-US" dirty="0"/>
+            </a:br>
+            <a:r>
+              <a:rPr lang="en-US" dirty="0"/>
+              <a:t>More FP with C#</a:t>
+            </a:r>
+          </a:p>
+        </p:txBody>
+      </p:sp>
+      <p:sp>
+        <p:nvSpPr>
+          <p:cNvPr id="3" name="Content Placeholder 2">
+            <a:extLst>
+              <a:ext uri="{FF2B5EF4-FFF2-40B4-BE49-F238E27FC236}">
+                <a16:creationId xmlns:a16="http://schemas.microsoft.com/office/drawing/2014/main" id="{519D56E3-2B90-2A3B-E384-D45FBDF93A21}"/>
+              </a:ext>
+            </a:extLst>
+          </p:cNvPr>
+          <p:cNvSpPr>
+            <a:spLocks noGrp="1"/>
+          </p:cNvSpPr>
+          <p:nvPr>
+            <p:ph idx="1"/>
+          </p:nvPr>
+        </p:nvSpPr>
+        <p:spPr/>
+        <p:txBody>
+          <a:bodyPr/>
+          <a:lstStyle/>
+          <a:p>
+            <a:endParaRPr lang="en-US" dirty="0"/>
+          </a:p>
+        </p:txBody>
+      </p:sp>
+    </p:spTree>
+    <p:extLst>
+      <p:ext uri="{BB962C8B-B14F-4D97-AF65-F5344CB8AC3E}">
+        <p14:creationId xmlns:p14="http://schemas.microsoft.com/office/powerpoint/2010/main" val="874669026"/>
+      </p:ext>
+    </p:extLst>
+  </p:cSld>
+  <p:clrMapOvr>
+    <a:masterClrMapping/>
+  </p:clrMapOvr>
+</p:sld>
+</file>
+
+<file path=ppt/slides/slide22.xml><?xml version="1.0" encoding="utf-8"?>
+<p:sld xmlns:a="http://schemas.openxmlformats.org/drawingml/2006/main" xmlns:r="http://schemas.openxmlformats.org/officeDocument/2006/relationships" xmlns:p="http://schemas.openxmlformats.org/presentationml/2006/main">
+  <p:cSld>
+    <p:spTree>
+      <p:nvGrpSpPr>
+        <p:cNvPr id="1" name=""/>
+        <p:cNvGrpSpPr/>
+        <p:nvPr/>
+      </p:nvGrpSpPr>
+      <p:grpSpPr>
+        <a:xfrm>
+          <a:off x="0" y="0"/>
+          <a:ext cx="0" cy="0"/>
+          <a:chOff x="0" y="0"/>
+          <a:chExt cx="0" cy="0"/>
+        </a:xfrm>
+      </p:grpSpPr>
+      <p:sp>
+        <p:nvSpPr>
+          <p:cNvPr id="2" name="Title 1">
+            <a:extLst>
+              <a:ext uri="{FF2B5EF4-FFF2-40B4-BE49-F238E27FC236}">
+                <a16:creationId xmlns:a16="http://schemas.microsoft.com/office/drawing/2014/main" id="{9F0A4C3A-80AE-E3A6-471D-A74E63C90618}"/>
+              </a:ext>
+            </a:extLst>
+          </p:cNvPr>
+          <p:cNvSpPr>
+            <a:spLocks noGrp="1"/>
+          </p:cNvSpPr>
+          <p:nvPr>
+            <p:ph type="title"/>
+          </p:nvPr>
+        </p:nvSpPr>
+        <p:spPr/>
+        <p:txBody>
+          <a:bodyPr/>
+          <a:lstStyle/>
+          <a:p>
+            <a:r>
+              <a:rPr lang="en-US" dirty="0"/>
+              <a:t>Next steps and further resource</a:t>
+            </a:r>
+            <a:br>
+              <a:rPr lang="en-US" dirty="0"/>
+            </a:br>
+            <a:r>
+              <a:rPr lang="en-US" dirty="0"/>
+              <a:t>Functional(-first) languages</a:t>
+            </a:r>
+          </a:p>
+        </p:txBody>
+      </p:sp>
+      <p:sp>
+        <p:nvSpPr>
+          <p:cNvPr id="3" name="Content Placeholder 2">
+            <a:extLst>
+              <a:ext uri="{FF2B5EF4-FFF2-40B4-BE49-F238E27FC236}">
+                <a16:creationId xmlns:a16="http://schemas.microsoft.com/office/drawing/2014/main" id="{519D56E3-2B90-2A3B-E384-D45FBDF93A21}"/>
+              </a:ext>
+            </a:extLst>
+          </p:cNvPr>
+          <p:cNvSpPr>
+            <a:spLocks noGrp="1"/>
+          </p:cNvSpPr>
+          <p:nvPr>
+            <p:ph idx="1"/>
+          </p:nvPr>
+        </p:nvSpPr>
+        <p:spPr/>
+        <p:txBody>
+          <a:bodyPr/>
+          <a:lstStyle/>
+          <a:p>
+            <a:endParaRPr lang="en-US" dirty="0"/>
+          </a:p>
+        </p:txBody>
+      </p:sp>
+    </p:spTree>
+    <p:extLst>
+      <p:ext uri="{BB962C8B-B14F-4D97-AF65-F5344CB8AC3E}">
+        <p14:creationId xmlns:p14="http://schemas.microsoft.com/office/powerpoint/2010/main" val="73239858"/>
+      </p:ext>
+    </p:extLst>
+  </p:cSld>
+  <p:clrMapOvr>
+    <a:masterClrMapping/>
+  </p:clrMapOvr>
+</p:sld>
+</file>
+
+<file path=ppt/slides/slide23.xml><?xml version="1.0" encoding="utf-8"?>
+<p:sld xmlns:a="http://schemas.openxmlformats.org/drawingml/2006/main" xmlns:r="http://schemas.openxmlformats.org/officeDocument/2006/relationships" xmlns:p="http://schemas.openxmlformats.org/presentationml/2006/main">
+  <p:cSld>
+    <p:spTree>
+      <p:nvGrpSpPr>
+        <p:cNvPr id="1" name=""/>
+        <p:cNvGrpSpPr/>
+        <p:nvPr/>
+      </p:nvGrpSpPr>
+      <p:grpSpPr>
+        <a:xfrm>
+          <a:off x="0" y="0"/>
+          <a:ext cx="0" cy="0"/>
+          <a:chOff x="0" y="0"/>
+          <a:chExt cx="0" cy="0"/>
+        </a:xfrm>
+      </p:grpSpPr>
+      <p:sp>
+        <p:nvSpPr>
+          <p:cNvPr id="2" name="Title 1">
+            <a:extLst>
+              <a:ext uri="{FF2B5EF4-FFF2-40B4-BE49-F238E27FC236}">
+                <a16:creationId xmlns:a16="http://schemas.microsoft.com/office/drawing/2014/main" id="{9F0A4C3A-80AE-E3A6-471D-A74E63C90618}"/>
+              </a:ext>
+            </a:extLst>
+          </p:cNvPr>
+          <p:cNvSpPr>
+            <a:spLocks noGrp="1"/>
+          </p:cNvSpPr>
+          <p:nvPr>
+            <p:ph type="title"/>
+          </p:nvPr>
+        </p:nvSpPr>
+        <p:spPr/>
+        <p:txBody>
+          <a:bodyPr/>
+          <a:lstStyle/>
+          <a:p>
+            <a:r>
+              <a:rPr lang="en-US" dirty="0"/>
               <a:t>Next steps and further resource</a:t>
             </a:r>
             <a:br>
@@ -7633,7 +8233,7 @@
 </p:sld>
 </file>
 
-<file path=ppt/slides/slide19.xml><?xml version="1.0" encoding="utf-8"?>
+<file path=ppt/slides/slide24.xml><?xml version="1.0" encoding="utf-8"?>
 <p:sld xmlns:a="http://schemas.openxmlformats.org/drawingml/2006/main" xmlns:r="http://schemas.openxmlformats.org/officeDocument/2006/relationships" xmlns:p="http://schemas.openxmlformats.org/presentationml/2006/main">
   <p:cSld>
     <p:spTree>
@@ -7958,123 +8558,7 @@
 </p:sld>
 </file>
 
-<file path=ppt/slides/slide2.xml><?xml version="1.0" encoding="utf-8"?>
-<p:sld xmlns:a="http://schemas.openxmlformats.org/drawingml/2006/main" xmlns:r="http://schemas.openxmlformats.org/officeDocument/2006/relationships" xmlns:p="http://schemas.openxmlformats.org/presentationml/2006/main">
-  <p:cSld>
-    <p:spTree>
-      <p:nvGrpSpPr>
-        <p:cNvPr id="1" name=""/>
-        <p:cNvGrpSpPr/>
-        <p:nvPr/>
-      </p:nvGrpSpPr>
-      <p:grpSpPr>
-        <a:xfrm>
-          <a:off x="0" y="0"/>
-          <a:ext cx="0" cy="0"/>
-          <a:chOff x="0" y="0"/>
-          <a:chExt cx="0" cy="0"/>
-        </a:xfrm>
-      </p:grpSpPr>
-      <p:sp>
-        <p:nvSpPr>
-          <p:cNvPr id="2" name="Title 1">
-            <a:extLst>
-              <a:ext uri="{FF2B5EF4-FFF2-40B4-BE49-F238E27FC236}">
-                <a16:creationId xmlns:a16="http://schemas.microsoft.com/office/drawing/2014/main" id="{B5AB5A65-FBAA-DC24-398C-2298A2AF58C3}"/>
-              </a:ext>
-            </a:extLst>
-          </p:cNvPr>
-          <p:cNvSpPr>
-            <a:spLocks noGrp="1"/>
-          </p:cNvSpPr>
-          <p:nvPr>
-            <p:ph type="title"/>
-          </p:nvPr>
-        </p:nvSpPr>
-        <p:spPr/>
-        <p:txBody>
-          <a:bodyPr/>
-          <a:lstStyle/>
-          <a:p>
-            <a:r>
-              <a:rPr lang="en-US" dirty="0"/>
-              <a:t>Overview</a:t>
-            </a:r>
-          </a:p>
-        </p:txBody>
-      </p:sp>
-      <p:sp>
-        <p:nvSpPr>
-          <p:cNvPr id="3" name="Content Placeholder 2">
-            <a:extLst>
-              <a:ext uri="{FF2B5EF4-FFF2-40B4-BE49-F238E27FC236}">
-                <a16:creationId xmlns:a16="http://schemas.microsoft.com/office/drawing/2014/main" id="{0123CA19-329D-0F80-C469-2825866C6CA4}"/>
-              </a:ext>
-            </a:extLst>
-          </p:cNvPr>
-          <p:cNvSpPr>
-            <a:spLocks noGrp="1"/>
-          </p:cNvSpPr>
-          <p:nvPr>
-            <p:ph idx="1"/>
-          </p:nvPr>
-        </p:nvSpPr>
-        <p:spPr/>
-        <p:txBody>
-          <a:bodyPr/>
-          <a:lstStyle/>
-          <a:p>
-            <a:r>
-              <a:rPr lang="en-US" dirty="0"/>
-              <a:t>Functions</a:t>
-            </a:r>
-          </a:p>
-          <a:p>
-            <a:r>
-              <a:rPr lang="en-US" dirty="0"/>
-              <a:t>Functional programming (FP)</a:t>
-            </a:r>
-          </a:p>
-          <a:p>
-            <a:r>
-              <a:rPr lang="en-US" dirty="0"/>
-              <a:t>Closures</a:t>
-            </a:r>
-          </a:p>
-          <a:p>
-            <a:r>
-              <a:rPr lang="en-US" dirty="0"/>
-              <a:t>Examples</a:t>
-            </a:r>
-          </a:p>
-          <a:p>
-            <a:r>
-              <a:rPr lang="en-US" dirty="0"/>
-              <a:t>Adopting functional programming</a:t>
-            </a:r>
-          </a:p>
-          <a:p>
-            <a:r>
-              <a:rPr lang="en-US" dirty="0"/>
-              <a:t>Next steps and further resource</a:t>
-            </a:r>
-          </a:p>
-        </p:txBody>
-      </p:sp>
-    </p:spTree>
-    <p:extLst>
-      <p:ext uri="{BB962C8B-B14F-4D97-AF65-F5344CB8AC3E}">
-        <p14:creationId xmlns:p14="http://schemas.microsoft.com/office/powerpoint/2010/main" val="1836417717"/>
-      </p:ext>
-    </p:extLst>
-  </p:cSld>
-  <p:clrMapOvr>
-    <a:masterClrMapping/>
-  </p:clrMapOvr>
-</p:sld>
-</file>
-
-<file path=ppt/slides/slide20.xml><?xml version="1.0" encoding="utf-8"?>
+<file path=ppt/slides/slide25.xml><?xml version="1.0" encoding="utf-8"?>
 <p:sld xmlns:a="http://schemas.openxmlformats.org/drawingml/2006/main" xmlns:r="http://schemas.openxmlformats.org/officeDocument/2006/relationships" xmlns:p="http://schemas.openxmlformats.org/presentationml/2006/main">
   <p:cSld>
     <p:spTree>
@@ -8421,34 +8905,115 @@
           <p:cNvPr id="2" name="Title 1">
             <a:extLst>
               <a:ext uri="{FF2B5EF4-FFF2-40B4-BE49-F238E27FC236}">
-                <a16:creationId xmlns:a16="http://schemas.microsoft.com/office/drawing/2014/main" id="{7306C212-B3B4-8E92-B9B3-B626EF37EBA4}"/>
+                <a16:creationId xmlns:a16="http://schemas.microsoft.com/office/drawing/2014/main" id="{C26D8B5B-0074-0DEA-247E-F5402166D235}"/>
               </a:ext>
             </a:extLst>
           </p:cNvPr>
-          <p:cNvSpPr txBox="1">
-            <a:spLocks noGrp="1"/>
-          </p:cNvSpPr>
-          <p:nvPr>
-            <p:ph type="title" idx="4294967295"/>
-          </p:nvPr>
-        </p:nvSpPr>
-        <p:spPr>
+          <p:cNvSpPr>
+            <a:spLocks noGrp="1"/>
+          </p:cNvSpPr>
+          <p:nvPr>
+            <p:ph type="title"/>
+          </p:nvPr>
+        </p:nvSpPr>
+        <p:spPr/>
+        <p:txBody>
+          <a:bodyPr/>
+          <a:lstStyle/>
+          <a:p>
+            <a:r>
+              <a:rPr lang="en-US" dirty="0"/>
+              <a:t>But before we start…</a:t>
+            </a:r>
+          </a:p>
+        </p:txBody>
+      </p:sp>
+      <p:sp>
+        <p:nvSpPr>
+          <p:cNvPr id="3" name="Content Placeholder 2">
+            <a:extLst>
+              <a:ext uri="{FF2B5EF4-FFF2-40B4-BE49-F238E27FC236}">
+                <a16:creationId xmlns:a16="http://schemas.microsoft.com/office/drawing/2014/main" id="{EA4E129E-73DC-4CE9-9FE9-2AABACCBDF2B}"/>
+              </a:ext>
+            </a:extLst>
+          </p:cNvPr>
+          <p:cNvSpPr>
+            <a:spLocks noGrp="1"/>
+          </p:cNvSpPr>
+          <p:nvPr>
+            <p:ph idx="1"/>
+          </p:nvPr>
+        </p:nvSpPr>
+        <p:spPr/>
+        <p:txBody>
+          <a:bodyPr/>
+          <a:lstStyle/>
+          <a:p>
+            <a:r>
+              <a:rPr lang="en-US" dirty="0"/>
+              <a:t>Who here is already using functional programming?</a:t>
+            </a:r>
+          </a:p>
+          <a:p>
+            <a:r>
+              <a:rPr lang="en-US" dirty="0"/>
+              <a:t>Who here is using LINQ?</a:t>
+            </a:r>
+            <a:br>
+              <a:rPr lang="en-US" dirty="0"/>
+            </a:br>
+            <a:endParaRPr lang="en-US" dirty="0"/>
+          </a:p>
+        </p:txBody>
+      </p:sp>
+      <p:sp>
+        <p:nvSpPr>
+          <p:cNvPr id="4" name="Rectangle 1">
+            <a:extLst>
+              <a:ext uri="{FF2B5EF4-FFF2-40B4-BE49-F238E27FC236}">
+                <a16:creationId xmlns:a16="http://schemas.microsoft.com/office/drawing/2014/main" id="{2F043563-D861-1204-7E30-7D0470F7AFA2}"/>
+              </a:ext>
+            </a:extLst>
+          </p:cNvPr>
+          <p:cNvSpPr>
+            <a:spLocks noChangeArrowheads="1"/>
+          </p:cNvSpPr>
+          <p:nvPr/>
+        </p:nvSpPr>
+        <p:spPr bwMode="auto">
           <a:xfrm>
-            <a:off x="1061794" y="2828836"/>
-            <a:ext cx="10068412" cy="1200329"/>
+            <a:off x="1519903" y="2967335"/>
+            <a:ext cx="5630067" cy="923330"/>
           </a:xfrm>
           <a:prstGeom prst="rect">
             <a:avLst/>
           </a:prstGeom>
-          <a:noFill/>
-          <a:ln>
-            <a:noFill/>
-            <a:prstDash/>
+          <a:solidFill>
+            <a:srgbClr val="FFFFFF"/>
+          </a:solidFill>
+          <a:ln w="15875">
+            <a:solidFill>
+              <a:schemeClr val="accent1"/>
+            </a:solidFill>
+            <a:miter lim="800000"/>
+            <a:headEnd/>
+            <a:tailEnd/>
           </a:ln>
           <a:effectLst/>
+          <a:extLst>
+            <a:ext uri="{AF507438-7753-43E0-B8FC-AC1667EBCBE1}">
+              <a14:hiddenEffects xmlns:a14="http://schemas.microsoft.com/office/drawing/2010/main">
+                <a:effectLst>
+                  <a:outerShdw dist="35921" dir="2700000" algn="ctr" rotWithShape="0">
+                    <a:schemeClr val="bg2"/>
+                  </a:outerShdw>
+                </a:effectLst>
+              </a14:hiddenEffects>
+            </a:ext>
+          </a:extLst>
         </p:spPr>
         <p:txBody>
-          <a:bodyPr rot="0" spcFirstLastPara="0" vertOverflow="overflow" horzOverflow="overflow" vert="horz" wrap="square" lIns="91440" tIns="45720" rIns="91440" bIns="45720" numCol="1" spcCol="0" rtlCol="0" fromWordArt="0" anchor="t" anchorCtr="0" forceAA="0" compatLnSpc="1">
+          <a:bodyPr vert="horz" wrap="none" lIns="91440" tIns="45720" rIns="91440" bIns="45720" numCol="1" anchor="ctr" anchorCtr="0" compatLnSpc="1">
             <a:prstTxWarp prst="textNoShape">
               <a:avLst/>
             </a:prstTxWarp>
@@ -8456,47 +9021,366 @@
           </a:bodyPr>
           <a:lstStyle/>
           <a:p>
-            <a:pPr marL="0" marR="0" lvl="0" indent="0" algn="ctr" defTabSz="457200" rtl="0" eaLnBrk="1" fontAlgn="auto" latinLnBrk="0" hangingPunct="1">
+            <a:pPr marL="0" marR="0" lvl="0" indent="0" algn="l" defTabSz="914400" rtl="0" eaLnBrk="0" fontAlgn="base" latinLnBrk="0" hangingPunct="0">
               <a:lnSpc>
                 <a:spcPct val="100000"/>
               </a:lnSpc>
               <a:spcBef>
-                <a:spcPts val="0"/>
+                <a:spcPct val="0"/>
               </a:spcBef>
               <a:spcAft>
-                <a:spcPts val="0"/>
+                <a:spcPct val="0"/>
               </a:spcAft>
               <a:buClrTx/>
               <a:buSzTx/>
               <a:buFontTx/>
               <a:buNone/>
               <a:tabLst/>
-              <a:defRPr/>
             </a:pPr>
             <a:r>
-              <a:rPr kumimoji="0" lang="en-US" sz="7200" b="0" i="0" u="none" strike="noStrike" kern="1200" cap="none" spc="0" normalizeH="0" baseline="0" noProof="0" dirty="0">
-                <a:ln>
-                  <a:noFill/>
-                </a:ln>
-                <a:solidFill>
-                  <a:schemeClr val="tx1"/>
-                </a:solidFill>
-                <a:effectLst/>
-                <a:uLnTx/>
-                <a:uFillTx/>
-                <a:latin typeface="+mn-lt"/>
-                <a:ea typeface="+mn-ea"/>
-                <a:cs typeface="+mn-cs"/>
-              </a:rPr>
-              <a:t>Functions</a:t>
-            </a:r>
+              <a:rPr kumimoji="0" lang="en-US" altLang="en-US" b="0" i="0" u="none" strike="noStrike" cap="none" normalizeH="0" baseline="0" dirty="0" err="1">
+                <a:ln>
+                  <a:noFill/>
+                </a:ln>
+                <a:solidFill>
+                  <a:srgbClr val="383838"/>
+                </a:solidFill>
+                <a:effectLst/>
+                <a:latin typeface="Consolas" panose="020B0609020204030204" pitchFamily="49" charset="0"/>
+              </a:rPr>
+              <a:t>sessions.</a:t>
+            </a:r>
+            <a:r>
+              <a:rPr kumimoji="0" lang="en-US" altLang="en-US" b="0" i="0" u="none" strike="noStrike" cap="none" normalizeH="0" baseline="0" dirty="0" err="1">
+                <a:ln>
+                  <a:noFill/>
+                </a:ln>
+                <a:solidFill>
+                  <a:srgbClr val="00855F"/>
+                </a:solidFill>
+                <a:effectLst/>
+                <a:latin typeface="Consolas" panose="020B0609020204030204" pitchFamily="49" charset="0"/>
+              </a:rPr>
+              <a:t>Where</a:t>
+            </a:r>
+            <a:r>
+              <a:rPr kumimoji="0" lang="en-US" altLang="en-US" b="0" i="0" u="none" strike="noStrike" cap="none" normalizeH="0" baseline="0" dirty="0">
+                <a:ln>
+                  <a:noFill/>
+                </a:ln>
+                <a:solidFill>
+                  <a:srgbClr val="383838"/>
+                </a:solidFill>
+                <a:effectLst/>
+                <a:latin typeface="Consolas" panose="020B0609020204030204" pitchFamily="49" charset="0"/>
+              </a:rPr>
+              <a:t>(s </a:t>
+            </a:r>
+            <a:r>
+              <a:rPr kumimoji="0" lang="en-US" altLang="en-US" b="0" i="0" u="none" strike="noStrike" cap="none" normalizeH="0" baseline="0" dirty="0">
+                <a:ln>
+                  <a:noFill/>
+                </a:ln>
+                <a:solidFill>
+                  <a:srgbClr val="202020"/>
+                </a:solidFill>
+                <a:effectLst/>
+                <a:latin typeface="Consolas" panose="020B0609020204030204" pitchFamily="49" charset="0"/>
+              </a:rPr>
+              <a:t>=&gt; </a:t>
+            </a:r>
+            <a:r>
+              <a:rPr kumimoji="0" lang="en-US" altLang="en-US" b="0" i="0" u="none" strike="noStrike" cap="none" normalizeH="0" baseline="0" dirty="0" err="1">
+                <a:ln>
+                  <a:noFill/>
+                </a:ln>
+                <a:solidFill>
+                  <a:srgbClr val="383838"/>
+                </a:solidFill>
+                <a:effectLst/>
+                <a:latin typeface="Consolas" panose="020B0609020204030204" pitchFamily="49" charset="0"/>
+              </a:rPr>
+              <a:t>s.</a:t>
+            </a:r>
+            <a:r>
+              <a:rPr kumimoji="0" lang="en-US" altLang="en-US" b="0" i="0" u="none" strike="noStrike" cap="none" normalizeH="0" baseline="0" dirty="0" err="1">
+                <a:ln>
+                  <a:noFill/>
+                </a:ln>
+                <a:solidFill>
+                  <a:srgbClr val="0093A1"/>
+                </a:solidFill>
+                <a:effectLst/>
+                <a:latin typeface="Consolas" panose="020B0609020204030204" pitchFamily="49" charset="0"/>
+              </a:rPr>
+              <a:t>Title</a:t>
+            </a:r>
+            <a:r>
+              <a:rPr kumimoji="0" lang="en-US" altLang="en-US" b="0" i="0" u="none" strike="noStrike" cap="none" normalizeH="0" baseline="0" dirty="0" err="1">
+                <a:ln>
+                  <a:noFill/>
+                </a:ln>
+                <a:solidFill>
+                  <a:srgbClr val="383838"/>
+                </a:solidFill>
+                <a:effectLst/>
+                <a:latin typeface="Consolas" panose="020B0609020204030204" pitchFamily="49" charset="0"/>
+              </a:rPr>
+              <a:t>.</a:t>
+            </a:r>
+            <a:r>
+              <a:rPr kumimoji="0" lang="en-US" altLang="en-US" b="0" i="0" u="none" strike="noStrike" cap="none" normalizeH="0" baseline="0" dirty="0" err="1">
+                <a:ln>
+                  <a:noFill/>
+                </a:ln>
+                <a:solidFill>
+                  <a:srgbClr val="00855F"/>
+                </a:solidFill>
+                <a:effectLst/>
+                <a:latin typeface="Consolas" panose="020B0609020204030204" pitchFamily="49" charset="0"/>
+              </a:rPr>
+              <a:t>Contains</a:t>
+            </a:r>
+            <a:r>
+              <a:rPr kumimoji="0" lang="en-US" altLang="en-US" b="0" i="0" u="none" strike="noStrike" cap="none" normalizeH="0" baseline="0" dirty="0">
+                <a:ln>
+                  <a:noFill/>
+                </a:ln>
+                <a:solidFill>
+                  <a:srgbClr val="383838"/>
+                </a:solidFill>
+                <a:effectLst/>
+                <a:latin typeface="Consolas" panose="020B0609020204030204" pitchFamily="49" charset="0"/>
+              </a:rPr>
+              <a:t>(</a:t>
+            </a:r>
+            <a:r>
+              <a:rPr kumimoji="0" lang="en-US" altLang="en-US" b="0" i="0" u="none" strike="noStrike" cap="none" normalizeH="0" baseline="0" dirty="0">
+                <a:ln>
+                  <a:noFill/>
+                </a:ln>
+                <a:solidFill>
+                  <a:srgbClr val="8C6C41"/>
+                </a:solidFill>
+                <a:effectLst/>
+                <a:latin typeface="Consolas" panose="020B0609020204030204" pitchFamily="49" charset="0"/>
+              </a:rPr>
+              <a:t>"C#"</a:t>
+            </a:r>
+            <a:r>
+              <a:rPr kumimoji="0" lang="en-US" altLang="en-US" b="0" i="0" u="none" strike="noStrike" cap="none" normalizeH="0" baseline="0" dirty="0">
+                <a:ln>
+                  <a:noFill/>
+                </a:ln>
+                <a:solidFill>
+                  <a:srgbClr val="383838"/>
+                </a:solidFill>
+                <a:effectLst/>
+                <a:latin typeface="Consolas" panose="020B0609020204030204" pitchFamily="49" charset="0"/>
+              </a:rPr>
+              <a:t>))</a:t>
+            </a:r>
+          </a:p>
+          <a:p>
+            <a:pPr marL="0" marR="0" lvl="0" indent="0" algn="l" defTabSz="914400" rtl="0" eaLnBrk="0" fontAlgn="base" latinLnBrk="0" hangingPunct="0">
+              <a:lnSpc>
+                <a:spcPct val="100000"/>
+              </a:lnSpc>
+              <a:spcBef>
+                <a:spcPct val="0"/>
+              </a:spcBef>
+              <a:spcAft>
+                <a:spcPct val="0"/>
+              </a:spcAft>
+              <a:buClrTx/>
+              <a:buSzTx/>
+              <a:buFontTx/>
+              <a:buNone/>
+              <a:tabLst/>
+            </a:pPr>
+            <a:r>
+              <a:rPr lang="en-US" altLang="en-US" dirty="0">
+                <a:solidFill>
+                  <a:srgbClr val="383838"/>
+                </a:solidFill>
+                <a:latin typeface="Consolas" panose="020B0609020204030204" pitchFamily="49" charset="0"/>
+              </a:rPr>
+              <a:t>        </a:t>
+            </a:r>
+            <a:r>
+              <a:rPr kumimoji="0" lang="en-US" altLang="en-US" b="0" i="0" u="none" strike="noStrike" cap="none" normalizeH="0" baseline="0" dirty="0">
+                <a:ln>
+                  <a:noFill/>
+                </a:ln>
+                <a:solidFill>
+                  <a:srgbClr val="383838"/>
+                </a:solidFill>
+                <a:effectLst/>
+                <a:latin typeface="Consolas" panose="020B0609020204030204" pitchFamily="49" charset="0"/>
+              </a:rPr>
+              <a:t>.</a:t>
+            </a:r>
+            <a:r>
+              <a:rPr kumimoji="0" lang="en-US" altLang="en-US" b="0" i="0" u="none" strike="noStrike" cap="none" normalizeH="0" baseline="0" dirty="0">
+                <a:ln>
+                  <a:noFill/>
+                </a:ln>
+                <a:solidFill>
+                  <a:srgbClr val="00855F"/>
+                </a:solidFill>
+                <a:effectLst/>
+                <a:latin typeface="Consolas" panose="020B0609020204030204" pitchFamily="49" charset="0"/>
+              </a:rPr>
+              <a:t>Select</a:t>
+            </a:r>
+            <a:r>
+              <a:rPr kumimoji="0" lang="en-US" altLang="en-US" b="0" i="0" u="none" strike="noStrike" cap="none" normalizeH="0" baseline="0" dirty="0">
+                <a:ln>
+                  <a:noFill/>
+                </a:ln>
+                <a:solidFill>
+                  <a:srgbClr val="383838"/>
+                </a:solidFill>
+                <a:effectLst/>
+                <a:latin typeface="Consolas" panose="020B0609020204030204" pitchFamily="49" charset="0"/>
+              </a:rPr>
+              <a:t>(s </a:t>
+            </a:r>
+            <a:r>
+              <a:rPr kumimoji="0" lang="en-US" altLang="en-US" b="0" i="0" u="none" strike="noStrike" cap="none" normalizeH="0" baseline="0" dirty="0">
+                <a:ln>
+                  <a:noFill/>
+                </a:ln>
+                <a:solidFill>
+                  <a:srgbClr val="202020"/>
+                </a:solidFill>
+                <a:effectLst/>
+                <a:latin typeface="Consolas" panose="020B0609020204030204" pitchFamily="49" charset="0"/>
+              </a:rPr>
+              <a:t>=&gt; </a:t>
+            </a:r>
+            <a:r>
+              <a:rPr kumimoji="0" lang="en-US" altLang="en-US" b="0" i="0" u="none" strike="noStrike" cap="none" normalizeH="0" baseline="0" dirty="0" err="1">
+                <a:ln>
+                  <a:noFill/>
+                </a:ln>
+                <a:solidFill>
+                  <a:srgbClr val="383838"/>
+                </a:solidFill>
+                <a:effectLst/>
+                <a:latin typeface="Consolas" panose="020B0609020204030204" pitchFamily="49" charset="0"/>
+              </a:rPr>
+              <a:t>s.</a:t>
+            </a:r>
+            <a:r>
+              <a:rPr kumimoji="0" lang="en-US" altLang="en-US" b="0" i="0" u="none" strike="noStrike" cap="none" normalizeH="0" baseline="0" dirty="0" err="1">
+                <a:ln>
+                  <a:noFill/>
+                </a:ln>
+                <a:solidFill>
+                  <a:srgbClr val="0093A1"/>
+                </a:solidFill>
+                <a:effectLst/>
+                <a:latin typeface="Consolas" panose="020B0609020204030204" pitchFamily="49" charset="0"/>
+              </a:rPr>
+              <a:t>Speaker</a:t>
+            </a:r>
+            <a:r>
+              <a:rPr kumimoji="0" lang="en-US" altLang="en-US" b="0" i="0" u="none" strike="noStrike" cap="none" normalizeH="0" baseline="0" dirty="0">
+                <a:ln>
+                  <a:noFill/>
+                </a:ln>
+                <a:solidFill>
+                  <a:srgbClr val="383838"/>
+                </a:solidFill>
+                <a:effectLst/>
+                <a:latin typeface="Consolas" panose="020B0609020204030204" pitchFamily="49" charset="0"/>
+              </a:rPr>
+              <a:t>)</a:t>
+            </a:r>
+          </a:p>
+          <a:p>
+            <a:pPr marL="0" marR="0" lvl="0" indent="0" algn="l" defTabSz="914400" rtl="0" eaLnBrk="0" fontAlgn="base" latinLnBrk="0" hangingPunct="0">
+              <a:lnSpc>
+                <a:spcPct val="100000"/>
+              </a:lnSpc>
+              <a:spcBef>
+                <a:spcPct val="0"/>
+              </a:spcBef>
+              <a:spcAft>
+                <a:spcPct val="0"/>
+              </a:spcAft>
+              <a:buClrTx/>
+              <a:buSzTx/>
+              <a:buFontTx/>
+              <a:buNone/>
+              <a:tabLst/>
+            </a:pPr>
+            <a:r>
+              <a:rPr lang="en-US" altLang="en-US" dirty="0">
+                <a:solidFill>
+                  <a:srgbClr val="383838"/>
+                </a:solidFill>
+                <a:latin typeface="Consolas" panose="020B0609020204030204" pitchFamily="49" charset="0"/>
+              </a:rPr>
+              <a:t>        </a:t>
+            </a:r>
+            <a:r>
+              <a:rPr kumimoji="0" lang="en-US" altLang="en-US" b="0" i="0" u="none" strike="noStrike" cap="none" normalizeH="0" baseline="0" dirty="0">
+                <a:ln>
+                  <a:noFill/>
+                </a:ln>
+                <a:solidFill>
+                  <a:srgbClr val="383838"/>
+                </a:solidFill>
+                <a:effectLst/>
+                <a:latin typeface="Consolas" panose="020B0609020204030204" pitchFamily="49" charset="0"/>
+              </a:rPr>
+              <a:t>.</a:t>
+            </a:r>
+            <a:r>
+              <a:rPr kumimoji="0" lang="en-US" altLang="en-US" b="0" i="0" u="none" strike="noStrike" cap="none" normalizeH="0" baseline="0" dirty="0">
+                <a:ln>
+                  <a:noFill/>
+                </a:ln>
+                <a:solidFill>
+                  <a:srgbClr val="00855F"/>
+                </a:solidFill>
+                <a:effectLst/>
+                <a:latin typeface="Consolas" panose="020B0609020204030204" pitchFamily="49" charset="0"/>
+              </a:rPr>
+              <a:t>Distinct</a:t>
+            </a:r>
+            <a:r>
+              <a:rPr kumimoji="0" lang="en-US" altLang="en-US" b="0" i="0" u="none" strike="noStrike" cap="none" normalizeH="0" baseline="0" dirty="0">
+                <a:ln>
+                  <a:noFill/>
+                </a:ln>
+                <a:solidFill>
+                  <a:srgbClr val="383838"/>
+                </a:solidFill>
+                <a:effectLst/>
+                <a:latin typeface="Consolas" panose="020B0609020204030204" pitchFamily="49" charset="0"/>
+              </a:rPr>
+              <a:t>();</a:t>
+            </a:r>
+            <a:endParaRPr kumimoji="0" lang="en-US" altLang="en-US" b="0" i="0" u="none" strike="noStrike" cap="none" normalizeH="0" baseline="0" dirty="0">
+              <a:ln>
+                <a:noFill/>
+              </a:ln>
+              <a:solidFill>
+                <a:schemeClr val="tx1"/>
+              </a:solidFill>
+              <a:effectLst/>
+              <a:latin typeface="Consolas" panose="020B0609020204030204" pitchFamily="49" charset="0"/>
+            </a:endParaRPr>
           </a:p>
         </p:txBody>
       </p:sp>
     </p:spTree>
     <p:extLst>
       <p:ext uri="{BB962C8B-B14F-4D97-AF65-F5344CB8AC3E}">
-        <p14:creationId xmlns:p14="http://schemas.microsoft.com/office/powerpoint/2010/main" val="3118502767"/>
+        <p14:creationId xmlns:p14="http://schemas.microsoft.com/office/powerpoint/2010/main" val="2790379015"/>
       </p:ext>
     </p:extLst>
   </p:cSld>
@@ -8528,65 +9412,82 @@
           <p:cNvPr id="2" name="Title 1">
             <a:extLst>
               <a:ext uri="{FF2B5EF4-FFF2-40B4-BE49-F238E27FC236}">
-                <a16:creationId xmlns:a16="http://schemas.microsoft.com/office/drawing/2014/main" id="{9F0A4C3A-80AE-E3A6-471D-A74E63C90618}"/>
+                <a16:creationId xmlns:a16="http://schemas.microsoft.com/office/drawing/2014/main" id="{7306C212-B3B4-8E92-B9B3-B626EF37EBA4}"/>
               </a:ext>
             </a:extLst>
           </p:cNvPr>
-          <p:cNvSpPr>
-            <a:spLocks noGrp="1"/>
-          </p:cNvSpPr>
-          <p:nvPr>
-            <p:ph type="title"/>
-          </p:nvPr>
-        </p:nvSpPr>
-        <p:spPr/>
-        <p:txBody>
-          <a:bodyPr/>
+          <p:cNvSpPr txBox="1">
+            <a:spLocks noGrp="1"/>
+          </p:cNvSpPr>
+          <p:nvPr>
+            <p:ph type="title" idx="4294967295"/>
+          </p:nvPr>
+        </p:nvSpPr>
+        <p:spPr>
+          <a:xfrm>
+            <a:off x="1061794" y="2828836"/>
+            <a:ext cx="10068412" cy="1200329"/>
+          </a:xfrm>
+          <a:prstGeom prst="rect">
+            <a:avLst/>
+          </a:prstGeom>
+          <a:noFill/>
+          <a:ln>
+            <a:noFill/>
+            <a:prstDash/>
+          </a:ln>
+          <a:effectLst/>
+        </p:spPr>
+        <p:txBody>
+          <a:bodyPr rot="0" spcFirstLastPara="0" vertOverflow="overflow" horzOverflow="overflow" vert="horz" wrap="square" lIns="91440" tIns="45720" rIns="91440" bIns="45720" numCol="1" spcCol="0" rtlCol="0" fromWordArt="0" anchor="t" anchorCtr="0" forceAA="0" compatLnSpc="1">
+            <a:prstTxWarp prst="textNoShape">
+              <a:avLst/>
+            </a:prstTxWarp>
+            <a:spAutoFit/>
+          </a:bodyPr>
           <a:lstStyle/>
           <a:p>
-            <a:r>
-              <a:rPr lang="en-US" dirty="0"/>
-              <a:t>Functions</a:t>
-            </a:r>
-            <a:br>
-              <a:rPr lang="en-US" dirty="0"/>
-            </a:br>
-            <a:r>
-              <a:rPr lang="en-US" dirty="0"/>
-              <a:t>First-order functions</a:t>
-            </a:r>
-          </a:p>
-        </p:txBody>
-      </p:sp>
-      <p:sp>
-        <p:nvSpPr>
-          <p:cNvPr id="3" name="Content Placeholder 2">
-            <a:extLst>
-              <a:ext uri="{FF2B5EF4-FFF2-40B4-BE49-F238E27FC236}">
-                <a16:creationId xmlns:a16="http://schemas.microsoft.com/office/drawing/2014/main" id="{519D56E3-2B90-2A3B-E384-D45FBDF93A21}"/>
-              </a:ext>
-            </a:extLst>
-          </p:cNvPr>
-          <p:cNvSpPr>
-            <a:spLocks noGrp="1"/>
-          </p:cNvSpPr>
-          <p:nvPr>
-            <p:ph idx="1"/>
-          </p:nvPr>
-        </p:nvSpPr>
-        <p:spPr/>
-        <p:txBody>
-          <a:bodyPr/>
-          <a:lstStyle/>
-          <a:p>
-            <a:endParaRPr lang="en-US" dirty="0"/>
+            <a:pPr marL="0" marR="0" lvl="0" indent="0" algn="ctr" defTabSz="457200" rtl="0" eaLnBrk="1" fontAlgn="auto" latinLnBrk="0" hangingPunct="1">
+              <a:lnSpc>
+                <a:spcPct val="100000"/>
+              </a:lnSpc>
+              <a:spcBef>
+                <a:spcPts val="0"/>
+              </a:spcBef>
+              <a:spcAft>
+                <a:spcPts val="0"/>
+              </a:spcAft>
+              <a:buClrTx/>
+              <a:buSzTx/>
+              <a:buFontTx/>
+              <a:buNone/>
+              <a:tabLst/>
+              <a:defRPr/>
+            </a:pPr>
+            <a:r>
+              <a:rPr kumimoji="0" lang="en-US" sz="7200" b="0" i="0" u="none" strike="noStrike" kern="1200" cap="none" spc="0" normalizeH="0" baseline="0" noProof="0" dirty="0">
+                <a:ln>
+                  <a:noFill/>
+                </a:ln>
+                <a:solidFill>
+                  <a:schemeClr val="tx1"/>
+                </a:solidFill>
+                <a:effectLst/>
+                <a:uLnTx/>
+                <a:uFillTx/>
+                <a:latin typeface="+mn-lt"/>
+                <a:ea typeface="+mn-ea"/>
+                <a:cs typeface="+mn-cs"/>
+              </a:rPr>
+              <a:t>Orders of functions</a:t>
+            </a:r>
           </a:p>
         </p:txBody>
       </p:sp>
     </p:spTree>
     <p:extLst>
       <p:ext uri="{BB962C8B-B14F-4D97-AF65-F5344CB8AC3E}">
-        <p14:creationId xmlns:p14="http://schemas.microsoft.com/office/powerpoint/2010/main" val="1001714058"/>
+        <p14:creationId xmlns:p14="http://schemas.microsoft.com/office/powerpoint/2010/main" val="3118502767"/>
       </p:ext>
     </p:extLst>
   </p:cSld>
@@ -8636,47 +9537,743 @@
           <a:p>
             <a:r>
               <a:rPr lang="en-US" dirty="0"/>
-              <a:t>Functions</a:t>
+              <a:t>Orders of functions</a:t>
             </a:r>
             <a:br>
               <a:rPr lang="en-US" dirty="0"/>
             </a:br>
             <a:r>
               <a:rPr lang="en-US" dirty="0"/>
-              <a:t>Higher-order functions (HOF)</a:t>
-            </a:r>
-          </a:p>
-        </p:txBody>
-      </p:sp>
-      <p:sp>
-        <p:nvSpPr>
-          <p:cNvPr id="3" name="Content Placeholder 2">
+              <a:t>First-order functions</a:t>
+            </a:r>
+          </a:p>
+        </p:txBody>
+      </p:sp>
+      <p:sp>
+        <p:nvSpPr>
+          <p:cNvPr id="8" name="Rectangle 3">
             <a:extLst>
               <a:ext uri="{FF2B5EF4-FFF2-40B4-BE49-F238E27FC236}">
-                <a16:creationId xmlns:a16="http://schemas.microsoft.com/office/drawing/2014/main" id="{519D56E3-2B90-2A3B-E384-D45FBDF93A21}"/>
+                <a16:creationId xmlns:a16="http://schemas.microsoft.com/office/drawing/2014/main" id="{EB0CC336-07BD-ADDD-D2B9-CC648B2375B7}"/>
               </a:ext>
             </a:extLst>
           </p:cNvPr>
           <p:cNvSpPr>
-            <a:spLocks noGrp="1"/>
-          </p:cNvSpPr>
-          <p:nvPr>
-            <p:ph idx="1"/>
-          </p:nvPr>
-        </p:nvSpPr>
-        <p:spPr/>
-        <p:txBody>
-          <a:bodyPr/>
+            <a:spLocks noChangeArrowheads="1"/>
+          </p:cNvSpPr>
+          <p:nvPr/>
+        </p:nvSpPr>
+        <p:spPr bwMode="auto">
+          <a:xfrm>
+            <a:off x="1103312" y="2052918"/>
+            <a:ext cx="8946541" cy="4195481"/>
+          </a:xfrm>
+          <a:prstGeom prst="rect">
+            <a:avLst/>
+          </a:prstGeom>
+          <a:solidFill>
+            <a:srgbClr val="FFFFFF"/>
+          </a:solidFill>
+          <a:ln w="15875">
+            <a:solidFill>
+              <a:schemeClr val="accent1"/>
+            </a:solidFill>
+            <a:miter lim="800000"/>
+            <a:headEnd/>
+            <a:tailEnd/>
+          </a:ln>
+          <a:effectLst/>
+          <a:extLst>
+            <a:ext uri="{AF507438-7753-43E0-B8FC-AC1667EBCBE1}">
+              <a14:hiddenEffects xmlns:a14="http://schemas.microsoft.com/office/drawing/2010/main">
+                <a:effectLst>
+                  <a:outerShdw dist="35921" dir="2700000" algn="ctr" rotWithShape="0">
+                    <a:schemeClr val="bg2"/>
+                  </a:outerShdw>
+                </a:effectLst>
+              </a14:hiddenEffects>
+            </a:ext>
+          </a:extLst>
+        </p:spPr>
+        <p:txBody>
+          <a:bodyPr vert="horz" wrap="none" lIns="91440" tIns="45720" rIns="91440" bIns="45720" numCol="1" anchor="t" anchorCtr="0" compatLnSpc="1">
+            <a:prstTxWarp prst="textNoShape">
+              <a:avLst/>
+            </a:prstTxWarp>
+            <a:noAutofit/>
+          </a:bodyPr>
           <a:lstStyle/>
           <a:p>
-            <a:endParaRPr lang="en-US" dirty="0"/>
+            <a:pPr defTabSz="914400" eaLnBrk="0" fontAlgn="base" hangingPunct="0">
+              <a:spcBef>
+                <a:spcPct val="0"/>
+              </a:spcBef>
+              <a:spcAft>
+                <a:spcPct val="0"/>
+              </a:spcAft>
+            </a:pPr>
+            <a:r>
+              <a:rPr kumimoji="0" lang="en-US" altLang="en-US" b="0" i="1" u="none" strike="noStrike" cap="none" normalizeH="0" baseline="0" dirty="0">
+                <a:ln>
+                  <a:noFill/>
+                </a:ln>
+                <a:solidFill>
+                  <a:srgbClr val="248700"/>
+                </a:solidFill>
+                <a:effectLst/>
+                <a:latin typeface="Consolas" panose="020B0609020204030204" pitchFamily="49" charset="0"/>
+              </a:rPr>
+              <a:t>// First-order functions take and return data</a:t>
+            </a:r>
+            <a:br>
+              <a:rPr kumimoji="0" lang="en-US" altLang="en-US" b="0" i="1" u="none" strike="noStrike" cap="none" normalizeH="0" baseline="0" dirty="0">
+                <a:ln>
+                  <a:noFill/>
+                </a:ln>
+                <a:solidFill>
+                  <a:srgbClr val="248700"/>
+                </a:solidFill>
+                <a:effectLst/>
+                <a:latin typeface="Consolas" panose="020B0609020204030204" pitchFamily="49" charset="0"/>
+              </a:rPr>
+            </a:br>
+            <a:r>
+              <a:rPr kumimoji="0" lang="en-US" altLang="en-US" b="0" i="1" u="none" strike="noStrike" cap="none" normalizeH="0" baseline="0" dirty="0">
+                <a:ln>
+                  <a:noFill/>
+                </a:ln>
+                <a:solidFill>
+                  <a:srgbClr val="248700"/>
+                </a:solidFill>
+                <a:effectLst/>
+                <a:latin typeface="Consolas" panose="020B0609020204030204" pitchFamily="49" charset="0"/>
+              </a:rPr>
+              <a:t>// Examples:</a:t>
+            </a:r>
+            <a:endParaRPr kumimoji="0" lang="en-US" altLang="en-US" b="0" i="0" u="none" strike="noStrike" cap="none" normalizeH="0" baseline="0" dirty="0">
+              <a:ln>
+                <a:noFill/>
+              </a:ln>
+              <a:solidFill>
+                <a:srgbClr val="0F54D6"/>
+              </a:solidFill>
+              <a:effectLst/>
+              <a:latin typeface="Consolas" panose="020B0609020204030204" pitchFamily="49" charset="0"/>
+            </a:endParaRPr>
+          </a:p>
+          <a:p>
+            <a:pPr defTabSz="914400" eaLnBrk="0" fontAlgn="base" hangingPunct="0">
+              <a:spcBef>
+                <a:spcPct val="0"/>
+              </a:spcBef>
+              <a:spcAft>
+                <a:spcPct val="0"/>
+              </a:spcAft>
+            </a:pPr>
+            <a:endParaRPr lang="en-US" altLang="en-US" dirty="0">
+              <a:solidFill>
+                <a:srgbClr val="0F54D6"/>
+              </a:solidFill>
+              <a:latin typeface="Consolas" panose="020B0609020204030204" pitchFamily="49" charset="0"/>
+            </a:endParaRPr>
+          </a:p>
+          <a:p>
+            <a:pPr defTabSz="914400" eaLnBrk="0" fontAlgn="base" hangingPunct="0">
+              <a:spcBef>
+                <a:spcPct val="0"/>
+              </a:spcBef>
+              <a:spcAft>
+                <a:spcPct val="0"/>
+              </a:spcAft>
+            </a:pPr>
+            <a:r>
+              <a:rPr kumimoji="0" lang="en-US" altLang="en-US" b="0" i="0" u="none" strike="noStrike" cap="none" normalizeH="0" baseline="0" dirty="0">
+                <a:ln>
+                  <a:noFill/>
+                </a:ln>
+                <a:solidFill>
+                  <a:srgbClr val="0F54D6"/>
+                </a:solidFill>
+                <a:effectLst/>
+                <a:latin typeface="Consolas" panose="020B0609020204030204" pitchFamily="49" charset="0"/>
+              </a:rPr>
+              <a:t>public static </a:t>
+            </a:r>
+            <a:r>
+              <a:rPr kumimoji="0" lang="en-US" altLang="en-US" b="0" i="0" u="none" strike="noStrike" cap="none" normalizeH="0" baseline="0" dirty="0" err="1">
+                <a:ln>
+                  <a:noFill/>
+                </a:ln>
+                <a:solidFill>
+                  <a:srgbClr val="300073"/>
+                </a:solidFill>
+                <a:effectLst/>
+                <a:latin typeface="Consolas" panose="020B0609020204030204" pitchFamily="49" charset="0"/>
+              </a:rPr>
+              <a:t>DateTime</a:t>
+            </a:r>
+            <a:r>
+              <a:rPr kumimoji="0" lang="en-US" altLang="en-US" b="0" i="0" u="none" strike="noStrike" cap="none" normalizeH="0" baseline="0" dirty="0">
+                <a:ln>
+                  <a:noFill/>
+                </a:ln>
+                <a:solidFill>
+                  <a:srgbClr val="300073"/>
+                </a:solidFill>
+                <a:effectLst/>
+                <a:latin typeface="Consolas" panose="020B0609020204030204" pitchFamily="49" charset="0"/>
+              </a:rPr>
+              <a:t> </a:t>
+            </a:r>
+            <a:r>
+              <a:rPr kumimoji="0" lang="en-US" altLang="en-US" b="0" i="0" u="none" strike="noStrike" cap="none" normalizeH="0" baseline="0" dirty="0" err="1">
+                <a:ln>
+                  <a:noFill/>
+                </a:ln>
+                <a:solidFill>
+                  <a:srgbClr val="00855F"/>
+                </a:solidFill>
+                <a:effectLst/>
+                <a:latin typeface="Consolas" panose="020B0609020204030204" pitchFamily="49" charset="0"/>
+              </a:rPr>
+              <a:t>SpecifyKind</a:t>
+            </a:r>
+            <a:r>
+              <a:rPr kumimoji="0" lang="en-US" altLang="en-US" b="0" i="0" u="none" strike="noStrike" cap="none" normalizeH="0" baseline="0" dirty="0">
+                <a:ln>
+                  <a:noFill/>
+                </a:ln>
+                <a:solidFill>
+                  <a:srgbClr val="383838"/>
+                </a:solidFill>
+                <a:effectLst/>
+                <a:latin typeface="Consolas" panose="020B0609020204030204" pitchFamily="49" charset="0"/>
+              </a:rPr>
+              <a:t>(</a:t>
+            </a:r>
+            <a:r>
+              <a:rPr kumimoji="0" lang="en-US" altLang="en-US" b="0" i="0" u="none" strike="noStrike" cap="none" normalizeH="0" baseline="0" dirty="0" err="1">
+                <a:ln>
+                  <a:noFill/>
+                </a:ln>
+                <a:solidFill>
+                  <a:srgbClr val="300073"/>
+                </a:solidFill>
+                <a:effectLst/>
+                <a:latin typeface="Consolas" panose="020B0609020204030204" pitchFamily="49" charset="0"/>
+              </a:rPr>
+              <a:t>DateTime</a:t>
+            </a:r>
+            <a:r>
+              <a:rPr kumimoji="0" lang="en-US" altLang="en-US" b="0" i="0" u="none" strike="noStrike" cap="none" normalizeH="0" baseline="0" dirty="0">
+                <a:ln>
+                  <a:noFill/>
+                </a:ln>
+                <a:solidFill>
+                  <a:srgbClr val="300073"/>
+                </a:solidFill>
+                <a:effectLst/>
+                <a:latin typeface="Consolas" panose="020B0609020204030204" pitchFamily="49" charset="0"/>
+              </a:rPr>
+              <a:t> </a:t>
+            </a:r>
+            <a:r>
+              <a:rPr kumimoji="0" lang="en-US" altLang="en-US" b="0" i="0" u="none" strike="noStrike" cap="none" normalizeH="0" baseline="0" dirty="0">
+                <a:ln>
+                  <a:noFill/>
+                </a:ln>
+                <a:solidFill>
+                  <a:srgbClr val="383838"/>
+                </a:solidFill>
+                <a:effectLst/>
+                <a:latin typeface="Consolas" panose="020B0609020204030204" pitchFamily="49" charset="0"/>
+              </a:rPr>
+              <a:t>value, </a:t>
+            </a:r>
+            <a:r>
+              <a:rPr kumimoji="0" lang="en-US" altLang="en-US" b="0" i="0" u="none" strike="noStrike" cap="none" normalizeH="0" baseline="0" dirty="0" err="1">
+                <a:ln>
+                  <a:noFill/>
+                </a:ln>
+                <a:solidFill>
+                  <a:srgbClr val="300073"/>
+                </a:solidFill>
+                <a:effectLst/>
+                <a:latin typeface="Consolas" panose="020B0609020204030204" pitchFamily="49" charset="0"/>
+              </a:rPr>
+              <a:t>DateTimeKind</a:t>
+            </a:r>
+            <a:r>
+              <a:rPr kumimoji="0" lang="en-US" altLang="en-US" b="0" i="0" u="none" strike="noStrike" cap="none" normalizeH="0" baseline="0" dirty="0">
+                <a:ln>
+                  <a:noFill/>
+                </a:ln>
+                <a:solidFill>
+                  <a:srgbClr val="300073"/>
+                </a:solidFill>
+                <a:effectLst/>
+                <a:latin typeface="Consolas" panose="020B0609020204030204" pitchFamily="49" charset="0"/>
+              </a:rPr>
+              <a:t> </a:t>
+            </a:r>
+            <a:r>
+              <a:rPr kumimoji="0" lang="en-US" altLang="en-US" b="0" i="0" u="none" strike="noStrike" cap="none" normalizeH="0" baseline="0" dirty="0">
+                <a:ln>
+                  <a:noFill/>
+                </a:ln>
+                <a:solidFill>
+                  <a:srgbClr val="383838"/>
+                </a:solidFill>
+                <a:effectLst/>
+                <a:latin typeface="Consolas" panose="020B0609020204030204" pitchFamily="49" charset="0"/>
+              </a:rPr>
+              <a:t>kind)</a:t>
+            </a:r>
+            <a:br>
+              <a:rPr kumimoji="0" lang="en-US" altLang="en-US" b="0" i="0" u="none" strike="noStrike" cap="none" normalizeH="0" baseline="0" dirty="0">
+                <a:ln>
+                  <a:noFill/>
+                </a:ln>
+                <a:solidFill>
+                  <a:srgbClr val="383838"/>
+                </a:solidFill>
+                <a:effectLst/>
+                <a:latin typeface="Consolas" panose="020B0609020204030204" pitchFamily="49" charset="0"/>
+              </a:rPr>
+            </a:br>
+            <a:br>
+              <a:rPr kumimoji="0" lang="en-US" altLang="en-US" b="0" i="0" u="none" strike="noStrike" cap="none" normalizeH="0" baseline="0" dirty="0">
+                <a:ln>
+                  <a:noFill/>
+                </a:ln>
+                <a:solidFill>
+                  <a:srgbClr val="383838"/>
+                </a:solidFill>
+                <a:effectLst/>
+                <a:latin typeface="Consolas" panose="020B0609020204030204" pitchFamily="49" charset="0"/>
+              </a:rPr>
+            </a:br>
+            <a:r>
+              <a:rPr kumimoji="0" lang="en-US" altLang="en-US" b="0" i="0" u="none" strike="noStrike" cap="none" normalizeH="0" baseline="0" dirty="0">
+                <a:ln>
+                  <a:noFill/>
+                </a:ln>
+                <a:solidFill>
+                  <a:srgbClr val="0F54D6"/>
+                </a:solidFill>
+                <a:effectLst/>
+                <a:latin typeface="Consolas" panose="020B0609020204030204" pitchFamily="49" charset="0"/>
+              </a:rPr>
+              <a:t>public static int </a:t>
+            </a:r>
+            <a:r>
+              <a:rPr kumimoji="0" lang="en-US" altLang="en-US" b="0" i="0" u="none" strike="noStrike" cap="none" normalizeH="0" baseline="0" dirty="0">
+                <a:ln>
+                  <a:noFill/>
+                </a:ln>
+                <a:solidFill>
+                  <a:srgbClr val="00855F"/>
+                </a:solidFill>
+                <a:effectLst/>
+                <a:latin typeface="Consolas" panose="020B0609020204030204" pitchFamily="49" charset="0"/>
+              </a:rPr>
+              <a:t>Count</a:t>
+            </a:r>
+            <a:r>
+              <a:rPr kumimoji="0" lang="en-US" altLang="en-US" b="0" i="0" u="none" strike="noStrike" cap="none" normalizeH="0" baseline="0" dirty="0">
+                <a:ln>
+                  <a:noFill/>
+                </a:ln>
+                <a:solidFill>
+                  <a:srgbClr val="383838"/>
+                </a:solidFill>
+                <a:effectLst/>
+                <a:latin typeface="Consolas" panose="020B0609020204030204" pitchFamily="49" charset="0"/>
+              </a:rPr>
+              <a:t>&lt;</a:t>
+            </a:r>
+            <a:r>
+              <a:rPr kumimoji="0" lang="en-US" altLang="en-US" b="0" i="0" u="none" strike="noStrike" cap="none" normalizeH="0" baseline="0" dirty="0" err="1">
+                <a:ln>
+                  <a:noFill/>
+                </a:ln>
+                <a:solidFill>
+                  <a:srgbClr val="6B2FBA"/>
+                </a:solidFill>
+                <a:effectLst/>
+                <a:latin typeface="Consolas" panose="020B0609020204030204" pitchFamily="49" charset="0"/>
+              </a:rPr>
+              <a:t>TSource</a:t>
+            </a:r>
+            <a:r>
+              <a:rPr kumimoji="0" lang="en-US" altLang="en-US" b="0" i="0" u="none" strike="noStrike" cap="none" normalizeH="0" baseline="0" dirty="0">
+                <a:ln>
+                  <a:noFill/>
+                </a:ln>
+                <a:solidFill>
+                  <a:srgbClr val="383838"/>
+                </a:solidFill>
+                <a:effectLst/>
+                <a:latin typeface="Consolas" panose="020B0609020204030204" pitchFamily="49" charset="0"/>
+              </a:rPr>
+              <a:t>&gt;(</a:t>
+            </a:r>
+            <a:r>
+              <a:rPr kumimoji="0" lang="en-US" altLang="en-US" b="0" i="0" u="none" strike="noStrike" cap="none" normalizeH="0" baseline="0" dirty="0">
+                <a:ln>
+                  <a:noFill/>
+                </a:ln>
+                <a:solidFill>
+                  <a:srgbClr val="0F54D6"/>
+                </a:solidFill>
+                <a:effectLst/>
+                <a:latin typeface="Consolas" panose="020B0609020204030204" pitchFamily="49" charset="0"/>
+              </a:rPr>
+              <a:t>this </a:t>
+            </a:r>
+            <a:r>
+              <a:rPr kumimoji="0" lang="en-US" altLang="en-US" b="0" i="0" u="none" strike="noStrike" cap="none" normalizeH="0" baseline="0" dirty="0" err="1">
+                <a:ln>
+                  <a:noFill/>
+                </a:ln>
+                <a:solidFill>
+                  <a:srgbClr val="6B2FBA"/>
+                </a:solidFill>
+                <a:effectLst/>
+                <a:latin typeface="Consolas" panose="020B0609020204030204" pitchFamily="49" charset="0"/>
+              </a:rPr>
+              <a:t>IEnumerable</a:t>
+            </a:r>
+            <a:r>
+              <a:rPr kumimoji="0" lang="en-US" altLang="en-US" b="0" i="0" u="none" strike="noStrike" cap="none" normalizeH="0" baseline="0" dirty="0">
+                <a:ln>
+                  <a:noFill/>
+                </a:ln>
+                <a:solidFill>
+                  <a:srgbClr val="383838"/>
+                </a:solidFill>
+                <a:effectLst/>
+                <a:latin typeface="Consolas" panose="020B0609020204030204" pitchFamily="49" charset="0"/>
+              </a:rPr>
+              <a:t>&lt;</a:t>
+            </a:r>
+            <a:r>
+              <a:rPr kumimoji="0" lang="en-US" altLang="en-US" b="0" i="0" u="none" strike="noStrike" cap="none" normalizeH="0" baseline="0" dirty="0" err="1">
+                <a:ln>
+                  <a:noFill/>
+                </a:ln>
+                <a:solidFill>
+                  <a:srgbClr val="6B2FBA"/>
+                </a:solidFill>
+                <a:effectLst/>
+                <a:latin typeface="Consolas" panose="020B0609020204030204" pitchFamily="49" charset="0"/>
+              </a:rPr>
+              <a:t>TSource</a:t>
+            </a:r>
+            <a:r>
+              <a:rPr kumimoji="0" lang="en-US" altLang="en-US" b="0" i="0" u="none" strike="noStrike" cap="none" normalizeH="0" baseline="0" dirty="0">
+                <a:ln>
+                  <a:noFill/>
+                </a:ln>
+                <a:solidFill>
+                  <a:srgbClr val="383838"/>
+                </a:solidFill>
+                <a:effectLst/>
+                <a:latin typeface="Consolas" panose="020B0609020204030204" pitchFamily="49" charset="0"/>
+              </a:rPr>
+              <a:t>&gt; source)</a:t>
+            </a:r>
+            <a:endParaRPr lang="en-US" altLang="en-US" dirty="0">
+              <a:solidFill>
+                <a:srgbClr val="383838"/>
+              </a:solidFill>
+              <a:latin typeface="Consolas" panose="020B0609020204030204" pitchFamily="49" charset="0"/>
+            </a:endParaRPr>
+          </a:p>
+          <a:p>
+            <a:pPr defTabSz="914400" eaLnBrk="0" fontAlgn="base" hangingPunct="0">
+              <a:spcBef>
+                <a:spcPct val="0"/>
+              </a:spcBef>
+              <a:spcAft>
+                <a:spcPct val="0"/>
+              </a:spcAft>
+            </a:pPr>
+            <a:endParaRPr kumimoji="0" lang="en-US" altLang="en-US" b="0" i="1" u="none" strike="noStrike" cap="none" normalizeH="0" baseline="0" dirty="0">
+              <a:ln>
+                <a:noFill/>
+              </a:ln>
+              <a:solidFill>
+                <a:srgbClr val="248700"/>
+              </a:solidFill>
+              <a:effectLst/>
+              <a:latin typeface="Consolas" panose="020B0609020204030204" pitchFamily="49" charset="0"/>
+            </a:endParaRPr>
+          </a:p>
+          <a:p>
+            <a:pPr defTabSz="914400" eaLnBrk="0" fontAlgn="base" hangingPunct="0">
+              <a:spcBef>
+                <a:spcPct val="0"/>
+              </a:spcBef>
+              <a:spcAft>
+                <a:spcPct val="0"/>
+              </a:spcAft>
+            </a:pPr>
+            <a:r>
+              <a:rPr kumimoji="0" lang="en-US" altLang="en-US" b="0" i="1" u="none" strike="noStrike" cap="none" normalizeH="0" baseline="0" dirty="0">
+                <a:ln>
+                  <a:noFill/>
+                </a:ln>
+                <a:solidFill>
+                  <a:srgbClr val="248700"/>
+                </a:solidFill>
+                <a:effectLst/>
+                <a:latin typeface="Consolas" panose="020B0609020204030204" pitchFamily="49" charset="0"/>
+              </a:rPr>
+              <a:t>// Instance </a:t>
+            </a:r>
+            <a:r>
+              <a:rPr lang="en-US" altLang="en-US" i="1" dirty="0">
+                <a:solidFill>
+                  <a:srgbClr val="248700"/>
+                </a:solidFill>
+                <a:latin typeface="Consolas" panose="020B0609020204030204" pitchFamily="49" charset="0"/>
+              </a:rPr>
+              <a:t>method with hidden </a:t>
+            </a:r>
+            <a:r>
+              <a:rPr kumimoji="0" lang="en-US" altLang="en-US" b="0" i="0" u="none" strike="noStrike" cap="none" normalizeH="0" baseline="0" dirty="0">
+                <a:ln>
+                  <a:noFill/>
+                </a:ln>
+                <a:solidFill>
+                  <a:srgbClr val="0F54D6"/>
+                </a:solidFill>
+                <a:effectLst/>
+                <a:latin typeface="Consolas" panose="020B0609020204030204" pitchFamily="49" charset="0"/>
+              </a:rPr>
+              <a:t>this</a:t>
+            </a:r>
+            <a:r>
+              <a:rPr lang="en-US" altLang="en-US" i="1" dirty="0">
+                <a:solidFill>
+                  <a:srgbClr val="248700"/>
+                </a:solidFill>
+                <a:latin typeface="Consolas" panose="020B0609020204030204" pitchFamily="49" charset="0"/>
+              </a:rPr>
+              <a:t> parameter</a:t>
+            </a:r>
+            <a:br>
+              <a:rPr kumimoji="0" lang="en-US" altLang="en-US" b="0" i="1" u="none" strike="noStrike" cap="none" normalizeH="0" baseline="0" dirty="0">
+                <a:ln>
+                  <a:noFill/>
+                </a:ln>
+                <a:solidFill>
+                  <a:srgbClr val="248700"/>
+                </a:solidFill>
+                <a:effectLst/>
+                <a:latin typeface="Consolas" panose="020B0609020204030204" pitchFamily="49" charset="0"/>
+              </a:rPr>
+            </a:br>
+            <a:r>
+              <a:rPr kumimoji="0" lang="en-US" altLang="en-US" b="0" i="0" u="none" strike="noStrike" cap="none" normalizeH="0" baseline="0" dirty="0">
+                <a:ln>
+                  <a:noFill/>
+                </a:ln>
+                <a:solidFill>
+                  <a:srgbClr val="0F54D6"/>
+                </a:solidFill>
+                <a:effectLst/>
+                <a:latin typeface="Consolas" panose="020B0609020204030204" pitchFamily="49" charset="0"/>
+              </a:rPr>
+              <a:t>public char</a:t>
+            </a:r>
+            <a:r>
+              <a:rPr kumimoji="0" lang="en-US" altLang="en-US" b="0" i="0" u="none" strike="noStrike" cap="none" normalizeH="0" baseline="0" dirty="0">
+                <a:ln>
+                  <a:noFill/>
+                </a:ln>
+                <a:solidFill>
+                  <a:srgbClr val="383838"/>
+                </a:solidFill>
+                <a:effectLst/>
+                <a:latin typeface="Consolas" panose="020B0609020204030204" pitchFamily="49" charset="0"/>
+              </a:rPr>
+              <a:t>[] </a:t>
+            </a:r>
+            <a:r>
+              <a:rPr kumimoji="0" lang="en-US" altLang="en-US" b="0" i="0" u="none" strike="noStrike" cap="none" normalizeH="0" baseline="0" dirty="0" err="1">
+                <a:ln>
+                  <a:noFill/>
+                </a:ln>
+                <a:solidFill>
+                  <a:srgbClr val="00855F"/>
+                </a:solidFill>
+                <a:effectLst/>
+                <a:latin typeface="Consolas" panose="020B0609020204030204" pitchFamily="49" charset="0"/>
+              </a:rPr>
+              <a:t>ToCharArray</a:t>
+            </a:r>
+            <a:r>
+              <a:rPr kumimoji="0" lang="en-US" altLang="en-US" b="0" i="0" u="none" strike="noStrike" cap="none" normalizeH="0" baseline="0" dirty="0">
+                <a:ln>
+                  <a:noFill/>
+                </a:ln>
+                <a:solidFill>
+                  <a:srgbClr val="383838"/>
+                </a:solidFill>
+                <a:effectLst/>
+                <a:latin typeface="Consolas" panose="020B0609020204030204" pitchFamily="49" charset="0"/>
+              </a:rPr>
+              <a:t>()</a:t>
+            </a:r>
+            <a:br>
+              <a:rPr kumimoji="0" lang="en-US" altLang="en-US" b="0" i="0" u="none" strike="noStrike" cap="none" normalizeH="0" baseline="0" dirty="0">
+                <a:ln>
+                  <a:noFill/>
+                </a:ln>
+                <a:solidFill>
+                  <a:srgbClr val="383838"/>
+                </a:solidFill>
+                <a:effectLst/>
+                <a:latin typeface="Consolas" panose="020B0609020204030204" pitchFamily="49" charset="0"/>
+              </a:rPr>
+            </a:br>
+            <a:endParaRPr kumimoji="0" lang="en-US" altLang="en-US" b="0" i="0" u="none" strike="noStrike" cap="none" normalizeH="0" baseline="0" dirty="0">
+              <a:ln>
+                <a:noFill/>
+              </a:ln>
+              <a:solidFill>
+                <a:srgbClr val="383838"/>
+              </a:solidFill>
+              <a:effectLst/>
+              <a:latin typeface="Consolas" panose="020B0609020204030204" pitchFamily="49" charset="0"/>
+            </a:endParaRPr>
+          </a:p>
+          <a:p>
+            <a:pPr defTabSz="914400" eaLnBrk="0" fontAlgn="base" hangingPunct="0">
+              <a:spcBef>
+                <a:spcPct val="0"/>
+              </a:spcBef>
+              <a:spcAft>
+                <a:spcPct val="0"/>
+              </a:spcAft>
+            </a:pPr>
+            <a:r>
+              <a:rPr kumimoji="0" lang="en-US" altLang="en-US" b="0" i="1" u="none" strike="noStrike" cap="none" normalizeH="0" baseline="0" dirty="0">
+                <a:ln>
+                  <a:noFill/>
+                </a:ln>
+                <a:solidFill>
+                  <a:srgbClr val="248700"/>
+                </a:solidFill>
+                <a:effectLst/>
+                <a:latin typeface="Consolas" panose="020B0609020204030204" pitchFamily="49" charset="0"/>
+              </a:rPr>
+              <a:t>// Empty parameter list and </a:t>
+            </a:r>
+            <a:r>
+              <a:rPr kumimoji="0" lang="en-US" altLang="en-US" b="0" i="0" u="none" strike="noStrike" cap="none" normalizeH="0" baseline="0" dirty="0">
+                <a:ln>
+                  <a:noFill/>
+                </a:ln>
+                <a:solidFill>
+                  <a:srgbClr val="0F54D6"/>
+                </a:solidFill>
+                <a:effectLst/>
+                <a:latin typeface="Consolas" panose="020B0609020204030204" pitchFamily="49" charset="0"/>
+              </a:rPr>
+              <a:t>void</a:t>
+            </a:r>
+            <a:r>
+              <a:rPr kumimoji="0" lang="en-US" altLang="en-US" b="0" i="1" u="none" strike="noStrike" cap="none" normalizeH="0" baseline="0" dirty="0">
+                <a:ln>
+                  <a:noFill/>
+                </a:ln>
+                <a:solidFill>
+                  <a:srgbClr val="248700"/>
+                </a:solidFill>
+                <a:effectLst/>
+                <a:latin typeface="Consolas" panose="020B0609020204030204" pitchFamily="49" charset="0"/>
+              </a:rPr>
+              <a:t> are data too</a:t>
+            </a:r>
+            <a:endParaRPr kumimoji="0" lang="en-US" altLang="en-US" b="0" i="0" u="none" strike="noStrike" cap="none" normalizeH="0" baseline="0" dirty="0">
+              <a:ln>
+                <a:noFill/>
+              </a:ln>
+              <a:solidFill>
+                <a:schemeClr val="tx1"/>
+              </a:solidFill>
+              <a:effectLst/>
+              <a:latin typeface="Consolas" panose="020B0609020204030204" pitchFamily="49" charset="0"/>
+            </a:endParaRPr>
+          </a:p>
+          <a:p>
+            <a:pPr defTabSz="914400" eaLnBrk="0" fontAlgn="base" hangingPunct="0">
+              <a:spcBef>
+                <a:spcPct val="0"/>
+              </a:spcBef>
+              <a:spcAft>
+                <a:spcPct val="0"/>
+              </a:spcAft>
+            </a:pPr>
+            <a:r>
+              <a:rPr kumimoji="0" lang="en-US" altLang="en-US" b="0" i="0" u="none" strike="noStrike" cap="none" normalizeH="0" baseline="0" dirty="0">
+                <a:ln>
+                  <a:noFill/>
+                </a:ln>
+                <a:solidFill>
+                  <a:srgbClr val="0F54D6"/>
+                </a:solidFill>
+                <a:effectLst/>
+                <a:latin typeface="Consolas" panose="020B0609020204030204" pitchFamily="49" charset="0"/>
+              </a:rPr>
+              <a:t>public static void </a:t>
+            </a:r>
+            <a:r>
+              <a:rPr kumimoji="0" lang="en-US" altLang="en-US" b="0" i="0" u="none" strike="noStrike" cap="none" normalizeH="0" baseline="0" dirty="0">
+                <a:ln>
+                  <a:noFill/>
+                </a:ln>
+                <a:solidFill>
+                  <a:srgbClr val="00855F"/>
+                </a:solidFill>
+                <a:effectLst/>
+                <a:latin typeface="Consolas" panose="020B0609020204030204" pitchFamily="49" charset="0"/>
+              </a:rPr>
+              <a:t>Clear</a:t>
+            </a:r>
+            <a:r>
+              <a:rPr kumimoji="0" lang="en-US" altLang="en-US" b="0" i="0" u="none" strike="noStrike" cap="none" normalizeH="0" baseline="0" dirty="0">
+                <a:ln>
+                  <a:noFill/>
+                </a:ln>
+                <a:solidFill>
+                  <a:srgbClr val="383838"/>
+                </a:solidFill>
+                <a:effectLst/>
+                <a:latin typeface="Consolas" panose="020B0609020204030204" pitchFamily="49" charset="0"/>
+              </a:rPr>
+              <a:t>()</a:t>
+            </a:r>
+            <a:endParaRPr kumimoji="0" lang="en-US" altLang="en-US" b="0" i="0" u="none" strike="noStrike" cap="none" normalizeH="0" baseline="0" dirty="0">
+              <a:ln>
+                <a:noFill/>
+              </a:ln>
+              <a:solidFill>
+                <a:schemeClr val="tx1"/>
+              </a:solidFill>
+              <a:effectLst/>
+              <a:latin typeface="Consolas" panose="020B0609020204030204" pitchFamily="49" charset="0"/>
+            </a:endParaRPr>
           </a:p>
         </p:txBody>
       </p:sp>
     </p:spTree>
     <p:extLst>
       <p:ext uri="{BB962C8B-B14F-4D97-AF65-F5344CB8AC3E}">
-        <p14:creationId xmlns:p14="http://schemas.microsoft.com/office/powerpoint/2010/main" val="1649357024"/>
+        <p14:creationId xmlns:p14="http://schemas.microsoft.com/office/powerpoint/2010/main" val="1001714058"/>
       </p:ext>
     </p:extLst>
   </p:cSld>
@@ -8726,47 +10323,1039 @@
           <a:p>
             <a:r>
               <a:rPr lang="en-US" dirty="0"/>
-              <a:t>Functions</a:t>
+              <a:t>Orders of functions</a:t>
             </a:r>
             <a:br>
               <a:rPr lang="en-US" dirty="0"/>
             </a:br>
             <a:r>
               <a:rPr lang="en-US" dirty="0"/>
-              <a:t>Pure functions</a:t>
-            </a:r>
-          </a:p>
-        </p:txBody>
-      </p:sp>
-      <p:sp>
-        <p:nvSpPr>
-          <p:cNvPr id="3" name="Content Placeholder 2">
+              <a:t>Higher-order functions (HOFs)</a:t>
+            </a:r>
+          </a:p>
+        </p:txBody>
+      </p:sp>
+      <p:sp>
+        <p:nvSpPr>
+          <p:cNvPr id="6" name="Rectangle 3">
             <a:extLst>
               <a:ext uri="{FF2B5EF4-FFF2-40B4-BE49-F238E27FC236}">
-                <a16:creationId xmlns:a16="http://schemas.microsoft.com/office/drawing/2014/main" id="{519D56E3-2B90-2A3B-E384-D45FBDF93A21}"/>
+                <a16:creationId xmlns:a16="http://schemas.microsoft.com/office/drawing/2014/main" id="{B34C0A34-D4E3-EDFF-9A0D-61DF3395486D}"/>
               </a:ext>
             </a:extLst>
           </p:cNvPr>
           <p:cNvSpPr>
-            <a:spLocks noGrp="1"/>
-          </p:cNvSpPr>
-          <p:nvPr>
-            <p:ph idx="1"/>
-          </p:nvPr>
-        </p:nvSpPr>
-        <p:spPr/>
-        <p:txBody>
-          <a:bodyPr/>
+            <a:spLocks noChangeArrowheads="1"/>
+          </p:cNvSpPr>
+          <p:nvPr/>
+        </p:nvSpPr>
+        <p:spPr bwMode="auto">
+          <a:xfrm>
+            <a:off x="1103312" y="2052918"/>
+            <a:ext cx="8946541" cy="4195481"/>
+          </a:xfrm>
+          <a:prstGeom prst="rect">
+            <a:avLst/>
+          </a:prstGeom>
+          <a:solidFill>
+            <a:srgbClr val="FFFFFF"/>
+          </a:solidFill>
+          <a:ln w="15875">
+            <a:solidFill>
+              <a:schemeClr val="accent1"/>
+            </a:solidFill>
+            <a:miter lim="800000"/>
+            <a:headEnd/>
+            <a:tailEnd/>
+          </a:ln>
+          <a:effectLst/>
+          <a:extLst>
+            <a:ext uri="{AF507438-7753-43E0-B8FC-AC1667EBCBE1}">
+              <a14:hiddenEffects xmlns:a14="http://schemas.microsoft.com/office/drawing/2010/main">
+                <a:effectLst>
+                  <a:outerShdw dist="35921" dir="2700000" algn="ctr" rotWithShape="0">
+                    <a:schemeClr val="bg2"/>
+                  </a:outerShdw>
+                </a:effectLst>
+              </a14:hiddenEffects>
+            </a:ext>
+          </a:extLst>
+        </p:spPr>
+        <p:txBody>
+          <a:bodyPr vert="horz" wrap="none" lIns="91440" tIns="45720" rIns="91440" bIns="45720" numCol="1" anchor="t" anchorCtr="0" compatLnSpc="1">
+            <a:prstTxWarp prst="textNoShape">
+              <a:avLst/>
+            </a:prstTxWarp>
+            <a:noAutofit/>
+          </a:bodyPr>
           <a:lstStyle/>
           <a:p>
-            <a:endParaRPr lang="en-US" dirty="0"/>
+            <a:pPr defTabSz="914400" eaLnBrk="0" fontAlgn="base" hangingPunct="0">
+              <a:spcBef>
+                <a:spcPct val="0"/>
+              </a:spcBef>
+              <a:spcAft>
+                <a:spcPct val="0"/>
+              </a:spcAft>
+            </a:pPr>
+            <a:r>
+              <a:rPr kumimoji="0" lang="en-US" altLang="en-US" b="0" i="1" u="none" strike="noStrike" cap="none" normalizeH="0" baseline="0" dirty="0">
+                <a:ln>
+                  <a:noFill/>
+                </a:ln>
+                <a:solidFill>
+                  <a:srgbClr val="248700"/>
+                </a:solidFill>
+                <a:effectLst/>
+                <a:latin typeface="Consolas" panose="020B0609020204030204" pitchFamily="49" charset="0"/>
+              </a:rPr>
+              <a:t>// HOFs take at least one function or return a function</a:t>
+            </a:r>
+            <a:br>
+              <a:rPr kumimoji="0" lang="en-US" altLang="en-US" b="0" i="1" u="none" strike="noStrike" cap="none" normalizeH="0" baseline="0" dirty="0">
+                <a:ln>
+                  <a:noFill/>
+                </a:ln>
+                <a:solidFill>
+                  <a:srgbClr val="248700"/>
+                </a:solidFill>
+                <a:effectLst/>
+                <a:latin typeface="Consolas" panose="020B0609020204030204" pitchFamily="49" charset="0"/>
+              </a:rPr>
+            </a:br>
+            <a:r>
+              <a:rPr kumimoji="0" lang="en-US" altLang="en-US" b="0" i="1" u="none" strike="noStrike" cap="none" normalizeH="0" baseline="0" dirty="0">
+                <a:ln>
+                  <a:noFill/>
+                </a:ln>
+                <a:solidFill>
+                  <a:srgbClr val="248700"/>
+                </a:solidFill>
+                <a:effectLst/>
+                <a:latin typeface="Consolas" panose="020B0609020204030204" pitchFamily="49" charset="0"/>
+              </a:rPr>
+              <a:t>// Examples:</a:t>
+            </a:r>
+            <a:endParaRPr kumimoji="0" lang="en-US" altLang="en-US" b="0" i="0" u="none" strike="noStrike" cap="none" normalizeH="0" baseline="0" dirty="0">
+              <a:ln>
+                <a:noFill/>
+              </a:ln>
+              <a:solidFill>
+                <a:srgbClr val="0F54D6"/>
+              </a:solidFill>
+              <a:effectLst/>
+              <a:latin typeface="Consolas" panose="020B0609020204030204" pitchFamily="49" charset="0"/>
+            </a:endParaRPr>
+          </a:p>
+          <a:p>
+            <a:pPr defTabSz="914400" eaLnBrk="0" fontAlgn="base" hangingPunct="0">
+              <a:spcBef>
+                <a:spcPct val="0"/>
+              </a:spcBef>
+              <a:spcAft>
+                <a:spcPct val="0"/>
+              </a:spcAft>
+            </a:pPr>
+            <a:br>
+              <a:rPr kumimoji="0" lang="en-US" altLang="en-US" b="0" i="0" u="none" strike="noStrike" cap="none" normalizeH="0" baseline="0" dirty="0">
+                <a:ln>
+                  <a:noFill/>
+                </a:ln>
+                <a:solidFill>
+                  <a:srgbClr val="383838"/>
+                </a:solidFill>
+                <a:effectLst/>
+                <a:latin typeface="Consolas" panose="020B0609020204030204" pitchFamily="49" charset="0"/>
+              </a:rPr>
+            </a:br>
+            <a:r>
+              <a:rPr kumimoji="0" lang="en-US" altLang="en-US" b="0" i="0" u="none" strike="noStrike" cap="none" normalizeH="0" baseline="0" dirty="0">
+                <a:ln>
+                  <a:noFill/>
+                </a:ln>
+                <a:solidFill>
+                  <a:srgbClr val="0F54D6"/>
+                </a:solidFill>
+                <a:effectLst/>
+                <a:latin typeface="Consolas" panose="020B0609020204030204" pitchFamily="49" charset="0"/>
+              </a:rPr>
+              <a:t>public static </a:t>
+            </a:r>
+            <a:r>
+              <a:rPr kumimoji="0" lang="en-US" altLang="en-US" b="0" i="0" u="none" strike="noStrike" cap="none" normalizeH="0" baseline="0" dirty="0" err="1">
+                <a:ln>
+                  <a:noFill/>
+                </a:ln>
+                <a:solidFill>
+                  <a:srgbClr val="6B2FBA"/>
+                </a:solidFill>
+                <a:effectLst/>
+                <a:latin typeface="Consolas" panose="020B0609020204030204" pitchFamily="49" charset="0"/>
+              </a:rPr>
+              <a:t>IEnumerable</a:t>
+            </a:r>
+            <a:r>
+              <a:rPr kumimoji="0" lang="en-US" altLang="en-US" b="0" i="0" u="none" strike="noStrike" cap="none" normalizeH="0" baseline="0" dirty="0">
+                <a:ln>
+                  <a:noFill/>
+                </a:ln>
+                <a:solidFill>
+                  <a:srgbClr val="383838"/>
+                </a:solidFill>
+                <a:effectLst/>
+                <a:latin typeface="Consolas" panose="020B0609020204030204" pitchFamily="49" charset="0"/>
+              </a:rPr>
+              <a:t>&lt;</a:t>
+            </a:r>
+            <a:r>
+              <a:rPr kumimoji="0" lang="en-US" altLang="en-US" b="0" i="0" u="none" strike="noStrike" cap="none" normalizeH="0" baseline="0" dirty="0" err="1">
+                <a:ln>
+                  <a:noFill/>
+                </a:ln>
+                <a:solidFill>
+                  <a:srgbClr val="6B2FBA"/>
+                </a:solidFill>
+                <a:effectLst/>
+                <a:latin typeface="Consolas" panose="020B0609020204030204" pitchFamily="49" charset="0"/>
+              </a:rPr>
+              <a:t>TResult</a:t>
+            </a:r>
+            <a:r>
+              <a:rPr kumimoji="0" lang="en-US" altLang="en-US" b="0" i="0" u="none" strike="noStrike" cap="none" normalizeH="0" baseline="0" dirty="0">
+                <a:ln>
+                  <a:noFill/>
+                </a:ln>
+                <a:solidFill>
+                  <a:srgbClr val="383838"/>
+                </a:solidFill>
+                <a:effectLst/>
+                <a:latin typeface="Consolas" panose="020B0609020204030204" pitchFamily="49" charset="0"/>
+              </a:rPr>
+              <a:t>&gt; </a:t>
+            </a:r>
+            <a:r>
+              <a:rPr kumimoji="0" lang="en-US" altLang="en-US" b="0" i="0" u="none" strike="noStrike" cap="none" normalizeH="0" baseline="0" dirty="0">
+                <a:ln>
+                  <a:noFill/>
+                </a:ln>
+                <a:solidFill>
+                  <a:srgbClr val="00855F"/>
+                </a:solidFill>
+                <a:effectLst/>
+                <a:latin typeface="Consolas" panose="020B0609020204030204" pitchFamily="49" charset="0"/>
+              </a:rPr>
+              <a:t>Select</a:t>
+            </a:r>
+            <a:r>
+              <a:rPr kumimoji="0" lang="en-US" altLang="en-US" b="0" i="0" u="none" strike="noStrike" cap="none" normalizeH="0" baseline="0" dirty="0">
+                <a:ln>
+                  <a:noFill/>
+                </a:ln>
+                <a:solidFill>
+                  <a:srgbClr val="383838"/>
+                </a:solidFill>
+                <a:effectLst/>
+                <a:latin typeface="Consolas" panose="020B0609020204030204" pitchFamily="49" charset="0"/>
+              </a:rPr>
+              <a:t>&lt;</a:t>
+            </a:r>
+            <a:r>
+              <a:rPr kumimoji="0" lang="en-US" altLang="en-US" b="0" i="0" u="none" strike="noStrike" cap="none" normalizeH="0" baseline="0" dirty="0" err="1">
+                <a:ln>
+                  <a:noFill/>
+                </a:ln>
+                <a:solidFill>
+                  <a:srgbClr val="6B2FBA"/>
+                </a:solidFill>
+                <a:effectLst/>
+                <a:latin typeface="Consolas" panose="020B0609020204030204" pitchFamily="49" charset="0"/>
+              </a:rPr>
+              <a:t>TSource</a:t>
+            </a:r>
+            <a:r>
+              <a:rPr kumimoji="0" lang="en-US" altLang="en-US" b="0" i="0" u="none" strike="noStrike" cap="none" normalizeH="0" baseline="0" dirty="0">
+                <a:ln>
+                  <a:noFill/>
+                </a:ln>
+                <a:solidFill>
+                  <a:srgbClr val="383838"/>
+                </a:solidFill>
+                <a:effectLst/>
+                <a:latin typeface="Consolas" panose="020B0609020204030204" pitchFamily="49" charset="0"/>
+              </a:rPr>
+              <a:t>, </a:t>
+            </a:r>
+            <a:r>
+              <a:rPr kumimoji="0" lang="en-US" altLang="en-US" b="0" i="0" u="none" strike="noStrike" cap="none" normalizeH="0" baseline="0" dirty="0" err="1">
+                <a:ln>
+                  <a:noFill/>
+                </a:ln>
+                <a:solidFill>
+                  <a:srgbClr val="6B2FBA"/>
+                </a:solidFill>
+                <a:effectLst/>
+                <a:latin typeface="Consolas" panose="020B0609020204030204" pitchFamily="49" charset="0"/>
+              </a:rPr>
+              <a:t>TResult</a:t>
+            </a:r>
+            <a:r>
+              <a:rPr kumimoji="0" lang="en-US" altLang="en-US" b="0" i="0" u="none" strike="noStrike" cap="none" normalizeH="0" baseline="0" dirty="0">
+                <a:ln>
+                  <a:noFill/>
+                </a:ln>
+                <a:solidFill>
+                  <a:srgbClr val="383838"/>
+                </a:solidFill>
+                <a:effectLst/>
+                <a:latin typeface="Consolas" panose="020B0609020204030204" pitchFamily="49" charset="0"/>
+              </a:rPr>
+              <a:t>&gt;(</a:t>
+            </a:r>
+            <a:br>
+              <a:rPr kumimoji="0" lang="en-US" altLang="en-US" b="0" i="0" u="none" strike="noStrike" cap="none" normalizeH="0" baseline="0" dirty="0">
+                <a:ln>
+                  <a:noFill/>
+                </a:ln>
+                <a:solidFill>
+                  <a:srgbClr val="383838"/>
+                </a:solidFill>
+                <a:effectLst/>
+                <a:latin typeface="Consolas" panose="020B0609020204030204" pitchFamily="49" charset="0"/>
+              </a:rPr>
+            </a:br>
+            <a:r>
+              <a:rPr kumimoji="0" lang="en-US" altLang="en-US" b="0" i="0" u="none" strike="noStrike" cap="none" normalizeH="0" baseline="0" dirty="0">
+                <a:ln>
+                  <a:noFill/>
+                </a:ln>
+                <a:solidFill>
+                  <a:srgbClr val="383838"/>
+                </a:solidFill>
+                <a:effectLst/>
+                <a:latin typeface="Consolas" panose="020B0609020204030204" pitchFamily="49" charset="0"/>
+              </a:rPr>
+              <a:t>    </a:t>
+            </a:r>
+            <a:r>
+              <a:rPr kumimoji="0" lang="en-US" altLang="en-US" b="0" i="0" u="none" strike="noStrike" cap="none" normalizeH="0" baseline="0" dirty="0">
+                <a:ln>
+                  <a:noFill/>
+                </a:ln>
+                <a:solidFill>
+                  <a:srgbClr val="0F54D6"/>
+                </a:solidFill>
+                <a:effectLst/>
+                <a:latin typeface="Consolas" panose="020B0609020204030204" pitchFamily="49" charset="0"/>
+              </a:rPr>
+              <a:t>this </a:t>
+            </a:r>
+            <a:r>
+              <a:rPr kumimoji="0" lang="en-US" altLang="en-US" b="0" i="0" u="none" strike="noStrike" cap="none" normalizeH="0" baseline="0" dirty="0" err="1">
+                <a:ln>
+                  <a:noFill/>
+                </a:ln>
+                <a:solidFill>
+                  <a:srgbClr val="6B2FBA"/>
+                </a:solidFill>
+                <a:effectLst/>
+                <a:latin typeface="Consolas" panose="020B0609020204030204" pitchFamily="49" charset="0"/>
+              </a:rPr>
+              <a:t>IEnumerable</a:t>
+            </a:r>
+            <a:r>
+              <a:rPr kumimoji="0" lang="en-US" altLang="en-US" b="0" i="0" u="none" strike="noStrike" cap="none" normalizeH="0" baseline="0" dirty="0">
+                <a:ln>
+                  <a:noFill/>
+                </a:ln>
+                <a:solidFill>
+                  <a:srgbClr val="383838"/>
+                </a:solidFill>
+                <a:effectLst/>
+                <a:latin typeface="Consolas" panose="020B0609020204030204" pitchFamily="49" charset="0"/>
+              </a:rPr>
+              <a:t>&lt;</a:t>
+            </a:r>
+            <a:r>
+              <a:rPr kumimoji="0" lang="en-US" altLang="en-US" b="0" i="0" u="none" strike="noStrike" cap="none" normalizeH="0" baseline="0" dirty="0" err="1">
+                <a:ln>
+                  <a:noFill/>
+                </a:ln>
+                <a:solidFill>
+                  <a:srgbClr val="6B2FBA"/>
+                </a:solidFill>
+                <a:effectLst/>
+                <a:latin typeface="Consolas" panose="020B0609020204030204" pitchFamily="49" charset="0"/>
+              </a:rPr>
+              <a:t>TSource</a:t>
+            </a:r>
+            <a:r>
+              <a:rPr kumimoji="0" lang="en-US" altLang="en-US" b="0" i="0" u="none" strike="noStrike" cap="none" normalizeH="0" baseline="0" dirty="0">
+                <a:ln>
+                  <a:noFill/>
+                </a:ln>
+                <a:solidFill>
+                  <a:srgbClr val="383838"/>
+                </a:solidFill>
+                <a:effectLst/>
+                <a:latin typeface="Consolas" panose="020B0609020204030204" pitchFamily="49" charset="0"/>
+              </a:rPr>
+              <a:t>&gt; source, </a:t>
+            </a:r>
+            <a:r>
+              <a:rPr kumimoji="0" lang="en-US" altLang="en-US" b="0" i="0" u="none" strike="noStrike" cap="none" normalizeH="0" baseline="0" dirty="0" err="1">
+                <a:ln>
+                  <a:noFill/>
+                </a:ln>
+                <a:solidFill>
+                  <a:srgbClr val="300073"/>
+                </a:solidFill>
+                <a:effectLst/>
+                <a:latin typeface="Consolas" panose="020B0609020204030204" pitchFamily="49" charset="0"/>
+              </a:rPr>
+              <a:t>Func</a:t>
+            </a:r>
+            <a:r>
+              <a:rPr kumimoji="0" lang="en-US" altLang="en-US" b="0" i="0" u="none" strike="noStrike" cap="none" normalizeH="0" baseline="0" dirty="0">
+                <a:ln>
+                  <a:noFill/>
+                </a:ln>
+                <a:solidFill>
+                  <a:srgbClr val="383838"/>
+                </a:solidFill>
+                <a:effectLst/>
+                <a:latin typeface="Consolas" panose="020B0609020204030204" pitchFamily="49" charset="0"/>
+              </a:rPr>
+              <a:t>&lt;</a:t>
+            </a:r>
+            <a:r>
+              <a:rPr kumimoji="0" lang="en-US" altLang="en-US" b="0" i="0" u="none" strike="noStrike" cap="none" normalizeH="0" baseline="0" dirty="0" err="1">
+                <a:ln>
+                  <a:noFill/>
+                </a:ln>
+                <a:solidFill>
+                  <a:srgbClr val="6B2FBA"/>
+                </a:solidFill>
+                <a:effectLst/>
+                <a:latin typeface="Consolas" panose="020B0609020204030204" pitchFamily="49" charset="0"/>
+              </a:rPr>
+              <a:t>TSource</a:t>
+            </a:r>
+            <a:r>
+              <a:rPr kumimoji="0" lang="en-US" altLang="en-US" b="0" i="0" u="none" strike="noStrike" cap="none" normalizeH="0" baseline="0" dirty="0">
+                <a:ln>
+                  <a:noFill/>
+                </a:ln>
+                <a:solidFill>
+                  <a:srgbClr val="383838"/>
+                </a:solidFill>
+                <a:effectLst/>
+                <a:latin typeface="Consolas" panose="020B0609020204030204" pitchFamily="49" charset="0"/>
+              </a:rPr>
+              <a:t>, </a:t>
+            </a:r>
+            <a:r>
+              <a:rPr kumimoji="0" lang="en-US" altLang="en-US" b="0" i="0" u="none" strike="noStrike" cap="none" normalizeH="0" baseline="0" dirty="0" err="1">
+                <a:ln>
+                  <a:noFill/>
+                </a:ln>
+                <a:solidFill>
+                  <a:srgbClr val="6B2FBA"/>
+                </a:solidFill>
+                <a:effectLst/>
+                <a:latin typeface="Consolas" panose="020B0609020204030204" pitchFamily="49" charset="0"/>
+              </a:rPr>
+              <a:t>TResult</a:t>
+            </a:r>
+            <a:r>
+              <a:rPr kumimoji="0" lang="en-US" altLang="en-US" b="0" i="0" u="none" strike="noStrike" cap="none" normalizeH="0" baseline="0" dirty="0">
+                <a:ln>
+                  <a:noFill/>
+                </a:ln>
+                <a:solidFill>
+                  <a:srgbClr val="383838"/>
+                </a:solidFill>
+                <a:effectLst/>
+                <a:latin typeface="Consolas" panose="020B0609020204030204" pitchFamily="49" charset="0"/>
+              </a:rPr>
+              <a:t>&gt; selector)</a:t>
+            </a:r>
+            <a:br>
+              <a:rPr kumimoji="0" lang="en-US" altLang="en-US" b="0" i="0" u="none" strike="noStrike" cap="none" normalizeH="0" baseline="0" dirty="0">
+                <a:ln>
+                  <a:noFill/>
+                </a:ln>
+                <a:solidFill>
+                  <a:srgbClr val="383838"/>
+                </a:solidFill>
+                <a:effectLst/>
+                <a:latin typeface="Consolas" panose="020B0609020204030204" pitchFamily="49" charset="0"/>
+              </a:rPr>
+            </a:br>
+            <a:br>
+              <a:rPr kumimoji="0" lang="en-US" altLang="en-US" b="0" i="1" u="none" strike="noStrike" cap="none" normalizeH="0" baseline="0" dirty="0">
+                <a:ln>
+                  <a:noFill/>
+                </a:ln>
+                <a:solidFill>
+                  <a:srgbClr val="248700"/>
+                </a:solidFill>
+                <a:effectLst/>
+                <a:latin typeface="Consolas" panose="020B0609020204030204" pitchFamily="49" charset="0"/>
+              </a:rPr>
+            </a:br>
+            <a:r>
+              <a:rPr kumimoji="0" lang="en-US" altLang="en-US" b="0" i="0" u="none" strike="noStrike" cap="none" normalizeH="0" baseline="0" dirty="0">
+                <a:ln>
+                  <a:noFill/>
+                </a:ln>
+                <a:solidFill>
+                  <a:srgbClr val="0F54D6"/>
+                </a:solidFill>
+                <a:effectLst/>
+                <a:latin typeface="Consolas" panose="020B0609020204030204" pitchFamily="49" charset="0"/>
+              </a:rPr>
+              <a:t>public </a:t>
+            </a:r>
+            <a:r>
+              <a:rPr kumimoji="0" lang="en-US" altLang="en-US" b="0" i="0" u="none" strike="noStrike" cap="none" normalizeH="0" baseline="0" dirty="0">
+                <a:ln>
+                  <a:noFill/>
+                </a:ln>
+                <a:solidFill>
+                  <a:srgbClr val="6B2FBA"/>
+                </a:solidFill>
+                <a:effectLst/>
+                <a:latin typeface="Consolas" panose="020B0609020204030204" pitchFamily="49" charset="0"/>
+              </a:rPr>
+              <a:t>Lazy</a:t>
+            </a:r>
+            <a:r>
+              <a:rPr kumimoji="0" lang="en-US" altLang="en-US" b="0" i="0" u="none" strike="noStrike" cap="none" normalizeH="0" baseline="0" dirty="0">
+                <a:ln>
+                  <a:noFill/>
+                </a:ln>
+                <a:solidFill>
+                  <a:srgbClr val="383838"/>
+                </a:solidFill>
+                <a:effectLst/>
+                <a:latin typeface="Consolas" panose="020B0609020204030204" pitchFamily="49" charset="0"/>
+              </a:rPr>
+              <a:t>(</a:t>
+            </a:r>
+            <a:r>
+              <a:rPr kumimoji="0" lang="en-US" altLang="en-US" b="0" i="0" u="none" strike="noStrike" cap="none" normalizeH="0" baseline="0" dirty="0" err="1">
+                <a:ln>
+                  <a:noFill/>
+                </a:ln>
+                <a:solidFill>
+                  <a:srgbClr val="300073"/>
+                </a:solidFill>
+                <a:effectLst/>
+                <a:latin typeface="Consolas" panose="020B0609020204030204" pitchFamily="49" charset="0"/>
+              </a:rPr>
+              <a:t>Func</a:t>
+            </a:r>
+            <a:r>
+              <a:rPr kumimoji="0" lang="en-US" altLang="en-US" b="0" i="0" u="none" strike="noStrike" cap="none" normalizeH="0" baseline="0" dirty="0">
+                <a:ln>
+                  <a:noFill/>
+                </a:ln>
+                <a:solidFill>
+                  <a:srgbClr val="383838"/>
+                </a:solidFill>
+                <a:effectLst/>
+                <a:latin typeface="Consolas" panose="020B0609020204030204" pitchFamily="49" charset="0"/>
+              </a:rPr>
+              <a:t>&lt;</a:t>
+            </a:r>
+            <a:r>
+              <a:rPr kumimoji="0" lang="en-US" altLang="en-US" b="0" i="0" u="none" strike="noStrike" cap="none" normalizeH="0" baseline="0" dirty="0">
+                <a:ln>
+                  <a:noFill/>
+                </a:ln>
+                <a:solidFill>
+                  <a:srgbClr val="6B2FBA"/>
+                </a:solidFill>
+                <a:effectLst/>
+                <a:latin typeface="Consolas" panose="020B0609020204030204" pitchFamily="49" charset="0"/>
+              </a:rPr>
+              <a:t>T</a:t>
+            </a:r>
+            <a:r>
+              <a:rPr kumimoji="0" lang="en-US" altLang="en-US" b="0" i="0" u="none" strike="noStrike" cap="none" normalizeH="0" baseline="0" dirty="0">
+                <a:ln>
+                  <a:noFill/>
+                </a:ln>
+                <a:solidFill>
+                  <a:srgbClr val="383838"/>
+                </a:solidFill>
+                <a:effectLst/>
+                <a:latin typeface="Consolas" panose="020B0609020204030204" pitchFamily="49" charset="0"/>
+              </a:rPr>
+              <a:t>&gt; </a:t>
+            </a:r>
+            <a:r>
+              <a:rPr kumimoji="0" lang="en-US" altLang="en-US" b="0" i="0" u="none" strike="noStrike" cap="none" normalizeH="0" baseline="0" dirty="0" err="1">
+                <a:ln>
+                  <a:noFill/>
+                </a:ln>
+                <a:solidFill>
+                  <a:srgbClr val="383838"/>
+                </a:solidFill>
+                <a:effectLst/>
+                <a:latin typeface="Consolas" panose="020B0609020204030204" pitchFamily="49" charset="0"/>
+              </a:rPr>
+              <a:t>valueFactory</a:t>
+            </a:r>
+            <a:r>
+              <a:rPr kumimoji="0" lang="en-US" altLang="en-US" b="0" i="0" u="none" strike="noStrike" cap="none" normalizeH="0" baseline="0" dirty="0">
+                <a:ln>
+                  <a:noFill/>
+                </a:ln>
+                <a:solidFill>
+                  <a:srgbClr val="383838"/>
+                </a:solidFill>
+                <a:effectLst/>
+                <a:latin typeface="Consolas" panose="020B0609020204030204" pitchFamily="49" charset="0"/>
+              </a:rPr>
+              <a:t>)</a:t>
+            </a:r>
+            <a:endParaRPr kumimoji="0" lang="en-US" altLang="en-US" b="0" i="0" u="none" strike="noStrike" cap="none" normalizeH="0" baseline="0" dirty="0">
+              <a:ln>
+                <a:noFill/>
+              </a:ln>
+              <a:solidFill>
+                <a:schemeClr val="tx1"/>
+              </a:solidFill>
+              <a:effectLst/>
+              <a:latin typeface="Consolas" panose="020B0609020204030204" pitchFamily="49" charset="0"/>
+            </a:endParaRPr>
+          </a:p>
+          <a:p>
+            <a:pPr defTabSz="914400" eaLnBrk="0" fontAlgn="base" hangingPunct="0">
+              <a:spcBef>
+                <a:spcPct val="0"/>
+              </a:spcBef>
+              <a:spcAft>
+                <a:spcPct val="0"/>
+              </a:spcAft>
+            </a:pPr>
+            <a:br>
+              <a:rPr kumimoji="0" lang="en-US" altLang="en-US" b="0" i="1" u="none" strike="noStrike" cap="none" normalizeH="0" baseline="0" dirty="0">
+                <a:ln>
+                  <a:noFill/>
+                </a:ln>
+                <a:solidFill>
+                  <a:srgbClr val="248700"/>
+                </a:solidFill>
+                <a:effectLst/>
+                <a:latin typeface="Consolas" panose="020B0609020204030204" pitchFamily="49" charset="0"/>
+              </a:rPr>
+            </a:br>
+            <a:r>
+              <a:rPr kumimoji="0" lang="en-US" altLang="en-US" b="0" i="0" u="none" strike="noStrike" cap="none" normalizeH="0" baseline="0" dirty="0">
+                <a:ln>
+                  <a:noFill/>
+                </a:ln>
+                <a:solidFill>
+                  <a:srgbClr val="0F54D6"/>
+                </a:solidFill>
+                <a:effectLst/>
+                <a:latin typeface="Consolas" panose="020B0609020204030204" pitchFamily="49" charset="0"/>
+              </a:rPr>
+              <a:t>public static </a:t>
+            </a:r>
+            <a:r>
+              <a:rPr kumimoji="0" lang="en-US" altLang="en-US" b="0" i="0" u="none" strike="noStrike" cap="none" normalizeH="0" baseline="0" dirty="0" err="1">
+                <a:ln>
+                  <a:noFill/>
+                </a:ln>
+                <a:solidFill>
+                  <a:srgbClr val="6B2FBA"/>
+                </a:solidFill>
+                <a:effectLst/>
+                <a:latin typeface="Consolas" panose="020B0609020204030204" pitchFamily="49" charset="0"/>
+              </a:rPr>
+              <a:t>IServiceCollection</a:t>
+            </a:r>
+            <a:r>
+              <a:rPr kumimoji="0" lang="en-US" altLang="en-US" b="0" i="0" u="none" strike="noStrike" cap="none" normalizeH="0" baseline="0" dirty="0">
+                <a:ln>
+                  <a:noFill/>
+                </a:ln>
+                <a:solidFill>
+                  <a:srgbClr val="6B2FBA"/>
+                </a:solidFill>
+                <a:effectLst/>
+                <a:latin typeface="Consolas" panose="020B0609020204030204" pitchFamily="49" charset="0"/>
+              </a:rPr>
+              <a:t> </a:t>
+            </a:r>
+            <a:r>
+              <a:rPr kumimoji="0" lang="en-US" altLang="en-US" b="0" i="0" u="none" strike="noStrike" cap="none" normalizeH="0" baseline="0" dirty="0" err="1">
+                <a:ln>
+                  <a:noFill/>
+                </a:ln>
+                <a:solidFill>
+                  <a:srgbClr val="00855F"/>
+                </a:solidFill>
+                <a:effectLst/>
+                <a:latin typeface="Consolas" panose="020B0609020204030204" pitchFamily="49" charset="0"/>
+              </a:rPr>
+              <a:t>AddTransient</a:t>
+            </a:r>
+            <a:r>
+              <a:rPr kumimoji="0" lang="en-US" altLang="en-US" b="0" i="0" u="none" strike="noStrike" cap="none" normalizeH="0" baseline="0" dirty="0">
+                <a:ln>
+                  <a:noFill/>
+                </a:ln>
+                <a:solidFill>
+                  <a:srgbClr val="383838"/>
+                </a:solidFill>
+                <a:effectLst/>
+                <a:latin typeface="Consolas" panose="020B0609020204030204" pitchFamily="49" charset="0"/>
+              </a:rPr>
+              <a:t>&lt;</a:t>
+            </a:r>
+            <a:r>
+              <a:rPr kumimoji="0" lang="en-US" altLang="en-US" b="0" i="0" u="none" strike="noStrike" cap="none" normalizeH="0" baseline="0" dirty="0" err="1">
+                <a:ln>
+                  <a:noFill/>
+                </a:ln>
+                <a:solidFill>
+                  <a:srgbClr val="6B2FBA"/>
+                </a:solidFill>
+                <a:effectLst/>
+                <a:latin typeface="Consolas" panose="020B0609020204030204" pitchFamily="49" charset="0"/>
+              </a:rPr>
+              <a:t>TService</a:t>
+            </a:r>
+            <a:r>
+              <a:rPr kumimoji="0" lang="en-US" altLang="en-US" b="0" i="0" u="none" strike="noStrike" cap="none" normalizeH="0" baseline="0" dirty="0">
+                <a:ln>
+                  <a:noFill/>
+                </a:ln>
+                <a:solidFill>
+                  <a:srgbClr val="383838"/>
+                </a:solidFill>
+                <a:effectLst/>
+                <a:latin typeface="Consolas" panose="020B0609020204030204" pitchFamily="49" charset="0"/>
+              </a:rPr>
+              <a:t>&gt;(</a:t>
+            </a:r>
+            <a:br>
+              <a:rPr kumimoji="0" lang="en-US" altLang="en-US" b="0" i="0" u="none" strike="noStrike" cap="none" normalizeH="0" baseline="0" dirty="0">
+                <a:ln>
+                  <a:noFill/>
+                </a:ln>
+                <a:solidFill>
+                  <a:srgbClr val="383838"/>
+                </a:solidFill>
+                <a:effectLst/>
+                <a:latin typeface="Consolas" panose="020B0609020204030204" pitchFamily="49" charset="0"/>
+              </a:rPr>
+            </a:br>
+            <a:r>
+              <a:rPr kumimoji="0" lang="en-US" altLang="en-US" b="0" i="0" u="none" strike="noStrike" cap="none" normalizeH="0" baseline="0" dirty="0">
+                <a:ln>
+                  <a:noFill/>
+                </a:ln>
+                <a:solidFill>
+                  <a:srgbClr val="383838"/>
+                </a:solidFill>
+                <a:effectLst/>
+                <a:latin typeface="Consolas" panose="020B0609020204030204" pitchFamily="49" charset="0"/>
+              </a:rPr>
+              <a:t>    </a:t>
+            </a:r>
+            <a:r>
+              <a:rPr kumimoji="0" lang="en-US" altLang="en-US" b="0" i="0" u="none" strike="noStrike" cap="none" normalizeH="0" baseline="0" dirty="0">
+                <a:ln>
+                  <a:noFill/>
+                </a:ln>
+                <a:solidFill>
+                  <a:srgbClr val="0F54D6"/>
+                </a:solidFill>
+                <a:effectLst/>
+                <a:latin typeface="Consolas" panose="020B0609020204030204" pitchFamily="49" charset="0"/>
+              </a:rPr>
+              <a:t>this </a:t>
+            </a:r>
+            <a:r>
+              <a:rPr kumimoji="0" lang="en-US" altLang="en-US" b="0" i="0" u="none" strike="noStrike" cap="none" normalizeH="0" baseline="0" dirty="0" err="1">
+                <a:ln>
+                  <a:noFill/>
+                </a:ln>
+                <a:solidFill>
+                  <a:srgbClr val="6B2FBA"/>
+                </a:solidFill>
+                <a:effectLst/>
+                <a:latin typeface="Consolas" panose="020B0609020204030204" pitchFamily="49" charset="0"/>
+              </a:rPr>
+              <a:t>IServiceCollection</a:t>
+            </a:r>
+            <a:r>
+              <a:rPr kumimoji="0" lang="en-US" altLang="en-US" b="0" i="0" u="none" strike="noStrike" cap="none" normalizeH="0" baseline="0" dirty="0">
+                <a:ln>
+                  <a:noFill/>
+                </a:ln>
+                <a:solidFill>
+                  <a:srgbClr val="6B2FBA"/>
+                </a:solidFill>
+                <a:effectLst/>
+                <a:latin typeface="Consolas" panose="020B0609020204030204" pitchFamily="49" charset="0"/>
+              </a:rPr>
+              <a:t> </a:t>
+            </a:r>
+            <a:r>
+              <a:rPr kumimoji="0" lang="en-US" altLang="en-US" b="0" i="0" u="none" strike="noStrike" cap="none" normalizeH="0" baseline="0" dirty="0">
+                <a:ln>
+                  <a:noFill/>
+                </a:ln>
+                <a:solidFill>
+                  <a:srgbClr val="383838"/>
+                </a:solidFill>
+                <a:effectLst/>
+                <a:latin typeface="Consolas" panose="020B0609020204030204" pitchFamily="49" charset="0"/>
+              </a:rPr>
+              <a:t>services,</a:t>
+            </a:r>
+            <a:br>
+              <a:rPr kumimoji="0" lang="en-US" altLang="en-US" b="0" i="0" u="none" strike="noStrike" cap="none" normalizeH="0" baseline="0" dirty="0">
+                <a:ln>
+                  <a:noFill/>
+                </a:ln>
+                <a:solidFill>
+                  <a:srgbClr val="383838"/>
+                </a:solidFill>
+                <a:effectLst/>
+                <a:latin typeface="Consolas" panose="020B0609020204030204" pitchFamily="49" charset="0"/>
+              </a:rPr>
+            </a:br>
+            <a:r>
+              <a:rPr kumimoji="0" lang="en-US" altLang="en-US" b="0" i="0" u="none" strike="noStrike" cap="none" normalizeH="0" baseline="0" dirty="0">
+                <a:ln>
+                  <a:noFill/>
+                </a:ln>
+                <a:solidFill>
+                  <a:srgbClr val="383838"/>
+                </a:solidFill>
+                <a:effectLst/>
+                <a:latin typeface="Consolas" panose="020B0609020204030204" pitchFamily="49" charset="0"/>
+              </a:rPr>
+              <a:t>    </a:t>
+            </a:r>
+            <a:r>
+              <a:rPr kumimoji="0" lang="en-US" altLang="en-US" b="0" i="0" u="none" strike="noStrike" cap="none" normalizeH="0" baseline="0" dirty="0" err="1">
+                <a:ln>
+                  <a:noFill/>
+                </a:ln>
+                <a:solidFill>
+                  <a:srgbClr val="300073"/>
+                </a:solidFill>
+                <a:effectLst/>
+                <a:latin typeface="Consolas" panose="020B0609020204030204" pitchFamily="49" charset="0"/>
+              </a:rPr>
+              <a:t>Func</a:t>
+            </a:r>
+            <a:r>
+              <a:rPr kumimoji="0" lang="en-US" altLang="en-US" b="0" i="0" u="none" strike="noStrike" cap="none" normalizeH="0" baseline="0" dirty="0">
+                <a:ln>
+                  <a:noFill/>
+                </a:ln>
+                <a:solidFill>
+                  <a:srgbClr val="383838"/>
+                </a:solidFill>
+                <a:effectLst/>
+                <a:latin typeface="Consolas" panose="020B0609020204030204" pitchFamily="49" charset="0"/>
+              </a:rPr>
+              <a:t>&lt;</a:t>
+            </a:r>
+            <a:r>
+              <a:rPr kumimoji="0" lang="en-US" altLang="en-US" b="0" i="0" u="none" strike="noStrike" cap="none" normalizeH="0" baseline="0" dirty="0" err="1">
+                <a:ln>
+                  <a:noFill/>
+                </a:ln>
+                <a:solidFill>
+                  <a:srgbClr val="6B2FBA"/>
+                </a:solidFill>
+                <a:effectLst/>
+                <a:latin typeface="Consolas" panose="020B0609020204030204" pitchFamily="49" charset="0"/>
+              </a:rPr>
+              <a:t>IServiceProvider</a:t>
+            </a:r>
+            <a:r>
+              <a:rPr kumimoji="0" lang="en-US" altLang="en-US" b="0" i="0" u="none" strike="noStrike" cap="none" normalizeH="0" baseline="0" dirty="0">
+                <a:ln>
+                  <a:noFill/>
+                </a:ln>
+                <a:solidFill>
+                  <a:srgbClr val="383838"/>
+                </a:solidFill>
+                <a:effectLst/>
+                <a:latin typeface="Consolas" panose="020B0609020204030204" pitchFamily="49" charset="0"/>
+              </a:rPr>
+              <a:t>, </a:t>
+            </a:r>
+            <a:r>
+              <a:rPr kumimoji="0" lang="en-US" altLang="en-US" b="0" i="0" u="none" strike="noStrike" cap="none" normalizeH="0" baseline="0" dirty="0" err="1">
+                <a:ln>
+                  <a:noFill/>
+                </a:ln>
+                <a:solidFill>
+                  <a:srgbClr val="6B2FBA"/>
+                </a:solidFill>
+                <a:effectLst/>
+                <a:latin typeface="Consolas" panose="020B0609020204030204" pitchFamily="49" charset="0"/>
+              </a:rPr>
+              <a:t>TService</a:t>
+            </a:r>
+            <a:r>
+              <a:rPr kumimoji="0" lang="en-US" altLang="en-US" b="0" i="0" u="none" strike="noStrike" cap="none" normalizeH="0" baseline="0" dirty="0">
+                <a:ln>
+                  <a:noFill/>
+                </a:ln>
+                <a:solidFill>
+                  <a:srgbClr val="383838"/>
+                </a:solidFill>
+                <a:effectLst/>
+                <a:latin typeface="Consolas" panose="020B0609020204030204" pitchFamily="49" charset="0"/>
+              </a:rPr>
+              <a:t>&gt; </a:t>
+            </a:r>
+            <a:r>
+              <a:rPr kumimoji="0" lang="en-US" altLang="en-US" b="0" i="0" u="none" strike="noStrike" cap="none" normalizeH="0" baseline="0" dirty="0" err="1">
+                <a:ln>
+                  <a:noFill/>
+                </a:ln>
+                <a:solidFill>
+                  <a:srgbClr val="383838"/>
+                </a:solidFill>
+                <a:effectLst/>
+                <a:latin typeface="Consolas" panose="020B0609020204030204" pitchFamily="49" charset="0"/>
+              </a:rPr>
+              <a:t>implementationFactory</a:t>
+            </a:r>
+            <a:r>
+              <a:rPr kumimoji="0" lang="en-US" altLang="en-US" b="0" i="0" u="none" strike="noStrike" cap="none" normalizeH="0" baseline="0" dirty="0">
+                <a:ln>
+                  <a:noFill/>
+                </a:ln>
+                <a:solidFill>
+                  <a:srgbClr val="383838"/>
+                </a:solidFill>
+                <a:effectLst/>
+                <a:latin typeface="Consolas" panose="020B0609020204030204" pitchFamily="49" charset="0"/>
+              </a:rPr>
+              <a:t>)</a:t>
+            </a:r>
+            <a:br>
+              <a:rPr kumimoji="0" lang="en-US" altLang="en-US" b="0" i="0" u="none" strike="noStrike" cap="none" normalizeH="0" baseline="0" dirty="0">
+                <a:ln>
+                  <a:noFill/>
+                </a:ln>
+                <a:solidFill>
+                  <a:srgbClr val="383838"/>
+                </a:solidFill>
+                <a:effectLst/>
+                <a:latin typeface="Consolas" panose="020B0609020204030204" pitchFamily="49" charset="0"/>
+              </a:rPr>
+            </a:br>
+            <a:r>
+              <a:rPr kumimoji="0" lang="en-US" altLang="en-US" b="0" i="0" u="none" strike="noStrike" cap="none" normalizeH="0" baseline="0" dirty="0">
+                <a:ln>
+                  <a:noFill/>
+                </a:ln>
+                <a:solidFill>
+                  <a:srgbClr val="383838"/>
+                </a:solidFill>
+                <a:effectLst/>
+                <a:latin typeface="Consolas" panose="020B0609020204030204" pitchFamily="49" charset="0"/>
+              </a:rPr>
+              <a:t>    </a:t>
+            </a:r>
+            <a:r>
+              <a:rPr kumimoji="0" lang="en-US" altLang="en-US" b="0" i="0" u="none" strike="noStrike" cap="none" normalizeH="0" baseline="0" dirty="0">
+                <a:ln>
+                  <a:noFill/>
+                </a:ln>
+                <a:solidFill>
+                  <a:srgbClr val="0F54D6"/>
+                </a:solidFill>
+                <a:effectLst/>
+                <a:latin typeface="Consolas" panose="020B0609020204030204" pitchFamily="49" charset="0"/>
+              </a:rPr>
+              <a:t>where </a:t>
+            </a:r>
+            <a:r>
+              <a:rPr kumimoji="0" lang="en-US" altLang="en-US" b="0" i="0" u="none" strike="noStrike" cap="none" normalizeH="0" baseline="0" dirty="0" err="1">
+                <a:ln>
+                  <a:noFill/>
+                </a:ln>
+                <a:solidFill>
+                  <a:srgbClr val="6B2FBA"/>
+                </a:solidFill>
+                <a:effectLst/>
+                <a:latin typeface="Consolas" panose="020B0609020204030204" pitchFamily="49" charset="0"/>
+              </a:rPr>
+              <a:t>TService</a:t>
+            </a:r>
+            <a:r>
+              <a:rPr kumimoji="0" lang="en-US" altLang="en-US" b="0" i="0" u="none" strike="noStrike" cap="none" normalizeH="0" baseline="0" dirty="0">
+                <a:ln>
+                  <a:noFill/>
+                </a:ln>
+                <a:solidFill>
+                  <a:srgbClr val="6B2FBA"/>
+                </a:solidFill>
+                <a:effectLst/>
+                <a:latin typeface="Consolas" panose="020B0609020204030204" pitchFamily="49" charset="0"/>
+              </a:rPr>
+              <a:t> </a:t>
+            </a:r>
+            <a:r>
+              <a:rPr kumimoji="0" lang="en-US" altLang="en-US" b="0" i="0" u="none" strike="noStrike" cap="none" normalizeH="0" baseline="0" dirty="0">
+                <a:ln>
+                  <a:noFill/>
+                </a:ln>
+                <a:solidFill>
+                  <a:srgbClr val="202020"/>
+                </a:solidFill>
+                <a:effectLst/>
+                <a:latin typeface="Consolas" panose="020B0609020204030204" pitchFamily="49" charset="0"/>
+              </a:rPr>
+              <a:t>: </a:t>
+            </a:r>
+            <a:r>
+              <a:rPr kumimoji="0" lang="en-US" altLang="en-US" b="0" i="0" u="none" strike="noStrike" cap="none" normalizeH="0" baseline="0" dirty="0">
+                <a:ln>
+                  <a:noFill/>
+                </a:ln>
+                <a:solidFill>
+                  <a:srgbClr val="0F54D6"/>
+                </a:solidFill>
+                <a:effectLst/>
+                <a:latin typeface="Consolas" panose="020B0609020204030204" pitchFamily="49" charset="0"/>
+              </a:rPr>
+              <a:t>class</a:t>
+            </a:r>
+            <a:endParaRPr kumimoji="0" lang="en-US" altLang="en-US" b="0" i="0" u="none" strike="noStrike" cap="none" normalizeH="0" baseline="0" dirty="0">
+              <a:ln>
+                <a:noFill/>
+              </a:ln>
+              <a:solidFill>
+                <a:schemeClr val="tx1"/>
+              </a:solidFill>
+              <a:effectLst/>
+              <a:latin typeface="Consolas" panose="020B0609020204030204" pitchFamily="49" charset="0"/>
+            </a:endParaRPr>
           </a:p>
         </p:txBody>
       </p:sp>
     </p:spTree>
     <p:extLst>
       <p:ext uri="{BB962C8B-B14F-4D97-AF65-F5344CB8AC3E}">
-        <p14:creationId xmlns:p14="http://schemas.microsoft.com/office/powerpoint/2010/main" val="3845697661"/>
+        <p14:creationId xmlns:p14="http://schemas.microsoft.com/office/powerpoint/2010/main" val="1649357024"/>
       </p:ext>
     </p:extLst>
   </p:cSld>
@@ -8811,8 +11400,8 @@
         </p:nvSpPr>
         <p:spPr>
           <a:xfrm>
-            <a:off x="1061794" y="2274838"/>
-            <a:ext cx="10068412" cy="2308324"/>
+            <a:off x="1061794" y="2828836"/>
+            <a:ext cx="10068412" cy="1200329"/>
           </a:xfrm>
           <a:prstGeom prst="rect">
             <a:avLst/>
@@ -8865,7 +11454,7 @@
                 <a:ea typeface="+mn-ea"/>
                 <a:cs typeface="+mn-cs"/>
               </a:rPr>
-              <a:t>Functional programming</a:t>
+              <a:t>Orders of functions</a:t>
             </a:r>
           </a:p>
         </p:txBody>
@@ -8873,7 +11462,7 @@
     </p:spTree>
     <p:extLst>
       <p:ext uri="{BB962C8B-B14F-4D97-AF65-F5344CB8AC3E}">
-        <p14:creationId xmlns:p14="http://schemas.microsoft.com/office/powerpoint/2010/main" val="3310324046"/>
+        <p14:creationId xmlns:p14="http://schemas.microsoft.com/office/powerpoint/2010/main" val="3718212579"/>
       </p:ext>
     </p:extLst>
   </p:cSld>
@@ -8923,7 +11512,7 @@
           <a:p>
             <a:r>
               <a:rPr lang="en-US" dirty="0"/>
-              <a:t>Functional programming (FP)</a:t>
+              <a:t>Pure functions</a:t>
             </a:r>
             <a:br>
               <a:rPr lang="en-US" dirty="0"/>
@@ -8956,14 +11545,23 @@
           <a:bodyPr/>
           <a:lstStyle/>
           <a:p>
-            <a:endParaRPr lang="en-US" dirty="0"/>
+            <a:r>
+              <a:rPr lang="en-US" dirty="0"/>
+              <a:t>Always produce the same output for a given set of arguments</a:t>
+            </a:r>
+          </a:p>
+          <a:p>
+            <a:r>
+              <a:rPr lang="en-US" dirty="0"/>
+              <a:t>Never have side effects</a:t>
+            </a:r>
           </a:p>
         </p:txBody>
       </p:sp>
     </p:spTree>
     <p:extLst>
       <p:ext uri="{BB962C8B-B14F-4D97-AF65-F5344CB8AC3E}">
-        <p14:creationId xmlns:p14="http://schemas.microsoft.com/office/powerpoint/2010/main" val="98042496"/>
+        <p14:creationId xmlns:p14="http://schemas.microsoft.com/office/powerpoint/2010/main" val="3845697661"/>
       </p:ext>
     </p:extLst>
   </p:cSld>
@@ -9013,14 +11611,14 @@
           <a:p>
             <a:r>
               <a:rPr lang="en-US" dirty="0"/>
-              <a:t>Functional programming (FP)</a:t>
+              <a:t>Pure functions</a:t>
             </a:r>
             <a:br>
               <a:rPr lang="en-US" dirty="0"/>
             </a:br>
             <a:r>
               <a:rPr lang="en-US" dirty="0"/>
-              <a:t>Pattern matching</a:t>
+              <a:t>Side effects</a:t>
             </a:r>
           </a:p>
         </p:txBody>
@@ -9046,14 +11644,35 @@
           <a:bodyPr/>
           <a:lstStyle/>
           <a:p>
-            <a:endParaRPr lang="en-US" dirty="0"/>
+            <a:r>
+              <a:rPr lang="en-US" dirty="0"/>
+              <a:t>Mutating global state</a:t>
+            </a:r>
+          </a:p>
+          <a:p>
+            <a:r>
+              <a:rPr lang="en-US" dirty="0"/>
+              <a:t>Mutating arguments</a:t>
+            </a:r>
+          </a:p>
+          <a:p>
+            <a:r>
+              <a:rPr lang="en-US" dirty="0"/>
+              <a:t>Performing I/O</a:t>
+            </a:r>
+          </a:p>
+          <a:p>
+            <a:r>
+              <a:rPr lang="en-US" dirty="0"/>
+              <a:t>Throwing exceptions</a:t>
+            </a:r>
           </a:p>
         </p:txBody>
       </p:sp>
     </p:spTree>
     <p:extLst>
       <p:ext uri="{BB962C8B-B14F-4D97-AF65-F5344CB8AC3E}">
-        <p14:creationId xmlns:p14="http://schemas.microsoft.com/office/powerpoint/2010/main" val="2815264430"/>
+        <p14:creationId xmlns:p14="http://schemas.microsoft.com/office/powerpoint/2010/main" val="93172275"/>
       </p:ext>
     </p:extLst>
   </p:cSld>

</xml_diff>